<commit_message>
Add next lecture slides, and assignment 3.
</commit_message>
<xml_diff>
--- a/bishops/cs321/resources/CS321_Lecture_12.pptx
+++ b/bishops/cs321/resources/CS321_Lecture_12.pptx
@@ -150,7 +150,7 @@
   </p:defaultTextStyle>
   <p:extLst>
     <p:ext uri="{EFAFB233-063F-42B5-8137-9DF3F51BA10A}">
-      <p15:sldGuideLst xmlns:p15="http://schemas.microsoft.com/office/powerpoint/2012/main"/>
+      <p15:sldGuideLst xmlns:p15="http://schemas.microsoft.com/office/powerpoint/2012/main" xmlns=""/>
     </p:ext>
   </p:extLst>
 </p:presentation>
@@ -161,7 +161,7 @@
   <p:cmAuthor id="1" name="Gregory" initials="G" lastIdx="1" clrIdx="0">
     <p:extLst>
       <p:ext uri="{19B8F6BF-5375-455C-9EA6-DF929625EA0E}">
-        <p15:presenceInfo xmlns:p15="http://schemas.microsoft.com/office/powerpoint/2012/main" userId="Gregory" providerId="None"/>
+        <p15:presenceInfo xmlns:p15="http://schemas.microsoft.com/office/powerpoint/2012/main" xmlns="" userId="Gregory" providerId="None"/>
       </p:ext>
     </p:extLst>
   </p:cmAuthor>
@@ -250,7 +250,8 @@
           <a:p>
             <a:fld id="{A6583E9D-07AB-4C6D-BFD0-47E805C6B3D4}" type="datetimeFigureOut">
               <a:rPr lang="en-CA" smtClean="0"/>
-              <a:t>2022-02-22</a:t>
+              <a:pPr/>
+              <a:t>2024-02-24</a:t>
             </a:fld>
             <a:endParaRPr lang="en-CA"/>
           </a:p>
@@ -409,6 +410,7 @@
           <a:p>
             <a:fld id="{8F20841C-25C9-4C0C-A7FA-C4A363D14F5A}" type="slidenum">
               <a:rPr lang="en-CA" smtClean="0"/>
+              <a:pPr/>
               <a:t>‹#›</a:t>
             </a:fld>
             <a:endParaRPr lang="en-CA"/>
@@ -418,7 +420,7 @@
     </p:spTree>
     <p:extLst>
       <p:ext uri="{BB962C8B-B14F-4D97-AF65-F5344CB8AC3E}">
-        <p14:creationId xmlns:p14="http://schemas.microsoft.com/office/powerpoint/2010/main" val="4237529172"/>
+        <p14:creationId xmlns:p14="http://schemas.microsoft.com/office/powerpoint/2010/main" xmlns="" val="4237529172"/>
       </p:ext>
     </p:extLst>
   </p:cSld>
@@ -562,14 +564,6 @@
           <a:bodyPr/>
           <a:lstStyle/>
           <a:p>
-            <a:r>
-              <a:rPr lang="en-CA" dirty="0"/>
-              <a:t>Multi-instrument</a:t>
-            </a:r>
-            <a:r>
-              <a:rPr lang="en-CA" baseline="0" dirty="0"/>
-              <a:t> / Multi-instrument Inter-process (minus the)-with Eye Trackers-</a:t>
-            </a:r>
             <a:endParaRPr lang="en-CA" dirty="0"/>
           </a:p>
         </p:txBody>
@@ -591,6 +585,7 @@
           <a:p>
             <a:fld id="{8F20841C-25C9-4C0C-A7FA-C4A363D14F5A}" type="slidenum">
               <a:rPr lang="en-CA" smtClean="0"/>
+              <a:pPr/>
               <a:t>1</a:t>
             </a:fld>
             <a:endParaRPr lang="en-CA"/>
@@ -600,7 +595,7 @@
     </p:spTree>
     <p:extLst>
       <p:ext uri="{BB962C8B-B14F-4D97-AF65-F5344CB8AC3E}">
-        <p14:creationId xmlns:p14="http://schemas.microsoft.com/office/powerpoint/2010/main" val="2340334442"/>
+        <p14:creationId xmlns:p14="http://schemas.microsoft.com/office/powerpoint/2010/main" xmlns="" val="2340334442"/>
       </p:ext>
     </p:extLst>
   </p:cSld>
@@ -675,6 +670,7 @@
           <a:p>
             <a:fld id="{8F20841C-25C9-4C0C-A7FA-C4A363D14F5A}" type="slidenum">
               <a:rPr lang="en-CA" smtClean="0"/>
+              <a:pPr/>
               <a:t>19</a:t>
             </a:fld>
             <a:endParaRPr lang="en-CA"/>
@@ -684,7 +680,7 @@
     </p:spTree>
     <p:extLst>
       <p:ext uri="{BB962C8B-B14F-4D97-AF65-F5344CB8AC3E}">
-        <p14:creationId xmlns:p14="http://schemas.microsoft.com/office/powerpoint/2010/main" val="1863914651"/>
+        <p14:creationId xmlns:p14="http://schemas.microsoft.com/office/powerpoint/2010/main" xmlns="" val="1863914651"/>
       </p:ext>
     </p:extLst>
   </p:cSld>
@@ -878,6 +874,7 @@
           <a:p>
             <a:fld id="{5174927E-2439-42C0-9720-7BBCA09BF46F}" type="slidenum">
               <a:rPr lang="en-CA" smtClean="0"/>
+              <a:pPr/>
               <a:t>‹#›</a:t>
             </a:fld>
             <a:endParaRPr lang="en-CA"/>
@@ -887,7 +884,7 @@
     </p:spTree>
     <p:extLst>
       <p:ext uri="{BB962C8B-B14F-4D97-AF65-F5344CB8AC3E}">
-        <p14:creationId xmlns:p14="http://schemas.microsoft.com/office/powerpoint/2010/main" val="1900560834"/>
+        <p14:creationId xmlns:p14="http://schemas.microsoft.com/office/powerpoint/2010/main" xmlns="" val="1900560834"/>
       </p:ext>
     </p:extLst>
   </p:cSld>
@@ -1051,6 +1048,7 @@
           <a:p>
             <a:fld id="{5174927E-2439-42C0-9720-7BBCA09BF46F}" type="slidenum">
               <a:rPr lang="en-CA" smtClean="0"/>
+              <a:pPr/>
               <a:t>‹#›</a:t>
             </a:fld>
             <a:endParaRPr lang="en-CA"/>
@@ -1060,7 +1058,7 @@
     </p:spTree>
     <p:extLst>
       <p:ext uri="{BB962C8B-B14F-4D97-AF65-F5344CB8AC3E}">
-        <p14:creationId xmlns:p14="http://schemas.microsoft.com/office/powerpoint/2010/main" val="3722958745"/>
+        <p14:creationId xmlns:p14="http://schemas.microsoft.com/office/powerpoint/2010/main" xmlns="" val="3722958745"/>
       </p:ext>
     </p:extLst>
   </p:cSld>
@@ -1296,7 +1294,7 @@
     </p:spTree>
     <p:extLst>
       <p:ext uri="{BB962C8B-B14F-4D97-AF65-F5344CB8AC3E}">
-        <p14:creationId xmlns:p14="http://schemas.microsoft.com/office/powerpoint/2010/main" val="1822376042"/>
+        <p14:creationId xmlns:p14="http://schemas.microsoft.com/office/powerpoint/2010/main" xmlns="" val="1822376042"/>
       </p:ext>
     </p:extLst>
   </p:cSld>
@@ -1536,6 +1534,7 @@
           <a:p>
             <a:fld id="{5174927E-2439-42C0-9720-7BBCA09BF46F}" type="slidenum">
               <a:rPr lang="en-CA" smtClean="0"/>
+              <a:pPr/>
               <a:t>‹#›</a:t>
             </a:fld>
             <a:endParaRPr lang="en-CA"/>
@@ -1545,7 +1544,7 @@
     </p:spTree>
     <p:extLst>
       <p:ext uri="{BB962C8B-B14F-4D97-AF65-F5344CB8AC3E}">
-        <p14:creationId xmlns:p14="http://schemas.microsoft.com/office/powerpoint/2010/main" val="3411672561"/>
+        <p14:creationId xmlns:p14="http://schemas.microsoft.com/office/powerpoint/2010/main" xmlns="" val="3411672561"/>
       </p:ext>
     </p:extLst>
   </p:cSld>
@@ -1771,6 +1770,7 @@
           <a:p>
             <a:fld id="{5174927E-2439-42C0-9720-7BBCA09BF46F}" type="slidenum">
               <a:rPr lang="en-CA" smtClean="0"/>
+              <a:pPr/>
               <a:t>‹#›</a:t>
             </a:fld>
             <a:endParaRPr lang="en-CA"/>
@@ -1780,7 +1780,7 @@
     </p:spTree>
     <p:extLst>
       <p:ext uri="{BB962C8B-B14F-4D97-AF65-F5344CB8AC3E}">
-        <p14:creationId xmlns:p14="http://schemas.microsoft.com/office/powerpoint/2010/main" val="1093008526"/>
+        <p14:creationId xmlns:p14="http://schemas.microsoft.com/office/powerpoint/2010/main" xmlns="" val="1093008526"/>
       </p:ext>
     </p:extLst>
   </p:cSld>
@@ -2141,6 +2141,7 @@
           <a:p>
             <a:fld id="{5174927E-2439-42C0-9720-7BBCA09BF46F}" type="slidenum">
               <a:rPr lang="en-CA" smtClean="0"/>
+              <a:pPr/>
               <a:t>‹#›</a:t>
             </a:fld>
             <a:endParaRPr lang="en-CA"/>
@@ -2150,7 +2151,7 @@
     </p:spTree>
     <p:extLst>
       <p:ext uri="{BB962C8B-B14F-4D97-AF65-F5344CB8AC3E}">
-        <p14:creationId xmlns:p14="http://schemas.microsoft.com/office/powerpoint/2010/main" val="1087924878"/>
+        <p14:creationId xmlns:p14="http://schemas.microsoft.com/office/powerpoint/2010/main" xmlns="" val="1087924878"/>
       </p:ext>
     </p:extLst>
   </p:cSld>
@@ -2262,6 +2263,7 @@
           <a:p>
             <a:fld id="{5174927E-2439-42C0-9720-7BBCA09BF46F}" type="slidenum">
               <a:rPr lang="en-CA" smtClean="0"/>
+              <a:pPr/>
               <a:t>‹#›</a:t>
             </a:fld>
             <a:endParaRPr lang="en-CA"/>
@@ -2271,7 +2273,7 @@
     </p:spTree>
     <p:extLst>
       <p:ext uri="{BB962C8B-B14F-4D97-AF65-F5344CB8AC3E}">
-        <p14:creationId xmlns:p14="http://schemas.microsoft.com/office/powerpoint/2010/main" val="3802387408"/>
+        <p14:creationId xmlns:p14="http://schemas.microsoft.com/office/powerpoint/2010/main" xmlns="" val="3802387408"/>
       </p:ext>
     </p:extLst>
   </p:cSld>
@@ -2360,6 +2362,7 @@
           <a:p>
             <a:fld id="{5174927E-2439-42C0-9720-7BBCA09BF46F}" type="slidenum">
               <a:rPr lang="en-CA" smtClean="0"/>
+              <a:pPr/>
               <a:t>‹#›</a:t>
             </a:fld>
             <a:endParaRPr lang="en-CA"/>
@@ -2369,7 +2372,7 @@
     </p:spTree>
     <p:extLst>
       <p:ext uri="{BB962C8B-B14F-4D97-AF65-F5344CB8AC3E}">
-        <p14:creationId xmlns:p14="http://schemas.microsoft.com/office/powerpoint/2010/main" val="4234091411"/>
+        <p14:creationId xmlns:p14="http://schemas.microsoft.com/office/powerpoint/2010/main" xmlns="" val="4234091411"/>
       </p:ext>
     </p:extLst>
   </p:cSld>
@@ -2640,6 +2643,7 @@
           <a:p>
             <a:fld id="{5174927E-2439-42C0-9720-7BBCA09BF46F}" type="slidenum">
               <a:rPr lang="en-CA" smtClean="0"/>
+              <a:pPr/>
               <a:t>‹#›</a:t>
             </a:fld>
             <a:endParaRPr lang="en-CA"/>
@@ -2649,7 +2653,7 @@
     </p:spTree>
     <p:extLst>
       <p:ext uri="{BB962C8B-B14F-4D97-AF65-F5344CB8AC3E}">
-        <p14:creationId xmlns:p14="http://schemas.microsoft.com/office/powerpoint/2010/main" val="4189422420"/>
+        <p14:creationId xmlns:p14="http://schemas.microsoft.com/office/powerpoint/2010/main" xmlns="" val="4189422420"/>
       </p:ext>
     </p:extLst>
   </p:cSld>
@@ -2896,6 +2900,7 @@
           <a:p>
             <a:fld id="{5174927E-2439-42C0-9720-7BBCA09BF46F}" type="slidenum">
               <a:rPr lang="en-CA" smtClean="0"/>
+              <a:pPr/>
               <a:t>‹#›</a:t>
             </a:fld>
             <a:endParaRPr lang="en-CA"/>
@@ -2905,7 +2910,7 @@
     </p:spTree>
     <p:extLst>
       <p:ext uri="{BB962C8B-B14F-4D97-AF65-F5344CB8AC3E}">
-        <p14:creationId xmlns:p14="http://schemas.microsoft.com/office/powerpoint/2010/main" val="3252977898"/>
+        <p14:creationId xmlns:p14="http://schemas.microsoft.com/office/powerpoint/2010/main" xmlns="" val="3252977898"/>
       </p:ext>
     </p:extLst>
   </p:cSld>
@@ -3171,10 +3176,10 @@
           <p:nvPr userDrawn="1"/>
         </p:nvPicPr>
         <p:blipFill>
-          <a:blip r:embed="rId13">
+          <a:blip r:embed="rId13" cstate="print">
             <a:extLst>
               <a:ext uri="{28A0092B-C50C-407E-A947-70E740481C1C}">
-                <a14:useLocalDpi xmlns:a14="http://schemas.microsoft.com/office/drawing/2010/main" val="0"/>
+                <a14:useLocalDpi xmlns:a14="http://schemas.microsoft.com/office/drawing/2010/main" xmlns="" val="0"/>
               </a:ext>
             </a:extLst>
           </a:blip>
@@ -3195,7 +3200,7 @@
     </p:spTree>
     <p:extLst>
       <p:ext uri="{BB962C8B-B14F-4D97-AF65-F5344CB8AC3E}">
-        <p14:creationId xmlns:p14="http://schemas.microsoft.com/office/powerpoint/2010/main" val="4230061028"/>
+        <p14:creationId xmlns:p14="http://schemas.microsoft.com/office/powerpoint/2010/main" xmlns="" val="4230061028"/>
       </p:ext>
     </p:extLst>
   </p:cSld>
@@ -3647,7 +3652,7 @@
           <p:cNvPr id="13" name="Picture 8" descr="http://osiris.ubishops.ca/~alussier/images/transparentlogo_bu.png">
             <a:extLst>
               <a:ext uri="{FF2B5EF4-FFF2-40B4-BE49-F238E27FC236}">
-                <a16:creationId xmlns:a16="http://schemas.microsoft.com/office/drawing/2014/main" id="{CCB9A035-2F1C-4B96-A5DB-70B72D6E4AD8}"/>
+                <a16:creationId xmlns:a16="http://schemas.microsoft.com/office/drawing/2014/main" xmlns="" id="{CCB9A035-2F1C-4B96-A5DB-70B72D6E4AD8}"/>
               </a:ext>
             </a:extLst>
           </p:cNvPr>
@@ -3657,10 +3662,10 @@
           <p:nvPr/>
         </p:nvPicPr>
         <p:blipFill>
-          <a:blip r:embed="rId3">
+          <a:blip r:embed="rId3" cstate="print">
             <a:extLst>
               <a:ext uri="{28A0092B-C50C-407E-A947-70E740481C1C}">
-                <a14:useLocalDpi xmlns:a14="http://schemas.microsoft.com/office/drawing/2010/main" val="0"/>
+                <a14:useLocalDpi xmlns:a14="http://schemas.microsoft.com/office/drawing/2010/main" xmlns="" val="0"/>
               </a:ext>
             </a:extLst>
           </a:blip>
@@ -3680,7 +3685,7 @@
           <a:noFill/>
           <a:extLst>
             <a:ext uri="{909E8E84-426E-40DD-AFC4-6F175D3DCCD1}">
-              <a14:hiddenFill xmlns:a14="http://schemas.microsoft.com/office/drawing/2010/main">
+              <a14:hiddenFill xmlns:a14="http://schemas.microsoft.com/office/drawing/2010/main" xmlns="">
                 <a:solidFill>
                   <a:srgbClr val="FFFFFF"/>
                 </a:solidFill>
@@ -3692,7 +3697,7 @@
     </p:spTree>
     <p:extLst>
       <p:ext uri="{BB962C8B-B14F-4D97-AF65-F5344CB8AC3E}">
-        <p14:creationId xmlns:p14="http://schemas.microsoft.com/office/powerpoint/2010/main" val="4177077622"/>
+        <p14:creationId xmlns:p14="http://schemas.microsoft.com/office/powerpoint/2010/main" xmlns="" val="4177077622"/>
       </p:ext>
     </p:extLst>
   </p:cSld>
@@ -3775,28 +3780,6 @@
       </p:sp>
       <p:sp>
         <p:nvSpPr>
-          <p:cNvPr id="6" name="Date Placeholder 5"/>
-          <p:cNvSpPr>
-            <a:spLocks noGrp="1"/>
-          </p:cNvSpPr>
-          <p:nvPr>
-            <p:ph type="dt" sz="half" idx="2"/>
-          </p:nvPr>
-        </p:nvSpPr>
-        <p:spPr/>
-        <p:txBody>
-          <a:bodyPr/>
-          <a:lstStyle/>
-          <a:p>
-            <a:r>
-              <a:rPr lang="en-CA" dirty="0"/>
-              <a:t>Winter 2022</a:t>
-            </a:r>
-          </a:p>
-        </p:txBody>
-      </p:sp>
-      <p:sp>
-        <p:nvSpPr>
           <p:cNvPr id="10" name="Footer Placeholder 9"/>
           <p:cNvSpPr>
             <a:spLocks noGrp="1"/>
@@ -3849,7 +3832,7 @@
           <p:cNvPr id="15" name="Picture 14">
             <a:extLst>
               <a:ext uri="{FF2B5EF4-FFF2-40B4-BE49-F238E27FC236}">
-                <a16:creationId xmlns:a16="http://schemas.microsoft.com/office/drawing/2014/main" id="{61C04142-3366-49EB-9FEC-88FF5368D17D}"/>
+                <a16:creationId xmlns:a16="http://schemas.microsoft.com/office/drawing/2014/main" xmlns="" id="{61C04142-3366-49EB-9FEC-88FF5368D17D}"/>
               </a:ext>
             </a:extLst>
           </p:cNvPr>
@@ -3859,13 +3842,13 @@
           <p:nvPr/>
         </p:nvPicPr>
         <p:blipFill>
-          <a:blip r:embed="rId2">
+          <a:blip r:embed="rId2" cstate="print">
             <a:extLst>
               <a:ext uri="{28A0092B-C50C-407E-A947-70E740481C1C}">
-                <a14:useLocalDpi xmlns:a14="http://schemas.microsoft.com/office/drawing/2010/main" val="0"/>
+                <a14:useLocalDpi xmlns:a14="http://schemas.microsoft.com/office/drawing/2010/main" xmlns="" val="0"/>
               </a:ext>
               <a:ext uri="{837473B0-CC2E-450A-ABE3-18F120FF3D39}">
-                <a1611:picAttrSrcUrl xmlns:a1611="http://schemas.microsoft.com/office/drawing/2016/11/main" r:id="rId3"/>
+                <a1611:picAttrSrcUrl xmlns:a1611="http://schemas.microsoft.com/office/drawing/2016/11/main" xmlns="" r:id="rId3"/>
               </a:ext>
             </a:extLst>
           </a:blip>
@@ -3888,7 +3871,7 @@
           <p:cNvPr id="4" name="TextBox 3">
             <a:extLst>
               <a:ext uri="{FF2B5EF4-FFF2-40B4-BE49-F238E27FC236}">
-                <a16:creationId xmlns:a16="http://schemas.microsoft.com/office/drawing/2014/main" id="{065F8F52-C484-420F-8838-9BA9EB24F06F}"/>
+                <a16:creationId xmlns:a16="http://schemas.microsoft.com/office/drawing/2014/main" xmlns="" id="{065F8F52-C484-420F-8838-9BA9EB24F06F}"/>
               </a:ext>
             </a:extLst>
           </p:cNvPr>
@@ -3923,7 +3906,7 @@
           <p:cNvPr id="14" name="TextBox 13">
             <a:extLst>
               <a:ext uri="{FF2B5EF4-FFF2-40B4-BE49-F238E27FC236}">
-                <a16:creationId xmlns:a16="http://schemas.microsoft.com/office/drawing/2014/main" id="{545FB07B-3C17-49FB-8188-00D3D635E234}"/>
+                <a16:creationId xmlns:a16="http://schemas.microsoft.com/office/drawing/2014/main" xmlns="" id="{545FB07B-3C17-49FB-8188-00D3D635E234}"/>
               </a:ext>
             </a:extLst>
           </p:cNvPr>
@@ -3958,7 +3941,7 @@
           <p:cNvPr id="16" name="TextBox 15">
             <a:extLst>
               <a:ext uri="{FF2B5EF4-FFF2-40B4-BE49-F238E27FC236}">
-                <a16:creationId xmlns:a16="http://schemas.microsoft.com/office/drawing/2014/main" id="{FE719AD3-1761-492D-823C-0AA513693A5E}"/>
+                <a16:creationId xmlns:a16="http://schemas.microsoft.com/office/drawing/2014/main" xmlns="" id="{FE719AD3-1761-492D-823C-0AA513693A5E}"/>
               </a:ext>
             </a:extLst>
           </p:cNvPr>
@@ -3993,7 +3976,7 @@
           <p:cNvPr id="17" name="TextBox 16">
             <a:extLst>
               <a:ext uri="{FF2B5EF4-FFF2-40B4-BE49-F238E27FC236}">
-                <a16:creationId xmlns:a16="http://schemas.microsoft.com/office/drawing/2014/main" id="{0AECDDDD-9C69-4208-AA1C-905C5B95F22C}"/>
+                <a16:creationId xmlns:a16="http://schemas.microsoft.com/office/drawing/2014/main" xmlns="" id="{0AECDDDD-9C69-4208-AA1C-905C5B95F22C}"/>
               </a:ext>
             </a:extLst>
           </p:cNvPr>
@@ -4028,7 +4011,7 @@
           <p:cNvPr id="8" name="Straight Arrow Connector 7">
             <a:extLst>
               <a:ext uri="{FF2B5EF4-FFF2-40B4-BE49-F238E27FC236}">
-                <a16:creationId xmlns:a16="http://schemas.microsoft.com/office/drawing/2014/main" id="{8DDBEF33-54E1-493E-BF2F-6C758455DB2F}"/>
+                <a16:creationId xmlns:a16="http://schemas.microsoft.com/office/drawing/2014/main" xmlns="" id="{8DDBEF33-54E1-493E-BF2F-6C758455DB2F}"/>
               </a:ext>
             </a:extLst>
           </p:cNvPr>
@@ -4073,7 +4056,7 @@
           <p:cNvPr id="18" name="Straight Arrow Connector 17">
             <a:extLst>
               <a:ext uri="{FF2B5EF4-FFF2-40B4-BE49-F238E27FC236}">
-                <a16:creationId xmlns:a16="http://schemas.microsoft.com/office/drawing/2014/main" id="{F1E47557-78F8-4490-9DC2-B232D55FD35C}"/>
+                <a16:creationId xmlns:a16="http://schemas.microsoft.com/office/drawing/2014/main" xmlns="" id="{F1E47557-78F8-4490-9DC2-B232D55FD35C}"/>
               </a:ext>
             </a:extLst>
           </p:cNvPr>
@@ -4117,7 +4100,7 @@
           <p:cNvPr id="22" name="Straight Arrow Connector 21">
             <a:extLst>
               <a:ext uri="{FF2B5EF4-FFF2-40B4-BE49-F238E27FC236}">
-                <a16:creationId xmlns:a16="http://schemas.microsoft.com/office/drawing/2014/main" id="{54728F14-6E5A-45E2-AC4A-EFD14011F60B}"/>
+                <a16:creationId xmlns:a16="http://schemas.microsoft.com/office/drawing/2014/main" xmlns="" id="{54728F14-6E5A-45E2-AC4A-EFD14011F60B}"/>
               </a:ext>
             </a:extLst>
           </p:cNvPr>
@@ -4162,7 +4145,7 @@
           <p:cNvPr id="25" name="Straight Arrow Connector 24">
             <a:extLst>
               <a:ext uri="{FF2B5EF4-FFF2-40B4-BE49-F238E27FC236}">
-                <a16:creationId xmlns:a16="http://schemas.microsoft.com/office/drawing/2014/main" id="{D54D66D9-20DA-42BE-9E8F-546A8ED2AA32}"/>
+                <a16:creationId xmlns:a16="http://schemas.microsoft.com/office/drawing/2014/main" xmlns="" id="{D54D66D9-20DA-42BE-9E8F-546A8ED2AA32}"/>
               </a:ext>
             </a:extLst>
           </p:cNvPr>
@@ -4207,7 +4190,7 @@
           <p:cNvPr id="27" name="Straight Arrow Connector 26">
             <a:extLst>
               <a:ext uri="{FF2B5EF4-FFF2-40B4-BE49-F238E27FC236}">
-                <a16:creationId xmlns:a16="http://schemas.microsoft.com/office/drawing/2014/main" id="{104F6FC2-E13D-4097-9667-8F4A154A8D80}"/>
+                <a16:creationId xmlns:a16="http://schemas.microsoft.com/office/drawing/2014/main" xmlns="" id="{104F6FC2-E13D-4097-9667-8F4A154A8D80}"/>
               </a:ext>
             </a:extLst>
           </p:cNvPr>
@@ -4251,7 +4234,7 @@
           <p:cNvPr id="28" name="Straight Arrow Connector 27">
             <a:extLst>
               <a:ext uri="{FF2B5EF4-FFF2-40B4-BE49-F238E27FC236}">
-                <a16:creationId xmlns:a16="http://schemas.microsoft.com/office/drawing/2014/main" id="{29780F90-A07F-4BB0-9F2F-AAC340DC9D38}"/>
+                <a16:creationId xmlns:a16="http://schemas.microsoft.com/office/drawing/2014/main" xmlns="" id="{29780F90-A07F-4BB0-9F2F-AAC340DC9D38}"/>
               </a:ext>
             </a:extLst>
           </p:cNvPr>
@@ -4295,7 +4278,7 @@
           <p:cNvPr id="31" name="TextBox 30">
             <a:extLst>
               <a:ext uri="{FF2B5EF4-FFF2-40B4-BE49-F238E27FC236}">
-                <a16:creationId xmlns:a16="http://schemas.microsoft.com/office/drawing/2014/main" id="{4C6058E9-F453-4FCC-9697-02D88A979F2A}"/>
+                <a16:creationId xmlns:a16="http://schemas.microsoft.com/office/drawing/2014/main" xmlns="" id="{4C6058E9-F453-4FCC-9697-02D88A979F2A}"/>
               </a:ext>
             </a:extLst>
           </p:cNvPr>
@@ -4331,7 +4314,7 @@
           <p:cNvPr id="32" name="TextBox 31">
             <a:extLst>
               <a:ext uri="{FF2B5EF4-FFF2-40B4-BE49-F238E27FC236}">
-                <a16:creationId xmlns:a16="http://schemas.microsoft.com/office/drawing/2014/main" id="{78EDB91B-C071-4D7E-B239-6F5257BFA37A}"/>
+                <a16:creationId xmlns:a16="http://schemas.microsoft.com/office/drawing/2014/main" xmlns="" id="{78EDB91B-C071-4D7E-B239-6F5257BFA37A}"/>
               </a:ext>
             </a:extLst>
           </p:cNvPr>
@@ -4367,7 +4350,7 @@
           <p:cNvPr id="19" name="Group 18">
             <a:extLst>
               <a:ext uri="{FF2B5EF4-FFF2-40B4-BE49-F238E27FC236}">
-                <a16:creationId xmlns:a16="http://schemas.microsoft.com/office/drawing/2014/main" id="{6F513CEE-2FED-431E-B171-29AD4FD8073D}"/>
+                <a16:creationId xmlns:a16="http://schemas.microsoft.com/office/drawing/2014/main" xmlns="" id="{6F513CEE-2FED-431E-B171-29AD4FD8073D}"/>
               </a:ext>
             </a:extLst>
           </p:cNvPr>
@@ -4387,7 +4370,7 @@
             <p:cNvPr id="33" name="Straight Arrow Connector 32">
               <a:extLst>
                 <a:ext uri="{FF2B5EF4-FFF2-40B4-BE49-F238E27FC236}">
-                  <a16:creationId xmlns:a16="http://schemas.microsoft.com/office/drawing/2014/main" id="{760F0522-E927-4EF6-875E-2DADA29693AC}"/>
+                  <a16:creationId xmlns:a16="http://schemas.microsoft.com/office/drawing/2014/main" xmlns="" id="{760F0522-E927-4EF6-875E-2DADA29693AC}"/>
                 </a:ext>
               </a:extLst>
             </p:cNvPr>
@@ -4431,7 +4414,7 @@
             <p:cNvPr id="34" name="TextBox 33">
               <a:extLst>
                 <a:ext uri="{FF2B5EF4-FFF2-40B4-BE49-F238E27FC236}">
-                  <a16:creationId xmlns:a16="http://schemas.microsoft.com/office/drawing/2014/main" id="{E096BC95-CF89-477C-A149-CADD8535D70D}"/>
+                  <a16:creationId xmlns:a16="http://schemas.microsoft.com/office/drawing/2014/main" xmlns="" id="{E096BC95-CF89-477C-A149-CADD8535D70D}"/>
                 </a:ext>
               </a:extLst>
             </p:cNvPr>
@@ -4467,7 +4450,7 @@
             <p:cNvPr id="35" name="Straight Arrow Connector 34">
               <a:extLst>
                 <a:ext uri="{FF2B5EF4-FFF2-40B4-BE49-F238E27FC236}">
-                  <a16:creationId xmlns:a16="http://schemas.microsoft.com/office/drawing/2014/main" id="{16A5DB64-6D02-469B-8ECF-1AC120A06DE3}"/>
+                  <a16:creationId xmlns:a16="http://schemas.microsoft.com/office/drawing/2014/main" xmlns="" id="{16A5DB64-6D02-469B-8ECF-1AC120A06DE3}"/>
                 </a:ext>
               </a:extLst>
             </p:cNvPr>
@@ -4511,7 +4494,7 @@
             <p:cNvPr id="37" name="TextBox 36">
               <a:extLst>
                 <a:ext uri="{FF2B5EF4-FFF2-40B4-BE49-F238E27FC236}">
-                  <a16:creationId xmlns:a16="http://schemas.microsoft.com/office/drawing/2014/main" id="{85C4C53D-D5CB-4E7F-937C-C49212F44A70}"/>
+                  <a16:creationId xmlns:a16="http://schemas.microsoft.com/office/drawing/2014/main" xmlns="" id="{85C4C53D-D5CB-4E7F-937C-C49212F44A70}"/>
                 </a:ext>
               </a:extLst>
             </p:cNvPr>
@@ -4548,7 +4531,7 @@
           <p:cNvPr id="38" name="Straight Arrow Connector 37">
             <a:extLst>
               <a:ext uri="{FF2B5EF4-FFF2-40B4-BE49-F238E27FC236}">
-                <a16:creationId xmlns:a16="http://schemas.microsoft.com/office/drawing/2014/main" id="{5D867792-63F2-4767-BC8D-917B88AC05E1}"/>
+                <a16:creationId xmlns:a16="http://schemas.microsoft.com/office/drawing/2014/main" xmlns="" id="{5D867792-63F2-4767-BC8D-917B88AC05E1}"/>
               </a:ext>
             </a:extLst>
           </p:cNvPr>
@@ -4592,7 +4575,7 @@
           <p:cNvPr id="39" name="TextBox 38">
             <a:extLst>
               <a:ext uri="{FF2B5EF4-FFF2-40B4-BE49-F238E27FC236}">
-                <a16:creationId xmlns:a16="http://schemas.microsoft.com/office/drawing/2014/main" id="{94708DE2-B64C-48F4-8076-59A108D618A6}"/>
+                <a16:creationId xmlns:a16="http://schemas.microsoft.com/office/drawing/2014/main" xmlns="" id="{94708DE2-B64C-48F4-8076-59A108D618A6}"/>
               </a:ext>
             </a:extLst>
           </p:cNvPr>
@@ -4628,7 +4611,7 @@
           <p:cNvPr id="40" name="Straight Arrow Connector 39">
             <a:extLst>
               <a:ext uri="{FF2B5EF4-FFF2-40B4-BE49-F238E27FC236}">
-                <a16:creationId xmlns:a16="http://schemas.microsoft.com/office/drawing/2014/main" id="{5CA8617A-911B-4C68-B5F4-CED221D4F758}"/>
+                <a16:creationId xmlns:a16="http://schemas.microsoft.com/office/drawing/2014/main" xmlns="" id="{5CA8617A-911B-4C68-B5F4-CED221D4F758}"/>
               </a:ext>
             </a:extLst>
           </p:cNvPr>
@@ -4672,7 +4655,7 @@
           <p:cNvPr id="42" name="TextBox 41">
             <a:extLst>
               <a:ext uri="{FF2B5EF4-FFF2-40B4-BE49-F238E27FC236}">
-                <a16:creationId xmlns:a16="http://schemas.microsoft.com/office/drawing/2014/main" id="{10573C7C-31D3-4491-9B05-DACBB0B02145}"/>
+                <a16:creationId xmlns:a16="http://schemas.microsoft.com/office/drawing/2014/main" xmlns="" id="{10573C7C-31D3-4491-9B05-DACBB0B02145}"/>
               </a:ext>
             </a:extLst>
           </p:cNvPr>
@@ -4707,7 +4690,7 @@
           <p:cNvPr id="43" name="Straight Arrow Connector 42">
             <a:extLst>
               <a:ext uri="{FF2B5EF4-FFF2-40B4-BE49-F238E27FC236}">
-                <a16:creationId xmlns:a16="http://schemas.microsoft.com/office/drawing/2014/main" id="{BF01DE0F-75F5-4498-A057-FE68F1F8E4FB}"/>
+                <a16:creationId xmlns:a16="http://schemas.microsoft.com/office/drawing/2014/main" xmlns="" id="{BF01DE0F-75F5-4498-A057-FE68F1F8E4FB}"/>
               </a:ext>
             </a:extLst>
           </p:cNvPr>
@@ -4751,7 +4734,7 @@
           <p:cNvPr id="44" name="TextBox 43">
             <a:extLst>
               <a:ext uri="{FF2B5EF4-FFF2-40B4-BE49-F238E27FC236}">
-                <a16:creationId xmlns:a16="http://schemas.microsoft.com/office/drawing/2014/main" id="{21D961B1-8920-45A2-B7B6-24C52F68A83D}"/>
+                <a16:creationId xmlns:a16="http://schemas.microsoft.com/office/drawing/2014/main" xmlns="" id="{21D961B1-8920-45A2-B7B6-24C52F68A83D}"/>
               </a:ext>
             </a:extLst>
           </p:cNvPr>
@@ -4787,7 +4770,7 @@
           <p:cNvPr id="45" name="Straight Arrow Connector 44">
             <a:extLst>
               <a:ext uri="{FF2B5EF4-FFF2-40B4-BE49-F238E27FC236}">
-                <a16:creationId xmlns:a16="http://schemas.microsoft.com/office/drawing/2014/main" id="{C1FAEF9C-B2F6-4215-9812-69CE9F14BAFC}"/>
+                <a16:creationId xmlns:a16="http://schemas.microsoft.com/office/drawing/2014/main" xmlns="" id="{C1FAEF9C-B2F6-4215-9812-69CE9F14BAFC}"/>
               </a:ext>
             </a:extLst>
           </p:cNvPr>
@@ -4831,7 +4814,7 @@
           <p:cNvPr id="47" name="TextBox 46">
             <a:extLst>
               <a:ext uri="{FF2B5EF4-FFF2-40B4-BE49-F238E27FC236}">
-                <a16:creationId xmlns:a16="http://schemas.microsoft.com/office/drawing/2014/main" id="{5B05E545-DCBA-4D82-8B24-9CA55C349478}"/>
+                <a16:creationId xmlns:a16="http://schemas.microsoft.com/office/drawing/2014/main" xmlns="" id="{5B05E545-DCBA-4D82-8B24-9CA55C349478}"/>
               </a:ext>
             </a:extLst>
           </p:cNvPr>
@@ -4866,7 +4849,7 @@
           <p:cNvPr id="48" name="Straight Arrow Connector 47">
             <a:extLst>
               <a:ext uri="{FF2B5EF4-FFF2-40B4-BE49-F238E27FC236}">
-                <a16:creationId xmlns:a16="http://schemas.microsoft.com/office/drawing/2014/main" id="{3598B223-2123-426C-8451-717BE628A163}"/>
+                <a16:creationId xmlns:a16="http://schemas.microsoft.com/office/drawing/2014/main" xmlns="" id="{3598B223-2123-426C-8451-717BE628A163}"/>
               </a:ext>
             </a:extLst>
           </p:cNvPr>
@@ -4911,7 +4894,7 @@
           <p:cNvPr id="50" name="TextBox 49">
             <a:extLst>
               <a:ext uri="{FF2B5EF4-FFF2-40B4-BE49-F238E27FC236}">
-                <a16:creationId xmlns:a16="http://schemas.microsoft.com/office/drawing/2014/main" id="{548A5FC5-8E8D-4334-94CA-553E93958E21}"/>
+                <a16:creationId xmlns:a16="http://schemas.microsoft.com/office/drawing/2014/main" xmlns="" id="{548A5FC5-8E8D-4334-94CA-553E93958E21}"/>
               </a:ext>
             </a:extLst>
           </p:cNvPr>
@@ -4946,7 +4929,7 @@
           <p:cNvPr id="53" name="Straight Arrow Connector 52">
             <a:extLst>
               <a:ext uri="{FF2B5EF4-FFF2-40B4-BE49-F238E27FC236}">
-                <a16:creationId xmlns:a16="http://schemas.microsoft.com/office/drawing/2014/main" id="{90BB1FB3-601E-4C1C-B25F-639594D36DF0}"/>
+                <a16:creationId xmlns:a16="http://schemas.microsoft.com/office/drawing/2014/main" xmlns="" id="{90BB1FB3-601E-4C1C-B25F-639594D36DF0}"/>
               </a:ext>
             </a:extLst>
           </p:cNvPr>
@@ -4990,7 +4973,7 @@
           <p:cNvPr id="56" name="TextBox 55">
             <a:extLst>
               <a:ext uri="{FF2B5EF4-FFF2-40B4-BE49-F238E27FC236}">
-                <a16:creationId xmlns:a16="http://schemas.microsoft.com/office/drawing/2014/main" id="{126170BE-DBB8-41CA-A9D4-23D0210E7F14}"/>
+                <a16:creationId xmlns:a16="http://schemas.microsoft.com/office/drawing/2014/main" xmlns="" id="{126170BE-DBB8-41CA-A9D4-23D0210E7F14}"/>
               </a:ext>
             </a:extLst>
           </p:cNvPr>
@@ -5025,7 +5008,7 @@
           <p:cNvPr id="57" name="Straight Arrow Connector 56">
             <a:extLst>
               <a:ext uri="{FF2B5EF4-FFF2-40B4-BE49-F238E27FC236}">
-                <a16:creationId xmlns:a16="http://schemas.microsoft.com/office/drawing/2014/main" id="{B0C578F6-714B-4824-9ECE-5015FB620964}"/>
+                <a16:creationId xmlns:a16="http://schemas.microsoft.com/office/drawing/2014/main" xmlns="" id="{B0C578F6-714B-4824-9ECE-5015FB620964}"/>
               </a:ext>
             </a:extLst>
           </p:cNvPr>
@@ -5069,7 +5052,7 @@
           <p:cNvPr id="58" name="Straight Arrow Connector 57">
             <a:extLst>
               <a:ext uri="{FF2B5EF4-FFF2-40B4-BE49-F238E27FC236}">
-                <a16:creationId xmlns:a16="http://schemas.microsoft.com/office/drawing/2014/main" id="{850D419C-9C5F-43B0-9494-8C763B70C8D8}"/>
+                <a16:creationId xmlns:a16="http://schemas.microsoft.com/office/drawing/2014/main" xmlns="" id="{850D419C-9C5F-43B0-9494-8C763B70C8D8}"/>
               </a:ext>
             </a:extLst>
           </p:cNvPr>
@@ -5113,7 +5096,7 @@
           <p:cNvPr id="60" name="TextBox 59">
             <a:extLst>
               <a:ext uri="{FF2B5EF4-FFF2-40B4-BE49-F238E27FC236}">
-                <a16:creationId xmlns:a16="http://schemas.microsoft.com/office/drawing/2014/main" id="{00FCB261-BF63-40FC-B508-C6E3BDD9E269}"/>
+                <a16:creationId xmlns:a16="http://schemas.microsoft.com/office/drawing/2014/main" xmlns="" id="{00FCB261-BF63-40FC-B508-C6E3BDD9E269}"/>
               </a:ext>
             </a:extLst>
           </p:cNvPr>
@@ -5148,7 +5131,7 @@
           <p:cNvPr id="61" name="TextBox 60">
             <a:extLst>
               <a:ext uri="{FF2B5EF4-FFF2-40B4-BE49-F238E27FC236}">
-                <a16:creationId xmlns:a16="http://schemas.microsoft.com/office/drawing/2014/main" id="{9F61E270-C94A-40B7-A722-8E8BDDC11047}"/>
+                <a16:creationId xmlns:a16="http://schemas.microsoft.com/office/drawing/2014/main" xmlns="" id="{9F61E270-C94A-40B7-A722-8E8BDDC11047}"/>
               </a:ext>
             </a:extLst>
           </p:cNvPr>
@@ -5184,7 +5167,7 @@
           <p:cNvPr id="62" name="Straight Arrow Connector 61">
             <a:extLst>
               <a:ext uri="{FF2B5EF4-FFF2-40B4-BE49-F238E27FC236}">
-                <a16:creationId xmlns:a16="http://schemas.microsoft.com/office/drawing/2014/main" id="{CFF82DD4-5FF5-4264-902D-D7599D1875D6}"/>
+                <a16:creationId xmlns:a16="http://schemas.microsoft.com/office/drawing/2014/main" xmlns="" id="{CFF82DD4-5FF5-4264-902D-D7599D1875D6}"/>
               </a:ext>
             </a:extLst>
           </p:cNvPr>
@@ -5228,7 +5211,7 @@
           <p:cNvPr id="63" name="Straight Arrow Connector 62">
             <a:extLst>
               <a:ext uri="{FF2B5EF4-FFF2-40B4-BE49-F238E27FC236}">
-                <a16:creationId xmlns:a16="http://schemas.microsoft.com/office/drawing/2014/main" id="{D0F66810-2AF9-4236-95FB-FFBF82C4FD8E}"/>
+                <a16:creationId xmlns:a16="http://schemas.microsoft.com/office/drawing/2014/main" xmlns="" id="{D0F66810-2AF9-4236-95FB-FFBF82C4FD8E}"/>
               </a:ext>
             </a:extLst>
           </p:cNvPr>
@@ -5272,7 +5255,7 @@
           <p:cNvPr id="65" name="TextBox 64">
             <a:extLst>
               <a:ext uri="{FF2B5EF4-FFF2-40B4-BE49-F238E27FC236}">
-                <a16:creationId xmlns:a16="http://schemas.microsoft.com/office/drawing/2014/main" id="{83B2A0EA-96AE-46DE-9582-415750498B5B}"/>
+                <a16:creationId xmlns:a16="http://schemas.microsoft.com/office/drawing/2014/main" xmlns="" id="{83B2A0EA-96AE-46DE-9582-415750498B5B}"/>
               </a:ext>
             </a:extLst>
           </p:cNvPr>
@@ -5308,7 +5291,7 @@
           <p:cNvPr id="66" name="TextBox 65">
             <a:extLst>
               <a:ext uri="{FF2B5EF4-FFF2-40B4-BE49-F238E27FC236}">
-                <a16:creationId xmlns:a16="http://schemas.microsoft.com/office/drawing/2014/main" id="{D520A455-DE89-4DDE-8FC6-85DD4E5E4D49}"/>
+                <a16:creationId xmlns:a16="http://schemas.microsoft.com/office/drawing/2014/main" xmlns="" id="{D520A455-DE89-4DDE-8FC6-85DD4E5E4D49}"/>
               </a:ext>
             </a:extLst>
           </p:cNvPr>
@@ -5344,7 +5327,7 @@
           <p:cNvPr id="46" name="TextBox 45">
             <a:extLst>
               <a:ext uri="{FF2B5EF4-FFF2-40B4-BE49-F238E27FC236}">
-                <a16:creationId xmlns:a16="http://schemas.microsoft.com/office/drawing/2014/main" id="{AED62D3E-1C93-4BB9-81AF-99B4E63BC8E3}"/>
+                <a16:creationId xmlns:a16="http://schemas.microsoft.com/office/drawing/2014/main" xmlns="" id="{AED62D3E-1C93-4BB9-81AF-99B4E63BC8E3}"/>
               </a:ext>
             </a:extLst>
           </p:cNvPr>
@@ -5381,7 +5364,7 @@
     </p:spTree>
     <p:extLst>
       <p:ext uri="{BB962C8B-B14F-4D97-AF65-F5344CB8AC3E}">
-        <p14:creationId xmlns:p14="http://schemas.microsoft.com/office/powerpoint/2010/main" val="2779966150"/>
+        <p14:creationId xmlns:p14="http://schemas.microsoft.com/office/powerpoint/2010/main" xmlns="" val="2779966150"/>
       </p:ext>
     </p:extLst>
   </p:cSld>
@@ -5413,7 +5396,7 @@
           <p:cNvPr id="7" name="Picture 6">
             <a:extLst>
               <a:ext uri="{FF2B5EF4-FFF2-40B4-BE49-F238E27FC236}">
-                <a16:creationId xmlns:a16="http://schemas.microsoft.com/office/drawing/2014/main" id="{CBE07435-6B16-411D-BE0D-FB61038A8F09}"/>
+                <a16:creationId xmlns:a16="http://schemas.microsoft.com/office/drawing/2014/main" xmlns="" id="{CBE07435-6B16-411D-BE0D-FB61038A8F09}"/>
               </a:ext>
             </a:extLst>
           </p:cNvPr>
@@ -5423,13 +5406,13 @@
           <p:nvPr/>
         </p:nvPicPr>
         <p:blipFill>
-          <a:blip r:embed="rId2">
+          <a:blip r:embed="rId2" cstate="print">
             <a:extLst>
               <a:ext uri="{28A0092B-C50C-407E-A947-70E740481C1C}">
-                <a14:useLocalDpi xmlns:a14="http://schemas.microsoft.com/office/drawing/2010/main" val="0"/>
+                <a14:useLocalDpi xmlns:a14="http://schemas.microsoft.com/office/drawing/2010/main" xmlns="" val="0"/>
               </a:ext>
               <a:ext uri="{837473B0-CC2E-450A-ABE3-18F120FF3D39}">
-                <a1611:picAttrSrcUrl xmlns:a1611="http://schemas.microsoft.com/office/drawing/2016/11/main" r:id="rId3"/>
+                <a1611:picAttrSrcUrl xmlns:a1611="http://schemas.microsoft.com/office/drawing/2016/11/main" xmlns="" r:id="rId3"/>
               </a:ext>
             </a:extLst>
           </a:blip>
@@ -5503,28 +5486,6 @@
       </p:sp>
       <p:sp>
         <p:nvSpPr>
-          <p:cNvPr id="6" name="Date Placeholder 5"/>
-          <p:cNvSpPr>
-            <a:spLocks noGrp="1"/>
-          </p:cNvSpPr>
-          <p:nvPr>
-            <p:ph type="dt" sz="half" idx="2"/>
-          </p:nvPr>
-        </p:nvSpPr>
-        <p:spPr/>
-        <p:txBody>
-          <a:bodyPr/>
-          <a:lstStyle/>
-          <a:p>
-            <a:r>
-              <a:rPr lang="en-CA" dirty="0"/>
-              <a:t>Winter 2022</a:t>
-            </a:r>
-          </a:p>
-        </p:txBody>
-      </p:sp>
-      <p:sp>
-        <p:nvSpPr>
           <p:cNvPr id="10" name="Footer Placeholder 9"/>
           <p:cNvSpPr>
             <a:spLocks noGrp="1"/>
@@ -5577,7 +5538,7 @@
           <p:cNvPr id="4" name="TextBox 3">
             <a:extLst>
               <a:ext uri="{FF2B5EF4-FFF2-40B4-BE49-F238E27FC236}">
-                <a16:creationId xmlns:a16="http://schemas.microsoft.com/office/drawing/2014/main" id="{065F8F52-C484-420F-8838-9BA9EB24F06F}"/>
+                <a16:creationId xmlns:a16="http://schemas.microsoft.com/office/drawing/2014/main" xmlns="" id="{065F8F52-C484-420F-8838-9BA9EB24F06F}"/>
               </a:ext>
             </a:extLst>
           </p:cNvPr>
@@ -5612,7 +5573,7 @@
           <p:cNvPr id="14" name="TextBox 13">
             <a:extLst>
               <a:ext uri="{FF2B5EF4-FFF2-40B4-BE49-F238E27FC236}">
-                <a16:creationId xmlns:a16="http://schemas.microsoft.com/office/drawing/2014/main" id="{545FB07B-3C17-49FB-8188-00D3D635E234}"/>
+                <a16:creationId xmlns:a16="http://schemas.microsoft.com/office/drawing/2014/main" xmlns="" id="{545FB07B-3C17-49FB-8188-00D3D635E234}"/>
               </a:ext>
             </a:extLst>
           </p:cNvPr>
@@ -5648,7 +5609,7 @@
           <p:cNvPr id="16" name="TextBox 15">
             <a:extLst>
               <a:ext uri="{FF2B5EF4-FFF2-40B4-BE49-F238E27FC236}">
-                <a16:creationId xmlns:a16="http://schemas.microsoft.com/office/drawing/2014/main" id="{FE719AD3-1761-492D-823C-0AA513693A5E}"/>
+                <a16:creationId xmlns:a16="http://schemas.microsoft.com/office/drawing/2014/main" xmlns="" id="{FE719AD3-1761-492D-823C-0AA513693A5E}"/>
               </a:ext>
             </a:extLst>
           </p:cNvPr>
@@ -5683,7 +5644,7 @@
           <p:cNvPr id="18" name="Straight Arrow Connector 17">
             <a:extLst>
               <a:ext uri="{FF2B5EF4-FFF2-40B4-BE49-F238E27FC236}">
-                <a16:creationId xmlns:a16="http://schemas.microsoft.com/office/drawing/2014/main" id="{F1E47557-78F8-4490-9DC2-B232D55FD35C}"/>
+                <a16:creationId xmlns:a16="http://schemas.microsoft.com/office/drawing/2014/main" xmlns="" id="{F1E47557-78F8-4490-9DC2-B232D55FD35C}"/>
               </a:ext>
             </a:extLst>
           </p:cNvPr>
@@ -5727,7 +5688,7 @@
           <p:cNvPr id="22" name="Straight Arrow Connector 21">
             <a:extLst>
               <a:ext uri="{FF2B5EF4-FFF2-40B4-BE49-F238E27FC236}">
-                <a16:creationId xmlns:a16="http://schemas.microsoft.com/office/drawing/2014/main" id="{54728F14-6E5A-45E2-AC4A-EFD14011F60B}"/>
+                <a16:creationId xmlns:a16="http://schemas.microsoft.com/office/drawing/2014/main" xmlns="" id="{54728F14-6E5A-45E2-AC4A-EFD14011F60B}"/>
               </a:ext>
             </a:extLst>
           </p:cNvPr>
@@ -5772,7 +5733,7 @@
           <p:cNvPr id="25" name="Straight Arrow Connector 24">
             <a:extLst>
               <a:ext uri="{FF2B5EF4-FFF2-40B4-BE49-F238E27FC236}">
-                <a16:creationId xmlns:a16="http://schemas.microsoft.com/office/drawing/2014/main" id="{D54D66D9-20DA-42BE-9E8F-546A8ED2AA32}"/>
+                <a16:creationId xmlns:a16="http://schemas.microsoft.com/office/drawing/2014/main" xmlns="" id="{D54D66D9-20DA-42BE-9E8F-546A8ED2AA32}"/>
               </a:ext>
             </a:extLst>
           </p:cNvPr>
@@ -5817,7 +5778,7 @@
           <p:cNvPr id="19" name="Group 18">
             <a:extLst>
               <a:ext uri="{FF2B5EF4-FFF2-40B4-BE49-F238E27FC236}">
-                <a16:creationId xmlns:a16="http://schemas.microsoft.com/office/drawing/2014/main" id="{6F513CEE-2FED-431E-B171-29AD4FD8073D}"/>
+                <a16:creationId xmlns:a16="http://schemas.microsoft.com/office/drawing/2014/main" xmlns="" id="{6F513CEE-2FED-431E-B171-29AD4FD8073D}"/>
               </a:ext>
             </a:extLst>
           </p:cNvPr>
@@ -5837,7 +5798,7 @@
             <p:cNvPr id="33" name="Straight Arrow Connector 32">
               <a:extLst>
                 <a:ext uri="{FF2B5EF4-FFF2-40B4-BE49-F238E27FC236}">
-                  <a16:creationId xmlns:a16="http://schemas.microsoft.com/office/drawing/2014/main" id="{760F0522-E927-4EF6-875E-2DADA29693AC}"/>
+                  <a16:creationId xmlns:a16="http://schemas.microsoft.com/office/drawing/2014/main" xmlns="" id="{760F0522-E927-4EF6-875E-2DADA29693AC}"/>
                 </a:ext>
               </a:extLst>
             </p:cNvPr>
@@ -5881,7 +5842,7 @@
             <p:cNvPr id="34" name="TextBox 33">
               <a:extLst>
                 <a:ext uri="{FF2B5EF4-FFF2-40B4-BE49-F238E27FC236}">
-                  <a16:creationId xmlns:a16="http://schemas.microsoft.com/office/drawing/2014/main" id="{E096BC95-CF89-477C-A149-CADD8535D70D}"/>
+                  <a16:creationId xmlns:a16="http://schemas.microsoft.com/office/drawing/2014/main" xmlns="" id="{E096BC95-CF89-477C-A149-CADD8535D70D}"/>
                 </a:ext>
               </a:extLst>
             </p:cNvPr>
@@ -5916,7 +5877,7 @@
             <p:cNvPr id="35" name="Straight Arrow Connector 34">
               <a:extLst>
                 <a:ext uri="{FF2B5EF4-FFF2-40B4-BE49-F238E27FC236}">
-                  <a16:creationId xmlns:a16="http://schemas.microsoft.com/office/drawing/2014/main" id="{16A5DB64-6D02-469B-8ECF-1AC120A06DE3}"/>
+                  <a16:creationId xmlns:a16="http://schemas.microsoft.com/office/drawing/2014/main" xmlns="" id="{16A5DB64-6D02-469B-8ECF-1AC120A06DE3}"/>
                 </a:ext>
               </a:extLst>
             </p:cNvPr>
@@ -5960,7 +5921,7 @@
             <p:cNvPr id="37" name="TextBox 36">
               <a:extLst>
                 <a:ext uri="{FF2B5EF4-FFF2-40B4-BE49-F238E27FC236}">
-                  <a16:creationId xmlns:a16="http://schemas.microsoft.com/office/drawing/2014/main" id="{85C4C53D-D5CB-4E7F-937C-C49212F44A70}"/>
+                  <a16:creationId xmlns:a16="http://schemas.microsoft.com/office/drawing/2014/main" xmlns="" id="{85C4C53D-D5CB-4E7F-937C-C49212F44A70}"/>
                 </a:ext>
               </a:extLst>
             </p:cNvPr>
@@ -5996,7 +5957,7 @@
           <p:cNvPr id="49" name="TextBox 48">
             <a:extLst>
               <a:ext uri="{FF2B5EF4-FFF2-40B4-BE49-F238E27FC236}">
-                <a16:creationId xmlns:a16="http://schemas.microsoft.com/office/drawing/2014/main" id="{AD4E479C-C7D3-4FA7-8EE4-DA3F6846CEBF}"/>
+                <a16:creationId xmlns:a16="http://schemas.microsoft.com/office/drawing/2014/main" xmlns="" id="{AD4E479C-C7D3-4FA7-8EE4-DA3F6846CEBF}"/>
               </a:ext>
             </a:extLst>
           </p:cNvPr>
@@ -6031,7 +5992,7 @@
           <p:cNvPr id="51" name="Straight Arrow Connector 50">
             <a:extLst>
               <a:ext uri="{FF2B5EF4-FFF2-40B4-BE49-F238E27FC236}">
-                <a16:creationId xmlns:a16="http://schemas.microsoft.com/office/drawing/2014/main" id="{B7A35247-303C-440E-9EF8-CFF4A62CB795}"/>
+                <a16:creationId xmlns:a16="http://schemas.microsoft.com/office/drawing/2014/main" xmlns="" id="{B7A35247-303C-440E-9EF8-CFF4A62CB795}"/>
               </a:ext>
             </a:extLst>
           </p:cNvPr>
@@ -6075,7 +6036,7 @@
           <p:cNvPr id="52" name="TextBox 51">
             <a:extLst>
               <a:ext uri="{FF2B5EF4-FFF2-40B4-BE49-F238E27FC236}">
-                <a16:creationId xmlns:a16="http://schemas.microsoft.com/office/drawing/2014/main" id="{D2456DF6-62CB-4E4B-B3FA-997F2B3B16E6}"/>
+                <a16:creationId xmlns:a16="http://schemas.microsoft.com/office/drawing/2014/main" xmlns="" id="{D2456DF6-62CB-4E4B-B3FA-997F2B3B16E6}"/>
               </a:ext>
             </a:extLst>
           </p:cNvPr>
@@ -6110,7 +6071,7 @@
           <p:cNvPr id="54" name="Straight Arrow Connector 53">
             <a:extLst>
               <a:ext uri="{FF2B5EF4-FFF2-40B4-BE49-F238E27FC236}">
-                <a16:creationId xmlns:a16="http://schemas.microsoft.com/office/drawing/2014/main" id="{1958F21B-DD9D-4F87-A9FC-CBF5255F1B3C}"/>
+                <a16:creationId xmlns:a16="http://schemas.microsoft.com/office/drawing/2014/main" xmlns="" id="{1958F21B-DD9D-4F87-A9FC-CBF5255F1B3C}"/>
               </a:ext>
             </a:extLst>
           </p:cNvPr>
@@ -6155,7 +6116,7 @@
           <p:cNvPr id="55" name="TextBox 54">
             <a:extLst>
               <a:ext uri="{FF2B5EF4-FFF2-40B4-BE49-F238E27FC236}">
-                <a16:creationId xmlns:a16="http://schemas.microsoft.com/office/drawing/2014/main" id="{E7E4DA4C-EC3A-4ACF-8EBB-A00C0F8FF55E}"/>
+                <a16:creationId xmlns:a16="http://schemas.microsoft.com/office/drawing/2014/main" xmlns="" id="{E7E4DA4C-EC3A-4ACF-8EBB-A00C0F8FF55E}"/>
               </a:ext>
             </a:extLst>
           </p:cNvPr>
@@ -6190,7 +6151,7 @@
           <p:cNvPr id="59" name="Straight Arrow Connector 58">
             <a:extLst>
               <a:ext uri="{FF2B5EF4-FFF2-40B4-BE49-F238E27FC236}">
-                <a16:creationId xmlns:a16="http://schemas.microsoft.com/office/drawing/2014/main" id="{0CC8607E-5F22-4E9F-A601-DE0D6E1F20A4}"/>
+                <a16:creationId xmlns:a16="http://schemas.microsoft.com/office/drawing/2014/main" xmlns="" id="{0CC8607E-5F22-4E9F-A601-DE0D6E1F20A4}"/>
               </a:ext>
             </a:extLst>
           </p:cNvPr>
@@ -6235,7 +6196,7 @@
           <p:cNvPr id="64" name="Straight Arrow Connector 63">
             <a:extLst>
               <a:ext uri="{FF2B5EF4-FFF2-40B4-BE49-F238E27FC236}">
-                <a16:creationId xmlns:a16="http://schemas.microsoft.com/office/drawing/2014/main" id="{71FB8733-BFA2-4CDB-98C3-F2442114AFB8}"/>
+                <a16:creationId xmlns:a16="http://schemas.microsoft.com/office/drawing/2014/main" xmlns="" id="{71FB8733-BFA2-4CDB-98C3-F2442114AFB8}"/>
               </a:ext>
             </a:extLst>
           </p:cNvPr>
@@ -6280,7 +6241,7 @@
           <p:cNvPr id="67" name="TextBox 66">
             <a:extLst>
               <a:ext uri="{FF2B5EF4-FFF2-40B4-BE49-F238E27FC236}">
-                <a16:creationId xmlns:a16="http://schemas.microsoft.com/office/drawing/2014/main" id="{DC0BFD13-F3B3-4BCC-8F72-4820D3CA3F2F}"/>
+                <a16:creationId xmlns:a16="http://schemas.microsoft.com/office/drawing/2014/main" xmlns="" id="{DC0BFD13-F3B3-4BCC-8F72-4820D3CA3F2F}"/>
               </a:ext>
             </a:extLst>
           </p:cNvPr>
@@ -6315,7 +6276,7 @@
           <p:cNvPr id="78" name="Group 77">
             <a:extLst>
               <a:ext uri="{FF2B5EF4-FFF2-40B4-BE49-F238E27FC236}">
-                <a16:creationId xmlns:a16="http://schemas.microsoft.com/office/drawing/2014/main" id="{B0D8A55A-C35F-4DD8-A7AC-42C2A2C91E9E}"/>
+                <a16:creationId xmlns:a16="http://schemas.microsoft.com/office/drawing/2014/main" xmlns="" id="{B0D8A55A-C35F-4DD8-A7AC-42C2A2C91E9E}"/>
               </a:ext>
             </a:extLst>
           </p:cNvPr>
@@ -6335,7 +6296,7 @@
             <p:cNvPr id="17" name="TextBox 16">
               <a:extLst>
                 <a:ext uri="{FF2B5EF4-FFF2-40B4-BE49-F238E27FC236}">
-                  <a16:creationId xmlns:a16="http://schemas.microsoft.com/office/drawing/2014/main" id="{0AECDDDD-9C69-4208-AA1C-905C5B95F22C}"/>
+                  <a16:creationId xmlns:a16="http://schemas.microsoft.com/office/drawing/2014/main" xmlns="" id="{0AECDDDD-9C69-4208-AA1C-905C5B95F22C}"/>
                 </a:ext>
               </a:extLst>
             </p:cNvPr>
@@ -6370,7 +6331,7 @@
             <p:cNvPr id="8" name="Straight Arrow Connector 7">
               <a:extLst>
                 <a:ext uri="{FF2B5EF4-FFF2-40B4-BE49-F238E27FC236}">
-                  <a16:creationId xmlns:a16="http://schemas.microsoft.com/office/drawing/2014/main" id="{8DDBEF33-54E1-493E-BF2F-6C758455DB2F}"/>
+                  <a16:creationId xmlns:a16="http://schemas.microsoft.com/office/drawing/2014/main" xmlns="" id="{8DDBEF33-54E1-493E-BF2F-6C758455DB2F}"/>
                 </a:ext>
               </a:extLst>
             </p:cNvPr>
@@ -6415,7 +6376,7 @@
             <p:cNvPr id="29" name="Group 28">
               <a:extLst>
                 <a:ext uri="{FF2B5EF4-FFF2-40B4-BE49-F238E27FC236}">
-                  <a16:creationId xmlns:a16="http://schemas.microsoft.com/office/drawing/2014/main" id="{E0A9ECB2-F47D-41E6-A396-253B7A4ED88E}"/>
+                  <a16:creationId xmlns:a16="http://schemas.microsoft.com/office/drawing/2014/main" xmlns="" id="{E0A9ECB2-F47D-41E6-A396-253B7A4ED88E}"/>
                 </a:ext>
               </a:extLst>
             </p:cNvPr>
@@ -6435,7 +6396,7 @@
               <p:cNvPr id="27" name="Straight Arrow Connector 26">
                 <a:extLst>
                   <a:ext uri="{FF2B5EF4-FFF2-40B4-BE49-F238E27FC236}">
-                    <a16:creationId xmlns:a16="http://schemas.microsoft.com/office/drawing/2014/main" id="{104F6FC2-E13D-4097-9667-8F4A154A8D80}"/>
+                    <a16:creationId xmlns:a16="http://schemas.microsoft.com/office/drawing/2014/main" xmlns="" id="{104F6FC2-E13D-4097-9667-8F4A154A8D80}"/>
                   </a:ext>
                 </a:extLst>
               </p:cNvPr>
@@ -6479,7 +6440,7 @@
               <p:cNvPr id="28" name="Straight Arrow Connector 27">
                 <a:extLst>
                   <a:ext uri="{FF2B5EF4-FFF2-40B4-BE49-F238E27FC236}">
-                    <a16:creationId xmlns:a16="http://schemas.microsoft.com/office/drawing/2014/main" id="{29780F90-A07F-4BB0-9F2F-AAC340DC9D38}"/>
+                    <a16:creationId xmlns:a16="http://schemas.microsoft.com/office/drawing/2014/main" xmlns="" id="{29780F90-A07F-4BB0-9F2F-AAC340DC9D38}"/>
                   </a:ext>
                 </a:extLst>
               </p:cNvPr>
@@ -6523,7 +6484,7 @@
               <p:cNvPr id="32" name="TextBox 31">
                 <a:extLst>
                   <a:ext uri="{FF2B5EF4-FFF2-40B4-BE49-F238E27FC236}">
-                    <a16:creationId xmlns:a16="http://schemas.microsoft.com/office/drawing/2014/main" id="{78EDB91B-C071-4D7E-B239-6F5257BFA37A}"/>
+                    <a16:creationId xmlns:a16="http://schemas.microsoft.com/office/drawing/2014/main" xmlns="" id="{78EDB91B-C071-4D7E-B239-6F5257BFA37A}"/>
                   </a:ext>
                 </a:extLst>
               </p:cNvPr>
@@ -6559,7 +6520,7 @@
             <p:cNvPr id="68" name="TextBox 67">
               <a:extLst>
                 <a:ext uri="{FF2B5EF4-FFF2-40B4-BE49-F238E27FC236}">
-                  <a16:creationId xmlns:a16="http://schemas.microsoft.com/office/drawing/2014/main" id="{0A60C194-FFE9-4535-BDE8-2F20E4E57547}"/>
+                  <a16:creationId xmlns:a16="http://schemas.microsoft.com/office/drawing/2014/main" xmlns="" id="{0A60C194-FFE9-4535-BDE8-2F20E4E57547}"/>
                 </a:ext>
               </a:extLst>
             </p:cNvPr>
@@ -6594,7 +6555,7 @@
             <p:cNvPr id="69" name="Straight Arrow Connector 68">
               <a:extLst>
                 <a:ext uri="{FF2B5EF4-FFF2-40B4-BE49-F238E27FC236}">
-                  <a16:creationId xmlns:a16="http://schemas.microsoft.com/office/drawing/2014/main" id="{47E19BB3-F762-4D66-86F3-4DF00CE8304A}"/>
+                  <a16:creationId xmlns:a16="http://schemas.microsoft.com/office/drawing/2014/main" xmlns="" id="{47E19BB3-F762-4D66-86F3-4DF00CE8304A}"/>
                 </a:ext>
               </a:extLst>
             </p:cNvPr>
@@ -6638,7 +6599,7 @@
             <p:cNvPr id="70" name="TextBox 69">
               <a:extLst>
                 <a:ext uri="{FF2B5EF4-FFF2-40B4-BE49-F238E27FC236}">
-                  <a16:creationId xmlns:a16="http://schemas.microsoft.com/office/drawing/2014/main" id="{3B75113D-26B4-4A15-9FFC-2D447FA3EC79}"/>
+                  <a16:creationId xmlns:a16="http://schemas.microsoft.com/office/drawing/2014/main" xmlns="" id="{3B75113D-26B4-4A15-9FFC-2D447FA3EC79}"/>
                 </a:ext>
               </a:extLst>
             </p:cNvPr>
@@ -6673,7 +6634,7 @@
             <p:cNvPr id="71" name="Straight Arrow Connector 70">
               <a:extLst>
                 <a:ext uri="{FF2B5EF4-FFF2-40B4-BE49-F238E27FC236}">
-                  <a16:creationId xmlns:a16="http://schemas.microsoft.com/office/drawing/2014/main" id="{EBF545C9-EA5A-4CE0-A939-9A1C6615DDD5}"/>
+                  <a16:creationId xmlns:a16="http://schemas.microsoft.com/office/drawing/2014/main" xmlns="" id="{EBF545C9-EA5A-4CE0-A939-9A1C6615DDD5}"/>
                 </a:ext>
               </a:extLst>
             </p:cNvPr>
@@ -6717,7 +6678,7 @@
             <p:cNvPr id="72" name="TextBox 71">
               <a:extLst>
                 <a:ext uri="{FF2B5EF4-FFF2-40B4-BE49-F238E27FC236}">
-                  <a16:creationId xmlns:a16="http://schemas.microsoft.com/office/drawing/2014/main" id="{4C9035C0-A0A4-430A-91A1-6C4219863EDE}"/>
+                  <a16:creationId xmlns:a16="http://schemas.microsoft.com/office/drawing/2014/main" xmlns="" id="{4C9035C0-A0A4-430A-91A1-6C4219863EDE}"/>
                 </a:ext>
               </a:extLst>
             </p:cNvPr>
@@ -6753,7 +6714,7 @@
           <p:cNvPr id="74" name="TextBox 73">
             <a:extLst>
               <a:ext uri="{FF2B5EF4-FFF2-40B4-BE49-F238E27FC236}">
-                <a16:creationId xmlns:a16="http://schemas.microsoft.com/office/drawing/2014/main" id="{50741080-9C80-4250-AC0F-FFD661CBFA1F}"/>
+                <a16:creationId xmlns:a16="http://schemas.microsoft.com/office/drawing/2014/main" xmlns="" id="{50741080-9C80-4250-AC0F-FFD661CBFA1F}"/>
               </a:ext>
             </a:extLst>
           </p:cNvPr>
@@ -6789,7 +6750,7 @@
           <p:cNvPr id="75" name="Straight Arrow Connector 74">
             <a:extLst>
               <a:ext uri="{FF2B5EF4-FFF2-40B4-BE49-F238E27FC236}">
-                <a16:creationId xmlns:a16="http://schemas.microsoft.com/office/drawing/2014/main" id="{6B3F6054-C557-4674-912C-7B62D069A0A5}"/>
+                <a16:creationId xmlns:a16="http://schemas.microsoft.com/office/drawing/2014/main" xmlns="" id="{6B3F6054-C557-4674-912C-7B62D069A0A5}"/>
               </a:ext>
             </a:extLst>
           </p:cNvPr>
@@ -6834,7 +6795,7 @@
           <p:cNvPr id="81" name="TextBox 80">
             <a:extLst>
               <a:ext uri="{FF2B5EF4-FFF2-40B4-BE49-F238E27FC236}">
-                <a16:creationId xmlns:a16="http://schemas.microsoft.com/office/drawing/2014/main" id="{1544325F-61CC-4767-9E91-0BFCAF00FECD}"/>
+                <a16:creationId xmlns:a16="http://schemas.microsoft.com/office/drawing/2014/main" xmlns="" id="{1544325F-61CC-4767-9E91-0BFCAF00FECD}"/>
               </a:ext>
             </a:extLst>
           </p:cNvPr>
@@ -6870,7 +6831,7 @@
           <p:cNvPr id="82" name="Straight Arrow Connector 81">
             <a:extLst>
               <a:ext uri="{FF2B5EF4-FFF2-40B4-BE49-F238E27FC236}">
-                <a16:creationId xmlns:a16="http://schemas.microsoft.com/office/drawing/2014/main" id="{3DC0B780-9162-4D43-8BD5-694331D969B9}"/>
+                <a16:creationId xmlns:a16="http://schemas.microsoft.com/office/drawing/2014/main" xmlns="" id="{3DC0B780-9162-4D43-8BD5-694331D969B9}"/>
               </a:ext>
             </a:extLst>
           </p:cNvPr>
@@ -6914,7 +6875,7 @@
           <p:cNvPr id="44" name="TextBox 43">
             <a:extLst>
               <a:ext uri="{FF2B5EF4-FFF2-40B4-BE49-F238E27FC236}">
-                <a16:creationId xmlns:a16="http://schemas.microsoft.com/office/drawing/2014/main" id="{5D331EED-21ED-4FC2-B7DC-83316B7E165D}"/>
+                <a16:creationId xmlns:a16="http://schemas.microsoft.com/office/drawing/2014/main" xmlns="" id="{5D331EED-21ED-4FC2-B7DC-83316B7E165D}"/>
               </a:ext>
             </a:extLst>
           </p:cNvPr>
@@ -6952,7 +6913,7 @@
     </p:spTree>
     <p:extLst>
       <p:ext uri="{BB962C8B-B14F-4D97-AF65-F5344CB8AC3E}">
-        <p14:creationId xmlns:p14="http://schemas.microsoft.com/office/powerpoint/2010/main" val="1256710779"/>
+        <p14:creationId xmlns:p14="http://schemas.microsoft.com/office/powerpoint/2010/main" xmlns="" val="1256710779"/>
       </p:ext>
     </p:extLst>
   </p:cSld>
@@ -7041,28 +7002,6 @@
       </p:sp>
       <p:sp>
         <p:nvSpPr>
-          <p:cNvPr id="6" name="Date Placeholder 5"/>
-          <p:cNvSpPr>
-            <a:spLocks noGrp="1"/>
-          </p:cNvSpPr>
-          <p:nvPr>
-            <p:ph type="dt" sz="half" idx="2"/>
-          </p:nvPr>
-        </p:nvSpPr>
-        <p:spPr/>
-        <p:txBody>
-          <a:bodyPr/>
-          <a:lstStyle/>
-          <a:p>
-            <a:r>
-              <a:rPr lang="en-CA" dirty="0"/>
-              <a:t>Winter 2022</a:t>
-            </a:r>
-          </a:p>
-        </p:txBody>
-      </p:sp>
-      <p:sp>
-        <p:nvSpPr>
           <p:cNvPr id="10" name="Footer Placeholder 9"/>
           <p:cNvSpPr>
             <a:spLocks noGrp="1"/>
@@ -7115,7 +7054,7 @@
           <p:cNvPr id="7" name="Picture 6">
             <a:extLst>
               <a:ext uri="{FF2B5EF4-FFF2-40B4-BE49-F238E27FC236}">
-                <a16:creationId xmlns:a16="http://schemas.microsoft.com/office/drawing/2014/main" id="{8BAB5EDB-C339-4658-978D-CB7B86C318C8}"/>
+                <a16:creationId xmlns:a16="http://schemas.microsoft.com/office/drawing/2014/main" xmlns="" id="{8BAB5EDB-C339-4658-978D-CB7B86C318C8}"/>
               </a:ext>
             </a:extLst>
           </p:cNvPr>
@@ -7125,13 +7064,13 @@
           <p:nvPr/>
         </p:nvPicPr>
         <p:blipFill>
-          <a:blip r:embed="rId2">
+          <a:blip r:embed="rId2" cstate="print">
             <a:extLst>
               <a:ext uri="{28A0092B-C50C-407E-A947-70E740481C1C}">
-                <a14:useLocalDpi xmlns:a14="http://schemas.microsoft.com/office/drawing/2010/main" val="0"/>
+                <a14:useLocalDpi xmlns:a14="http://schemas.microsoft.com/office/drawing/2010/main" xmlns="" val="0"/>
               </a:ext>
               <a:ext uri="{837473B0-CC2E-450A-ABE3-18F120FF3D39}">
-                <a1611:picAttrSrcUrl xmlns:a1611="http://schemas.microsoft.com/office/drawing/2016/11/main" r:id="rId3"/>
+                <a1611:picAttrSrcUrl xmlns:a1611="http://schemas.microsoft.com/office/drawing/2016/11/main" xmlns="" r:id="rId3"/>
               </a:ext>
             </a:extLst>
           </a:blip>
@@ -7154,7 +7093,7 @@
           <p:cNvPr id="9" name="Picture 8">
             <a:extLst>
               <a:ext uri="{FF2B5EF4-FFF2-40B4-BE49-F238E27FC236}">
-                <a16:creationId xmlns:a16="http://schemas.microsoft.com/office/drawing/2014/main" id="{217DD399-6BEC-42B0-8C8F-80C05C13BB8F}"/>
+                <a16:creationId xmlns:a16="http://schemas.microsoft.com/office/drawing/2014/main" xmlns="" id="{217DD399-6BEC-42B0-8C8F-80C05C13BB8F}"/>
               </a:ext>
             </a:extLst>
           </p:cNvPr>
@@ -7164,13 +7103,13 @@
           <p:nvPr/>
         </p:nvPicPr>
         <p:blipFill>
-          <a:blip r:embed="rId4">
+          <a:blip r:embed="rId4" cstate="print">
             <a:extLst>
               <a:ext uri="{28A0092B-C50C-407E-A947-70E740481C1C}">
-                <a14:useLocalDpi xmlns:a14="http://schemas.microsoft.com/office/drawing/2010/main" val="0"/>
+                <a14:useLocalDpi xmlns:a14="http://schemas.microsoft.com/office/drawing/2010/main" xmlns="" val="0"/>
               </a:ext>
               <a:ext uri="{837473B0-CC2E-450A-ABE3-18F120FF3D39}">
-                <a1611:picAttrSrcUrl xmlns:a1611="http://schemas.microsoft.com/office/drawing/2016/11/main" r:id="rId5"/>
+                <a1611:picAttrSrcUrl xmlns:a1611="http://schemas.microsoft.com/office/drawing/2016/11/main" xmlns="" r:id="rId5"/>
               </a:ext>
             </a:extLst>
           </a:blip>
@@ -7193,7 +7132,7 @@
           <p:cNvPr id="5" name="Straight Arrow Connector 4">
             <a:extLst>
               <a:ext uri="{FF2B5EF4-FFF2-40B4-BE49-F238E27FC236}">
-                <a16:creationId xmlns:a16="http://schemas.microsoft.com/office/drawing/2014/main" id="{807C7073-511B-46BE-8CEC-CAFF15AD79B2}"/>
+                <a16:creationId xmlns:a16="http://schemas.microsoft.com/office/drawing/2014/main" xmlns="" id="{807C7073-511B-46BE-8CEC-CAFF15AD79B2}"/>
               </a:ext>
             </a:extLst>
           </p:cNvPr>
@@ -7237,7 +7176,7 @@
           <p:cNvPr id="13" name="TextBox 12">
             <a:extLst>
               <a:ext uri="{FF2B5EF4-FFF2-40B4-BE49-F238E27FC236}">
-                <a16:creationId xmlns:a16="http://schemas.microsoft.com/office/drawing/2014/main" id="{E056EDE4-8844-4846-B0A1-BE530F4D7466}"/>
+                <a16:creationId xmlns:a16="http://schemas.microsoft.com/office/drawing/2014/main" xmlns="" id="{E056EDE4-8844-4846-B0A1-BE530F4D7466}"/>
               </a:ext>
             </a:extLst>
           </p:cNvPr>
@@ -7279,7 +7218,7 @@
           <p:cNvPr id="14" name="TextBox 13">
             <a:extLst>
               <a:ext uri="{FF2B5EF4-FFF2-40B4-BE49-F238E27FC236}">
-                <a16:creationId xmlns:a16="http://schemas.microsoft.com/office/drawing/2014/main" id="{16109C71-5DB7-418B-ACC6-6B9C83D6F5BB}"/>
+                <a16:creationId xmlns:a16="http://schemas.microsoft.com/office/drawing/2014/main" xmlns="" id="{16109C71-5DB7-418B-ACC6-6B9C83D6F5BB}"/>
               </a:ext>
             </a:extLst>
           </p:cNvPr>
@@ -7329,7 +7268,7 @@
           <p:cNvPr id="15" name="Straight Arrow Connector 14">
             <a:extLst>
               <a:ext uri="{FF2B5EF4-FFF2-40B4-BE49-F238E27FC236}">
-                <a16:creationId xmlns:a16="http://schemas.microsoft.com/office/drawing/2014/main" id="{005BF5B4-EE3E-4309-A841-F9E134AE9FC1}"/>
+                <a16:creationId xmlns:a16="http://schemas.microsoft.com/office/drawing/2014/main" xmlns="" id="{005BF5B4-EE3E-4309-A841-F9E134AE9FC1}"/>
               </a:ext>
             </a:extLst>
           </p:cNvPr>
@@ -7371,7 +7310,7 @@
     </p:spTree>
     <p:extLst>
       <p:ext uri="{BB962C8B-B14F-4D97-AF65-F5344CB8AC3E}">
-        <p14:creationId xmlns:p14="http://schemas.microsoft.com/office/powerpoint/2010/main" val="100707161"/>
+        <p14:creationId xmlns:p14="http://schemas.microsoft.com/office/powerpoint/2010/main" xmlns="" val="100707161"/>
       </p:ext>
     </p:extLst>
   </p:cSld>
@@ -7460,28 +7399,6 @@
       </p:sp>
       <p:sp>
         <p:nvSpPr>
-          <p:cNvPr id="6" name="Date Placeholder 5"/>
-          <p:cNvSpPr>
-            <a:spLocks noGrp="1"/>
-          </p:cNvSpPr>
-          <p:nvPr>
-            <p:ph type="dt" sz="half" idx="2"/>
-          </p:nvPr>
-        </p:nvSpPr>
-        <p:spPr/>
-        <p:txBody>
-          <a:bodyPr/>
-          <a:lstStyle/>
-          <a:p>
-            <a:r>
-              <a:rPr lang="en-CA" dirty="0"/>
-              <a:t>Winter 2022</a:t>
-            </a:r>
-          </a:p>
-        </p:txBody>
-      </p:sp>
-      <p:sp>
-        <p:nvSpPr>
           <p:cNvPr id="10" name="Footer Placeholder 9"/>
           <p:cNvSpPr>
             <a:spLocks noGrp="1"/>
@@ -7534,7 +7451,7 @@
           <p:cNvPr id="7" name="Picture 6">
             <a:extLst>
               <a:ext uri="{FF2B5EF4-FFF2-40B4-BE49-F238E27FC236}">
-                <a16:creationId xmlns:a16="http://schemas.microsoft.com/office/drawing/2014/main" id="{8BAB5EDB-C339-4658-978D-CB7B86C318C8}"/>
+                <a16:creationId xmlns:a16="http://schemas.microsoft.com/office/drawing/2014/main" xmlns="" id="{8BAB5EDB-C339-4658-978D-CB7B86C318C8}"/>
               </a:ext>
             </a:extLst>
           </p:cNvPr>
@@ -7544,13 +7461,13 @@
           <p:nvPr/>
         </p:nvPicPr>
         <p:blipFill>
-          <a:blip r:embed="rId2">
+          <a:blip r:embed="rId2" cstate="print">
             <a:extLst>
               <a:ext uri="{28A0092B-C50C-407E-A947-70E740481C1C}">
-                <a14:useLocalDpi xmlns:a14="http://schemas.microsoft.com/office/drawing/2010/main" val="0"/>
+                <a14:useLocalDpi xmlns:a14="http://schemas.microsoft.com/office/drawing/2010/main" xmlns="" val="0"/>
               </a:ext>
               <a:ext uri="{837473B0-CC2E-450A-ABE3-18F120FF3D39}">
-                <a1611:picAttrSrcUrl xmlns:a1611="http://schemas.microsoft.com/office/drawing/2016/11/main" r:id="rId3"/>
+                <a1611:picAttrSrcUrl xmlns:a1611="http://schemas.microsoft.com/office/drawing/2016/11/main" xmlns="" r:id="rId3"/>
               </a:ext>
             </a:extLst>
           </a:blip>
@@ -7573,7 +7490,7 @@
           <p:cNvPr id="9" name="Picture 8">
             <a:extLst>
               <a:ext uri="{FF2B5EF4-FFF2-40B4-BE49-F238E27FC236}">
-                <a16:creationId xmlns:a16="http://schemas.microsoft.com/office/drawing/2014/main" id="{217DD399-6BEC-42B0-8C8F-80C05C13BB8F}"/>
+                <a16:creationId xmlns:a16="http://schemas.microsoft.com/office/drawing/2014/main" xmlns="" id="{217DD399-6BEC-42B0-8C8F-80C05C13BB8F}"/>
               </a:ext>
             </a:extLst>
           </p:cNvPr>
@@ -7583,13 +7500,13 @@
           <p:nvPr/>
         </p:nvPicPr>
         <p:blipFill>
-          <a:blip r:embed="rId4">
+          <a:blip r:embed="rId4" cstate="print">
             <a:extLst>
               <a:ext uri="{28A0092B-C50C-407E-A947-70E740481C1C}">
-                <a14:useLocalDpi xmlns:a14="http://schemas.microsoft.com/office/drawing/2010/main" val="0"/>
+                <a14:useLocalDpi xmlns:a14="http://schemas.microsoft.com/office/drawing/2010/main" xmlns="" val="0"/>
               </a:ext>
               <a:ext uri="{837473B0-CC2E-450A-ABE3-18F120FF3D39}">
-                <a1611:picAttrSrcUrl xmlns:a1611="http://schemas.microsoft.com/office/drawing/2016/11/main" r:id="rId5"/>
+                <a1611:picAttrSrcUrl xmlns:a1611="http://schemas.microsoft.com/office/drawing/2016/11/main" xmlns="" r:id="rId5"/>
               </a:ext>
             </a:extLst>
           </a:blip>
@@ -7612,7 +7529,7 @@
           <p:cNvPr id="5" name="Straight Arrow Connector 4">
             <a:extLst>
               <a:ext uri="{FF2B5EF4-FFF2-40B4-BE49-F238E27FC236}">
-                <a16:creationId xmlns:a16="http://schemas.microsoft.com/office/drawing/2014/main" id="{807C7073-511B-46BE-8CEC-CAFF15AD79B2}"/>
+                <a16:creationId xmlns:a16="http://schemas.microsoft.com/office/drawing/2014/main" xmlns="" id="{807C7073-511B-46BE-8CEC-CAFF15AD79B2}"/>
               </a:ext>
             </a:extLst>
           </p:cNvPr>
@@ -7656,7 +7573,7 @@
           <p:cNvPr id="13" name="TextBox 12">
             <a:extLst>
               <a:ext uri="{FF2B5EF4-FFF2-40B4-BE49-F238E27FC236}">
-                <a16:creationId xmlns:a16="http://schemas.microsoft.com/office/drawing/2014/main" id="{E056EDE4-8844-4846-B0A1-BE530F4D7466}"/>
+                <a16:creationId xmlns:a16="http://schemas.microsoft.com/office/drawing/2014/main" xmlns="" id="{E056EDE4-8844-4846-B0A1-BE530F4D7466}"/>
               </a:ext>
             </a:extLst>
           </p:cNvPr>
@@ -7698,7 +7615,7 @@
           <p:cNvPr id="14" name="TextBox 13">
             <a:extLst>
               <a:ext uri="{FF2B5EF4-FFF2-40B4-BE49-F238E27FC236}">
-                <a16:creationId xmlns:a16="http://schemas.microsoft.com/office/drawing/2014/main" id="{16109C71-5DB7-418B-ACC6-6B9C83D6F5BB}"/>
+                <a16:creationId xmlns:a16="http://schemas.microsoft.com/office/drawing/2014/main" xmlns="" id="{16109C71-5DB7-418B-ACC6-6B9C83D6F5BB}"/>
               </a:ext>
             </a:extLst>
           </p:cNvPr>
@@ -7748,7 +7665,7 @@
           <p:cNvPr id="15" name="Straight Arrow Connector 14">
             <a:extLst>
               <a:ext uri="{FF2B5EF4-FFF2-40B4-BE49-F238E27FC236}">
-                <a16:creationId xmlns:a16="http://schemas.microsoft.com/office/drawing/2014/main" id="{005BF5B4-EE3E-4309-A841-F9E134AE9FC1}"/>
+                <a16:creationId xmlns:a16="http://schemas.microsoft.com/office/drawing/2014/main" xmlns="" id="{005BF5B4-EE3E-4309-A841-F9E134AE9FC1}"/>
               </a:ext>
             </a:extLst>
           </p:cNvPr>
@@ -7792,7 +7709,7 @@
           <p:cNvPr id="17" name="Oval 16">
             <a:extLst>
               <a:ext uri="{FF2B5EF4-FFF2-40B4-BE49-F238E27FC236}">
-                <a16:creationId xmlns:a16="http://schemas.microsoft.com/office/drawing/2014/main" id="{DBA27E3B-CE81-443B-8B7B-F3E80DB22152}"/>
+                <a16:creationId xmlns:a16="http://schemas.microsoft.com/office/drawing/2014/main" xmlns="" id="{DBA27E3B-CE81-443B-8B7B-F3E80DB22152}"/>
               </a:ext>
             </a:extLst>
           </p:cNvPr>
@@ -7840,7 +7757,7 @@
           <p:cNvPr id="19" name="Oval 18">
             <a:extLst>
               <a:ext uri="{FF2B5EF4-FFF2-40B4-BE49-F238E27FC236}">
-                <a16:creationId xmlns:a16="http://schemas.microsoft.com/office/drawing/2014/main" id="{059E428F-9429-45DA-A48E-0CC5482E0B5D}"/>
+                <a16:creationId xmlns:a16="http://schemas.microsoft.com/office/drawing/2014/main" xmlns="" id="{059E428F-9429-45DA-A48E-0CC5482E0B5D}"/>
               </a:ext>
             </a:extLst>
           </p:cNvPr>
@@ -7890,7 +7807,7 @@
     </p:spTree>
     <p:extLst>
       <p:ext uri="{BB962C8B-B14F-4D97-AF65-F5344CB8AC3E}">
-        <p14:creationId xmlns:p14="http://schemas.microsoft.com/office/powerpoint/2010/main" val="3902734336"/>
+        <p14:creationId xmlns:p14="http://schemas.microsoft.com/office/powerpoint/2010/main" xmlns="" val="3902734336"/>
       </p:ext>
     </p:extLst>
   </p:cSld>
@@ -7979,28 +7896,6 @@
       </p:sp>
       <p:sp>
         <p:nvSpPr>
-          <p:cNvPr id="6" name="Date Placeholder 5"/>
-          <p:cNvSpPr>
-            <a:spLocks noGrp="1"/>
-          </p:cNvSpPr>
-          <p:nvPr>
-            <p:ph type="dt" sz="half" idx="2"/>
-          </p:nvPr>
-        </p:nvSpPr>
-        <p:spPr/>
-        <p:txBody>
-          <a:bodyPr/>
-          <a:lstStyle/>
-          <a:p>
-            <a:r>
-              <a:rPr lang="en-CA" dirty="0"/>
-              <a:t>Winter 2022</a:t>
-            </a:r>
-          </a:p>
-        </p:txBody>
-      </p:sp>
-      <p:sp>
-        <p:nvSpPr>
           <p:cNvPr id="10" name="Footer Placeholder 9"/>
           <p:cNvSpPr>
             <a:spLocks noGrp="1"/>
@@ -8053,7 +7948,7 @@
           <p:cNvPr id="7" name="Picture 6">
             <a:extLst>
               <a:ext uri="{FF2B5EF4-FFF2-40B4-BE49-F238E27FC236}">
-                <a16:creationId xmlns:a16="http://schemas.microsoft.com/office/drawing/2014/main" id="{8BAB5EDB-C339-4658-978D-CB7B86C318C8}"/>
+                <a16:creationId xmlns:a16="http://schemas.microsoft.com/office/drawing/2014/main" xmlns="" id="{8BAB5EDB-C339-4658-978D-CB7B86C318C8}"/>
               </a:ext>
             </a:extLst>
           </p:cNvPr>
@@ -8063,13 +7958,13 @@
           <p:nvPr/>
         </p:nvPicPr>
         <p:blipFill>
-          <a:blip r:embed="rId2">
+          <a:blip r:embed="rId2" cstate="print">
             <a:extLst>
               <a:ext uri="{28A0092B-C50C-407E-A947-70E740481C1C}">
-                <a14:useLocalDpi xmlns:a14="http://schemas.microsoft.com/office/drawing/2010/main" val="0"/>
+                <a14:useLocalDpi xmlns:a14="http://schemas.microsoft.com/office/drawing/2010/main" xmlns="" val="0"/>
               </a:ext>
               <a:ext uri="{837473B0-CC2E-450A-ABE3-18F120FF3D39}">
-                <a1611:picAttrSrcUrl xmlns:a1611="http://schemas.microsoft.com/office/drawing/2016/11/main" r:id="rId3"/>
+                <a1611:picAttrSrcUrl xmlns:a1611="http://schemas.microsoft.com/office/drawing/2016/11/main" xmlns="" r:id="rId3"/>
               </a:ext>
             </a:extLst>
           </a:blip>
@@ -8092,7 +7987,7 @@
           <p:cNvPr id="9" name="Picture 8">
             <a:extLst>
               <a:ext uri="{FF2B5EF4-FFF2-40B4-BE49-F238E27FC236}">
-                <a16:creationId xmlns:a16="http://schemas.microsoft.com/office/drawing/2014/main" id="{217DD399-6BEC-42B0-8C8F-80C05C13BB8F}"/>
+                <a16:creationId xmlns:a16="http://schemas.microsoft.com/office/drawing/2014/main" xmlns="" id="{217DD399-6BEC-42B0-8C8F-80C05C13BB8F}"/>
               </a:ext>
             </a:extLst>
           </p:cNvPr>
@@ -8102,13 +7997,13 @@
           <p:nvPr/>
         </p:nvPicPr>
         <p:blipFill>
-          <a:blip r:embed="rId4">
+          <a:blip r:embed="rId4" cstate="print">
             <a:extLst>
               <a:ext uri="{28A0092B-C50C-407E-A947-70E740481C1C}">
-                <a14:useLocalDpi xmlns:a14="http://schemas.microsoft.com/office/drawing/2010/main" val="0"/>
+                <a14:useLocalDpi xmlns:a14="http://schemas.microsoft.com/office/drawing/2010/main" xmlns="" val="0"/>
               </a:ext>
               <a:ext uri="{837473B0-CC2E-450A-ABE3-18F120FF3D39}">
-                <a1611:picAttrSrcUrl xmlns:a1611="http://schemas.microsoft.com/office/drawing/2016/11/main" r:id="rId5"/>
+                <a1611:picAttrSrcUrl xmlns:a1611="http://schemas.microsoft.com/office/drawing/2016/11/main" xmlns="" r:id="rId5"/>
               </a:ext>
             </a:extLst>
           </a:blip>
@@ -8131,7 +8026,7 @@
           <p:cNvPr id="5" name="Straight Arrow Connector 4">
             <a:extLst>
               <a:ext uri="{FF2B5EF4-FFF2-40B4-BE49-F238E27FC236}">
-                <a16:creationId xmlns:a16="http://schemas.microsoft.com/office/drawing/2014/main" id="{807C7073-511B-46BE-8CEC-CAFF15AD79B2}"/>
+                <a16:creationId xmlns:a16="http://schemas.microsoft.com/office/drawing/2014/main" xmlns="" id="{807C7073-511B-46BE-8CEC-CAFF15AD79B2}"/>
               </a:ext>
             </a:extLst>
           </p:cNvPr>
@@ -8175,7 +8070,7 @@
           <p:cNvPr id="13" name="TextBox 12">
             <a:extLst>
               <a:ext uri="{FF2B5EF4-FFF2-40B4-BE49-F238E27FC236}">
-                <a16:creationId xmlns:a16="http://schemas.microsoft.com/office/drawing/2014/main" id="{E056EDE4-8844-4846-B0A1-BE530F4D7466}"/>
+                <a16:creationId xmlns:a16="http://schemas.microsoft.com/office/drawing/2014/main" xmlns="" id="{E056EDE4-8844-4846-B0A1-BE530F4D7466}"/>
               </a:ext>
             </a:extLst>
           </p:cNvPr>
@@ -8217,7 +8112,7 @@
           <p:cNvPr id="14" name="TextBox 13">
             <a:extLst>
               <a:ext uri="{FF2B5EF4-FFF2-40B4-BE49-F238E27FC236}">
-                <a16:creationId xmlns:a16="http://schemas.microsoft.com/office/drawing/2014/main" id="{16109C71-5DB7-418B-ACC6-6B9C83D6F5BB}"/>
+                <a16:creationId xmlns:a16="http://schemas.microsoft.com/office/drawing/2014/main" xmlns="" id="{16109C71-5DB7-418B-ACC6-6B9C83D6F5BB}"/>
               </a:ext>
             </a:extLst>
           </p:cNvPr>
@@ -8267,7 +8162,7 @@
           <p:cNvPr id="15" name="Straight Arrow Connector 14">
             <a:extLst>
               <a:ext uri="{FF2B5EF4-FFF2-40B4-BE49-F238E27FC236}">
-                <a16:creationId xmlns:a16="http://schemas.microsoft.com/office/drawing/2014/main" id="{005BF5B4-EE3E-4309-A841-F9E134AE9FC1}"/>
+                <a16:creationId xmlns:a16="http://schemas.microsoft.com/office/drawing/2014/main" xmlns="" id="{005BF5B4-EE3E-4309-A841-F9E134AE9FC1}"/>
               </a:ext>
             </a:extLst>
           </p:cNvPr>
@@ -8311,7 +8206,7 @@
           <p:cNvPr id="8" name="Straight Connector 7">
             <a:extLst>
               <a:ext uri="{FF2B5EF4-FFF2-40B4-BE49-F238E27FC236}">
-                <a16:creationId xmlns:a16="http://schemas.microsoft.com/office/drawing/2014/main" id="{3B59536B-137F-41E4-BA0A-2C4C1A71E1C1}"/>
+                <a16:creationId xmlns:a16="http://schemas.microsoft.com/office/drawing/2014/main" xmlns="" id="{3B59536B-137F-41E4-BA0A-2C4C1A71E1C1}"/>
               </a:ext>
             </a:extLst>
           </p:cNvPr>
@@ -8352,7 +8247,7 @@
           <p:cNvPr id="16" name="Straight Connector 15">
             <a:extLst>
               <a:ext uri="{FF2B5EF4-FFF2-40B4-BE49-F238E27FC236}">
-                <a16:creationId xmlns:a16="http://schemas.microsoft.com/office/drawing/2014/main" id="{D5F83E8C-4962-4D60-9C76-2445177C0A91}"/>
+                <a16:creationId xmlns:a16="http://schemas.microsoft.com/office/drawing/2014/main" xmlns="" id="{D5F83E8C-4962-4D60-9C76-2445177C0A91}"/>
               </a:ext>
             </a:extLst>
           </p:cNvPr>
@@ -8393,7 +8288,7 @@
     </p:spTree>
     <p:extLst>
       <p:ext uri="{BB962C8B-B14F-4D97-AF65-F5344CB8AC3E}">
-        <p14:creationId xmlns:p14="http://schemas.microsoft.com/office/powerpoint/2010/main" val="3140037942"/>
+        <p14:creationId xmlns:p14="http://schemas.microsoft.com/office/powerpoint/2010/main" xmlns="" val="3140037942"/>
       </p:ext>
     </p:extLst>
   </p:cSld>
@@ -8482,28 +8377,6 @@
       </p:sp>
       <p:sp>
         <p:nvSpPr>
-          <p:cNvPr id="6" name="Date Placeholder 5"/>
-          <p:cNvSpPr>
-            <a:spLocks noGrp="1"/>
-          </p:cNvSpPr>
-          <p:nvPr>
-            <p:ph type="dt" sz="half" idx="2"/>
-          </p:nvPr>
-        </p:nvSpPr>
-        <p:spPr/>
-        <p:txBody>
-          <a:bodyPr/>
-          <a:lstStyle/>
-          <a:p>
-            <a:r>
-              <a:rPr lang="en-CA" dirty="0"/>
-              <a:t>Winter 2022</a:t>
-            </a:r>
-          </a:p>
-        </p:txBody>
-      </p:sp>
-      <p:sp>
-        <p:nvSpPr>
           <p:cNvPr id="10" name="Footer Placeholder 9"/>
           <p:cNvSpPr>
             <a:spLocks noGrp="1"/>
@@ -8556,7 +8429,7 @@
           <p:cNvPr id="7" name="Picture 6">
             <a:extLst>
               <a:ext uri="{FF2B5EF4-FFF2-40B4-BE49-F238E27FC236}">
-                <a16:creationId xmlns:a16="http://schemas.microsoft.com/office/drawing/2014/main" id="{8BAB5EDB-C339-4658-978D-CB7B86C318C8}"/>
+                <a16:creationId xmlns:a16="http://schemas.microsoft.com/office/drawing/2014/main" xmlns="" id="{8BAB5EDB-C339-4658-978D-CB7B86C318C8}"/>
               </a:ext>
             </a:extLst>
           </p:cNvPr>
@@ -8566,13 +8439,13 @@
           <p:nvPr/>
         </p:nvPicPr>
         <p:blipFill>
-          <a:blip r:embed="rId2">
+          <a:blip r:embed="rId2" cstate="print">
             <a:extLst>
               <a:ext uri="{28A0092B-C50C-407E-A947-70E740481C1C}">
-                <a14:useLocalDpi xmlns:a14="http://schemas.microsoft.com/office/drawing/2010/main" val="0"/>
+                <a14:useLocalDpi xmlns:a14="http://schemas.microsoft.com/office/drawing/2010/main" xmlns="" val="0"/>
               </a:ext>
               <a:ext uri="{837473B0-CC2E-450A-ABE3-18F120FF3D39}">
-                <a1611:picAttrSrcUrl xmlns:a1611="http://schemas.microsoft.com/office/drawing/2016/11/main" r:id="rId3"/>
+                <a1611:picAttrSrcUrl xmlns:a1611="http://schemas.microsoft.com/office/drawing/2016/11/main" xmlns="" r:id="rId3"/>
               </a:ext>
             </a:extLst>
           </a:blip>
@@ -8595,7 +8468,7 @@
           <p:cNvPr id="9" name="Picture 8">
             <a:extLst>
               <a:ext uri="{FF2B5EF4-FFF2-40B4-BE49-F238E27FC236}">
-                <a16:creationId xmlns:a16="http://schemas.microsoft.com/office/drawing/2014/main" id="{217DD399-6BEC-42B0-8C8F-80C05C13BB8F}"/>
+                <a16:creationId xmlns:a16="http://schemas.microsoft.com/office/drawing/2014/main" xmlns="" id="{217DD399-6BEC-42B0-8C8F-80C05C13BB8F}"/>
               </a:ext>
             </a:extLst>
           </p:cNvPr>
@@ -8605,13 +8478,13 @@
           <p:nvPr/>
         </p:nvPicPr>
         <p:blipFill>
-          <a:blip r:embed="rId4">
+          <a:blip r:embed="rId4" cstate="print">
             <a:extLst>
               <a:ext uri="{28A0092B-C50C-407E-A947-70E740481C1C}">
-                <a14:useLocalDpi xmlns:a14="http://schemas.microsoft.com/office/drawing/2010/main" val="0"/>
+                <a14:useLocalDpi xmlns:a14="http://schemas.microsoft.com/office/drawing/2010/main" xmlns="" val="0"/>
               </a:ext>
               <a:ext uri="{837473B0-CC2E-450A-ABE3-18F120FF3D39}">
-                <a1611:picAttrSrcUrl xmlns:a1611="http://schemas.microsoft.com/office/drawing/2016/11/main" r:id="rId5"/>
+                <a1611:picAttrSrcUrl xmlns:a1611="http://schemas.microsoft.com/office/drawing/2016/11/main" xmlns="" r:id="rId5"/>
               </a:ext>
             </a:extLst>
           </a:blip>
@@ -8634,7 +8507,7 @@
           <p:cNvPr id="5" name="Straight Arrow Connector 4">
             <a:extLst>
               <a:ext uri="{FF2B5EF4-FFF2-40B4-BE49-F238E27FC236}">
-                <a16:creationId xmlns:a16="http://schemas.microsoft.com/office/drawing/2014/main" id="{807C7073-511B-46BE-8CEC-CAFF15AD79B2}"/>
+                <a16:creationId xmlns:a16="http://schemas.microsoft.com/office/drawing/2014/main" xmlns="" id="{807C7073-511B-46BE-8CEC-CAFF15AD79B2}"/>
               </a:ext>
             </a:extLst>
           </p:cNvPr>
@@ -8678,7 +8551,7 @@
           <p:cNvPr id="13" name="TextBox 12">
             <a:extLst>
               <a:ext uri="{FF2B5EF4-FFF2-40B4-BE49-F238E27FC236}">
-                <a16:creationId xmlns:a16="http://schemas.microsoft.com/office/drawing/2014/main" id="{E056EDE4-8844-4846-B0A1-BE530F4D7466}"/>
+                <a16:creationId xmlns:a16="http://schemas.microsoft.com/office/drawing/2014/main" xmlns="" id="{E056EDE4-8844-4846-B0A1-BE530F4D7466}"/>
               </a:ext>
             </a:extLst>
           </p:cNvPr>
@@ -8720,7 +8593,7 @@
           <p:cNvPr id="14" name="TextBox 13">
             <a:extLst>
               <a:ext uri="{FF2B5EF4-FFF2-40B4-BE49-F238E27FC236}">
-                <a16:creationId xmlns:a16="http://schemas.microsoft.com/office/drawing/2014/main" id="{16109C71-5DB7-418B-ACC6-6B9C83D6F5BB}"/>
+                <a16:creationId xmlns:a16="http://schemas.microsoft.com/office/drawing/2014/main" xmlns="" id="{16109C71-5DB7-418B-ACC6-6B9C83D6F5BB}"/>
               </a:ext>
             </a:extLst>
           </p:cNvPr>
@@ -8770,7 +8643,7 @@
           <p:cNvPr id="15" name="Straight Arrow Connector 14">
             <a:extLst>
               <a:ext uri="{FF2B5EF4-FFF2-40B4-BE49-F238E27FC236}">
-                <a16:creationId xmlns:a16="http://schemas.microsoft.com/office/drawing/2014/main" id="{005BF5B4-EE3E-4309-A841-F9E134AE9FC1}"/>
+                <a16:creationId xmlns:a16="http://schemas.microsoft.com/office/drawing/2014/main" xmlns="" id="{005BF5B4-EE3E-4309-A841-F9E134AE9FC1}"/>
               </a:ext>
             </a:extLst>
           </p:cNvPr>
@@ -8814,7 +8687,7 @@
           <p:cNvPr id="4" name="Freeform: Shape 3">
             <a:extLst>
               <a:ext uri="{FF2B5EF4-FFF2-40B4-BE49-F238E27FC236}">
-                <a16:creationId xmlns:a16="http://schemas.microsoft.com/office/drawing/2014/main" id="{D0BEC306-7EB5-4B09-8E8E-D0C74D8CB22E}"/>
+                <a16:creationId xmlns:a16="http://schemas.microsoft.com/office/drawing/2014/main" xmlns="" id="{D0BEC306-7EB5-4B09-8E8E-D0C74D8CB22E}"/>
               </a:ext>
             </a:extLst>
           </p:cNvPr>
@@ -8967,7 +8840,7 @@
           <p:cNvPr id="11" name="Rectangle 10">
             <a:extLst>
               <a:ext uri="{FF2B5EF4-FFF2-40B4-BE49-F238E27FC236}">
-                <a16:creationId xmlns:a16="http://schemas.microsoft.com/office/drawing/2014/main" id="{9C0FB370-DD8C-4F2B-AF04-E541C7C8FFFB}"/>
+                <a16:creationId xmlns:a16="http://schemas.microsoft.com/office/drawing/2014/main" xmlns="" id="{9C0FB370-DD8C-4F2B-AF04-E541C7C8FFFB}"/>
               </a:ext>
             </a:extLst>
           </p:cNvPr>
@@ -9015,7 +8888,7 @@
           <p:cNvPr id="17" name="Rectangle 16">
             <a:extLst>
               <a:ext uri="{FF2B5EF4-FFF2-40B4-BE49-F238E27FC236}">
-                <a16:creationId xmlns:a16="http://schemas.microsoft.com/office/drawing/2014/main" id="{1291B997-CF72-4B83-8055-5AAA79536704}"/>
+                <a16:creationId xmlns:a16="http://schemas.microsoft.com/office/drawing/2014/main" xmlns="" id="{1291B997-CF72-4B83-8055-5AAA79536704}"/>
               </a:ext>
             </a:extLst>
           </p:cNvPr>
@@ -9065,7 +8938,7 @@
     </p:spTree>
     <p:extLst>
       <p:ext uri="{BB962C8B-B14F-4D97-AF65-F5344CB8AC3E}">
-        <p14:creationId xmlns:p14="http://schemas.microsoft.com/office/powerpoint/2010/main" val="2557757287"/>
+        <p14:creationId xmlns:p14="http://schemas.microsoft.com/office/powerpoint/2010/main" xmlns="" val="2557757287"/>
       </p:ext>
     </p:extLst>
   </p:cSld>
@@ -9226,28 +9099,6 @@
       </p:sp>
       <p:sp>
         <p:nvSpPr>
-          <p:cNvPr id="6" name="Date Placeholder 5"/>
-          <p:cNvSpPr>
-            <a:spLocks noGrp="1"/>
-          </p:cNvSpPr>
-          <p:nvPr>
-            <p:ph type="dt" sz="half" idx="2"/>
-          </p:nvPr>
-        </p:nvSpPr>
-        <p:spPr/>
-        <p:txBody>
-          <a:bodyPr/>
-          <a:lstStyle/>
-          <a:p>
-            <a:r>
-              <a:rPr lang="en-CA" dirty="0"/>
-              <a:t>Winter 2022</a:t>
-            </a:r>
-          </a:p>
-        </p:txBody>
-      </p:sp>
-      <p:sp>
-        <p:nvSpPr>
           <p:cNvPr id="10" name="Footer Placeholder 9"/>
           <p:cNvSpPr>
             <a:spLocks noGrp="1"/>
@@ -9298,7 +9149,7 @@
     </p:spTree>
     <p:extLst>
       <p:ext uri="{BB962C8B-B14F-4D97-AF65-F5344CB8AC3E}">
-        <p14:creationId xmlns:p14="http://schemas.microsoft.com/office/powerpoint/2010/main" val="3365457725"/>
+        <p14:creationId xmlns:p14="http://schemas.microsoft.com/office/powerpoint/2010/main" xmlns="" val="3365457725"/>
       </p:ext>
     </p:extLst>
   </p:cSld>
@@ -9446,28 +9297,6 @@
       </p:sp>
       <p:sp>
         <p:nvSpPr>
-          <p:cNvPr id="6" name="Date Placeholder 5"/>
-          <p:cNvSpPr>
-            <a:spLocks noGrp="1"/>
-          </p:cNvSpPr>
-          <p:nvPr>
-            <p:ph type="dt" sz="half" idx="2"/>
-          </p:nvPr>
-        </p:nvSpPr>
-        <p:spPr/>
-        <p:txBody>
-          <a:bodyPr/>
-          <a:lstStyle/>
-          <a:p>
-            <a:r>
-              <a:rPr lang="en-CA" dirty="0"/>
-              <a:t>Winter 2022</a:t>
-            </a:r>
-          </a:p>
-        </p:txBody>
-      </p:sp>
-      <p:sp>
-        <p:nvSpPr>
           <p:cNvPr id="10" name="Footer Placeholder 9"/>
           <p:cNvSpPr>
             <a:spLocks noGrp="1"/>
@@ -9518,7 +9347,7 @@
     </p:spTree>
     <p:extLst>
       <p:ext uri="{BB962C8B-B14F-4D97-AF65-F5344CB8AC3E}">
-        <p14:creationId xmlns:p14="http://schemas.microsoft.com/office/powerpoint/2010/main" val="2737390811"/>
+        <p14:creationId xmlns:p14="http://schemas.microsoft.com/office/powerpoint/2010/main" xmlns="" val="2737390811"/>
       </p:ext>
     </p:extLst>
   </p:cSld>
@@ -9650,28 +9479,6 @@
       </p:sp>
       <p:sp>
         <p:nvSpPr>
-          <p:cNvPr id="6" name="Date Placeholder 5"/>
-          <p:cNvSpPr>
-            <a:spLocks noGrp="1"/>
-          </p:cNvSpPr>
-          <p:nvPr>
-            <p:ph type="dt" sz="half" idx="2"/>
-          </p:nvPr>
-        </p:nvSpPr>
-        <p:spPr/>
-        <p:txBody>
-          <a:bodyPr/>
-          <a:lstStyle/>
-          <a:p>
-            <a:r>
-              <a:rPr lang="en-CA" dirty="0"/>
-              <a:t>Winter 2022</a:t>
-            </a:r>
-          </a:p>
-        </p:txBody>
-      </p:sp>
-      <p:sp>
-        <p:nvSpPr>
           <p:cNvPr id="10" name="Footer Placeholder 9"/>
           <p:cNvSpPr>
             <a:spLocks noGrp="1"/>
@@ -9722,7 +9529,7 @@
     </p:spTree>
     <p:extLst>
       <p:ext uri="{BB962C8B-B14F-4D97-AF65-F5344CB8AC3E}">
-        <p14:creationId xmlns:p14="http://schemas.microsoft.com/office/powerpoint/2010/main" val="3470026828"/>
+        <p14:creationId xmlns:p14="http://schemas.microsoft.com/office/powerpoint/2010/main" xmlns="" val="3470026828"/>
       </p:ext>
     </p:extLst>
   </p:cSld>
@@ -9912,28 +9719,6 @@
       </p:sp>
       <p:sp>
         <p:nvSpPr>
-          <p:cNvPr id="6" name="Date Placeholder 5"/>
-          <p:cNvSpPr>
-            <a:spLocks noGrp="1"/>
-          </p:cNvSpPr>
-          <p:nvPr>
-            <p:ph type="dt" sz="half" idx="2"/>
-          </p:nvPr>
-        </p:nvSpPr>
-        <p:spPr/>
-        <p:txBody>
-          <a:bodyPr/>
-          <a:lstStyle/>
-          <a:p>
-            <a:r>
-              <a:rPr lang="en-CA" dirty="0"/>
-              <a:t>Winter 2022</a:t>
-            </a:r>
-          </a:p>
-        </p:txBody>
-      </p:sp>
-      <p:sp>
-        <p:nvSpPr>
           <p:cNvPr id="10" name="Footer Placeholder 9"/>
           <p:cNvSpPr>
             <a:spLocks noGrp="1"/>
@@ -9984,7 +9769,7 @@
     </p:spTree>
     <p:extLst>
       <p:ext uri="{BB962C8B-B14F-4D97-AF65-F5344CB8AC3E}">
-        <p14:creationId xmlns:p14="http://schemas.microsoft.com/office/powerpoint/2010/main" val="1157039037"/>
+        <p14:creationId xmlns:p14="http://schemas.microsoft.com/office/powerpoint/2010/main" xmlns="" val="1157039037"/>
       </p:ext>
     </p:extLst>
   </p:cSld>
@@ -10159,28 +9944,6 @@
       </p:sp>
       <p:sp>
         <p:nvSpPr>
-          <p:cNvPr id="6" name="Date Placeholder 5"/>
-          <p:cNvSpPr>
-            <a:spLocks noGrp="1"/>
-          </p:cNvSpPr>
-          <p:nvPr>
-            <p:ph type="dt" sz="half" idx="2"/>
-          </p:nvPr>
-        </p:nvSpPr>
-        <p:spPr/>
-        <p:txBody>
-          <a:bodyPr/>
-          <a:lstStyle/>
-          <a:p>
-            <a:r>
-              <a:rPr lang="en-CA" dirty="0"/>
-              <a:t>Winter 2022</a:t>
-            </a:r>
-          </a:p>
-        </p:txBody>
-      </p:sp>
-      <p:sp>
-        <p:nvSpPr>
           <p:cNvPr id="10" name="Footer Placeholder 9"/>
           <p:cNvSpPr>
             <a:spLocks noGrp="1"/>
@@ -10231,7 +9994,7 @@
     </p:spTree>
     <p:extLst>
       <p:ext uri="{BB962C8B-B14F-4D97-AF65-F5344CB8AC3E}">
-        <p14:creationId xmlns:p14="http://schemas.microsoft.com/office/powerpoint/2010/main" val="3107128514"/>
+        <p14:creationId xmlns:p14="http://schemas.microsoft.com/office/powerpoint/2010/main" xmlns="" val="3107128514"/>
       </p:ext>
     </p:extLst>
   </p:cSld>
@@ -10433,28 +10196,6 @@
       </p:sp>
       <p:sp>
         <p:nvSpPr>
-          <p:cNvPr id="6" name="Date Placeholder 5"/>
-          <p:cNvSpPr>
-            <a:spLocks noGrp="1"/>
-          </p:cNvSpPr>
-          <p:nvPr>
-            <p:ph type="dt" sz="half" idx="2"/>
-          </p:nvPr>
-        </p:nvSpPr>
-        <p:spPr/>
-        <p:txBody>
-          <a:bodyPr/>
-          <a:lstStyle/>
-          <a:p>
-            <a:r>
-              <a:rPr lang="en-CA" dirty="0"/>
-              <a:t>Winter 2022</a:t>
-            </a:r>
-          </a:p>
-        </p:txBody>
-      </p:sp>
-      <p:sp>
-        <p:nvSpPr>
           <p:cNvPr id="10" name="Footer Placeholder 9"/>
           <p:cNvSpPr>
             <a:spLocks noGrp="1"/>
@@ -10505,7 +10246,7 @@
     </p:spTree>
     <p:extLst>
       <p:ext uri="{BB962C8B-B14F-4D97-AF65-F5344CB8AC3E}">
-        <p14:creationId xmlns:p14="http://schemas.microsoft.com/office/powerpoint/2010/main" val="1161006655"/>
+        <p14:creationId xmlns:p14="http://schemas.microsoft.com/office/powerpoint/2010/main" xmlns="" val="1161006655"/>
       </p:ext>
     </p:extLst>
   </p:cSld>
@@ -10624,28 +10365,6 @@
       </p:sp>
       <p:sp>
         <p:nvSpPr>
-          <p:cNvPr id="6" name="Date Placeholder 5"/>
-          <p:cNvSpPr>
-            <a:spLocks noGrp="1"/>
-          </p:cNvSpPr>
-          <p:nvPr>
-            <p:ph type="dt" sz="half" idx="2"/>
-          </p:nvPr>
-        </p:nvSpPr>
-        <p:spPr/>
-        <p:txBody>
-          <a:bodyPr/>
-          <a:lstStyle/>
-          <a:p>
-            <a:r>
-              <a:rPr lang="en-CA" dirty="0"/>
-              <a:t>Winter 2022</a:t>
-            </a:r>
-          </a:p>
-        </p:txBody>
-      </p:sp>
-      <p:sp>
-        <p:nvSpPr>
           <p:cNvPr id="10" name="Footer Placeholder 9"/>
           <p:cNvSpPr>
             <a:spLocks noGrp="1"/>
@@ -10696,7 +10415,7 @@
     </p:spTree>
     <p:extLst>
       <p:ext uri="{BB962C8B-B14F-4D97-AF65-F5344CB8AC3E}">
-        <p14:creationId xmlns:p14="http://schemas.microsoft.com/office/powerpoint/2010/main" val="202686773"/>
+        <p14:creationId xmlns:p14="http://schemas.microsoft.com/office/powerpoint/2010/main" xmlns="" val="202686773"/>
       </p:ext>
     </p:extLst>
   </p:cSld>
@@ -10821,28 +10540,6 @@
       </p:sp>
       <p:sp>
         <p:nvSpPr>
-          <p:cNvPr id="6" name="Date Placeholder 5"/>
-          <p:cNvSpPr>
-            <a:spLocks noGrp="1"/>
-          </p:cNvSpPr>
-          <p:nvPr>
-            <p:ph type="dt" sz="half" idx="2"/>
-          </p:nvPr>
-        </p:nvSpPr>
-        <p:spPr/>
-        <p:txBody>
-          <a:bodyPr/>
-          <a:lstStyle/>
-          <a:p>
-            <a:r>
-              <a:rPr lang="en-CA" dirty="0"/>
-              <a:t>Winter 2022</a:t>
-            </a:r>
-          </a:p>
-        </p:txBody>
-      </p:sp>
-      <p:sp>
-        <p:nvSpPr>
           <p:cNvPr id="10" name="Footer Placeholder 9"/>
           <p:cNvSpPr>
             <a:spLocks noGrp="1"/>
@@ -10893,7 +10590,7 @@
     </p:spTree>
     <p:extLst>
       <p:ext uri="{BB962C8B-B14F-4D97-AF65-F5344CB8AC3E}">
-        <p14:creationId xmlns:p14="http://schemas.microsoft.com/office/powerpoint/2010/main" val="1490306992"/>
+        <p14:creationId xmlns:p14="http://schemas.microsoft.com/office/powerpoint/2010/main" xmlns="" val="1490306992"/>
       </p:ext>
     </p:extLst>
   </p:cSld>
@@ -11080,28 +10777,6 @@
       </p:sp>
       <p:sp>
         <p:nvSpPr>
-          <p:cNvPr id="6" name="Date Placeholder 5"/>
-          <p:cNvSpPr>
-            <a:spLocks noGrp="1"/>
-          </p:cNvSpPr>
-          <p:nvPr>
-            <p:ph type="dt" sz="half" idx="2"/>
-          </p:nvPr>
-        </p:nvSpPr>
-        <p:spPr/>
-        <p:txBody>
-          <a:bodyPr/>
-          <a:lstStyle/>
-          <a:p>
-            <a:r>
-              <a:rPr lang="en-CA" dirty="0"/>
-              <a:t>Winter 2022</a:t>
-            </a:r>
-          </a:p>
-        </p:txBody>
-      </p:sp>
-      <p:sp>
-        <p:nvSpPr>
           <p:cNvPr id="10" name="Footer Placeholder 9"/>
           <p:cNvSpPr>
             <a:spLocks noGrp="1"/>
@@ -11152,7 +10827,7 @@
     </p:spTree>
     <p:extLst>
       <p:ext uri="{BB962C8B-B14F-4D97-AF65-F5344CB8AC3E}">
-        <p14:creationId xmlns:p14="http://schemas.microsoft.com/office/powerpoint/2010/main" val="2609893494"/>
+        <p14:creationId xmlns:p14="http://schemas.microsoft.com/office/powerpoint/2010/main" xmlns="" val="2609893494"/>
       </p:ext>
     </p:extLst>
   </p:cSld>
@@ -11272,28 +10947,6 @@
       </p:sp>
       <p:sp>
         <p:nvSpPr>
-          <p:cNvPr id="6" name="Date Placeholder 5"/>
-          <p:cNvSpPr>
-            <a:spLocks noGrp="1"/>
-          </p:cNvSpPr>
-          <p:nvPr>
-            <p:ph type="dt" sz="half" idx="2"/>
-          </p:nvPr>
-        </p:nvSpPr>
-        <p:spPr/>
-        <p:txBody>
-          <a:bodyPr/>
-          <a:lstStyle/>
-          <a:p>
-            <a:r>
-              <a:rPr lang="en-CA" dirty="0"/>
-              <a:t>Winter 2022</a:t>
-            </a:r>
-          </a:p>
-        </p:txBody>
-      </p:sp>
-      <p:sp>
-        <p:nvSpPr>
           <p:cNvPr id="10" name="Footer Placeholder 9"/>
           <p:cNvSpPr>
             <a:spLocks noGrp="1"/>
@@ -11344,7 +10997,7 @@
     </p:spTree>
     <p:extLst>
       <p:ext uri="{BB962C8B-B14F-4D97-AF65-F5344CB8AC3E}">
-        <p14:creationId xmlns:p14="http://schemas.microsoft.com/office/powerpoint/2010/main" val="2325078793"/>
+        <p14:creationId xmlns:p14="http://schemas.microsoft.com/office/powerpoint/2010/main" xmlns="" val="2325078793"/>
       </p:ext>
     </p:extLst>
   </p:cSld>
@@ -11376,7 +11029,7 @@
           <p:cNvPr id="2" name="Title 1">
             <a:extLst>
               <a:ext uri="{FF2B5EF4-FFF2-40B4-BE49-F238E27FC236}">
-                <a16:creationId xmlns:a16="http://schemas.microsoft.com/office/drawing/2014/main" id="{D3144BBF-69E2-47B3-A5D4-FB03B54F0F96}"/>
+                <a16:creationId xmlns:a16="http://schemas.microsoft.com/office/drawing/2014/main" xmlns="" id="{D3144BBF-69E2-47B3-A5D4-FB03B54F0F96}"/>
               </a:ext>
             </a:extLst>
           </p:cNvPr>
@@ -11404,7 +11057,7 @@
           <p:cNvPr id="3" name="Content Placeholder 2">
             <a:extLst>
               <a:ext uri="{FF2B5EF4-FFF2-40B4-BE49-F238E27FC236}">
-                <a16:creationId xmlns:a16="http://schemas.microsoft.com/office/drawing/2014/main" id="{B981305C-A702-4FE5-A134-6B1E026A73CE}"/>
+                <a16:creationId xmlns:a16="http://schemas.microsoft.com/office/drawing/2014/main" xmlns="" id="{B981305C-A702-4FE5-A134-6B1E026A73CE}"/>
               </a:ext>
             </a:extLst>
           </p:cNvPr>
@@ -11491,68 +11144,10 @@
       </p:sp>
       <p:sp>
         <p:nvSpPr>
-          <p:cNvPr id="4" name="Date Placeholder 3">
-            <a:extLst>
-              <a:ext uri="{FF2B5EF4-FFF2-40B4-BE49-F238E27FC236}">
-                <a16:creationId xmlns:a16="http://schemas.microsoft.com/office/drawing/2014/main" id="{9FB63BE3-115F-452D-8EC4-E541392031DE}"/>
-              </a:ext>
-            </a:extLst>
-          </p:cNvPr>
-          <p:cNvSpPr>
-            <a:spLocks noGrp="1"/>
-          </p:cNvSpPr>
-          <p:nvPr>
-            <p:ph type="dt" sz="half" idx="2"/>
-          </p:nvPr>
-        </p:nvSpPr>
-        <p:spPr/>
-        <p:txBody>
-          <a:bodyPr/>
-          <a:lstStyle/>
-          <a:p>
-            <a:r>
-              <a:rPr lang="en-US"/>
-              <a:t>Fall 2016</a:t>
-            </a:r>
-            <a:endParaRPr lang="en-CA"/>
-          </a:p>
-        </p:txBody>
-      </p:sp>
-      <p:sp>
-        <p:nvSpPr>
-          <p:cNvPr id="5" name="Footer Placeholder 4">
-            <a:extLst>
-              <a:ext uri="{FF2B5EF4-FFF2-40B4-BE49-F238E27FC236}">
-                <a16:creationId xmlns:a16="http://schemas.microsoft.com/office/drawing/2014/main" id="{0677E3BD-4278-4A36-8A80-80663AB63F0D}"/>
-              </a:ext>
-            </a:extLst>
-          </p:cNvPr>
-          <p:cNvSpPr>
-            <a:spLocks noGrp="1"/>
-          </p:cNvSpPr>
-          <p:nvPr>
-            <p:ph type="ftr" sz="quarter" idx="3"/>
-          </p:nvPr>
-        </p:nvSpPr>
-        <p:spPr/>
-        <p:txBody>
-          <a:bodyPr/>
-          <a:lstStyle/>
-          <a:p>
-            <a:r>
-              <a:rPr lang="en-CA"/>
-              <a:t>CS 499: Honors Dissertation</a:t>
-            </a:r>
-            <a:endParaRPr lang="en-CA" dirty="0"/>
-          </a:p>
-        </p:txBody>
-      </p:sp>
-      <p:sp>
-        <p:nvSpPr>
           <p:cNvPr id="6" name="Slide Number Placeholder 5">
             <a:extLst>
               <a:ext uri="{FF2B5EF4-FFF2-40B4-BE49-F238E27FC236}">
-                <a16:creationId xmlns:a16="http://schemas.microsoft.com/office/drawing/2014/main" id="{E0B06360-FB4C-4A3F-AFC2-967508E6478B}"/>
+                <a16:creationId xmlns:a16="http://schemas.microsoft.com/office/drawing/2014/main" xmlns="" id="{E0B06360-FB4C-4A3F-AFC2-967508E6478B}"/>
               </a:ext>
             </a:extLst>
           </p:cNvPr>
@@ -11574,17 +11169,43 @@
               <a:t>25</a:t>
             </a:fld>
             <a:r>
-              <a:rPr lang="en-CA"/>
-              <a:t> / 32</a:t>
-            </a:r>
-            <a:endParaRPr lang="en-CA" dirty="0"/>
+              <a:rPr lang="en-CA" dirty="0"/>
+              <a:t> </a:t>
+            </a:r>
+          </a:p>
+        </p:txBody>
+      </p:sp>
+      <p:sp>
+        <p:nvSpPr>
+          <p:cNvPr id="7" name="Footer Placeholder 9"/>
+          <p:cNvSpPr>
+            <a:spLocks noGrp="1"/>
+          </p:cNvSpPr>
+          <p:nvPr>
+            <p:ph type="ftr" sz="quarter" idx="3"/>
+          </p:nvPr>
+        </p:nvSpPr>
+        <p:spPr>
+          <a:xfrm>
+            <a:off x="52387" y="6573836"/>
+            <a:ext cx="2986087" cy="365125"/>
+          </a:xfrm>
+        </p:spPr>
+        <p:txBody>
+          <a:bodyPr/>
+          <a:lstStyle/>
+          <a:p>
+            <a:r>
+              <a:rPr lang="en-CA" dirty="0"/>
+              <a:t>CS321: Advanced Programming Techniques</a:t>
+            </a:r>
           </a:p>
         </p:txBody>
       </p:sp>
     </p:spTree>
     <p:extLst>
       <p:ext uri="{BB962C8B-B14F-4D97-AF65-F5344CB8AC3E}">
-        <p14:creationId xmlns:p14="http://schemas.microsoft.com/office/powerpoint/2010/main" val="154311472"/>
+        <p14:creationId xmlns:p14="http://schemas.microsoft.com/office/powerpoint/2010/main" xmlns="" val="154311472"/>
       </p:ext>
     </p:extLst>
   </p:cSld>
@@ -11616,7 +11237,7 @@
           <p:cNvPr id="2" name="Title 1">
             <a:extLst>
               <a:ext uri="{FF2B5EF4-FFF2-40B4-BE49-F238E27FC236}">
-                <a16:creationId xmlns:a16="http://schemas.microsoft.com/office/drawing/2014/main" id="{D3144BBF-69E2-47B3-A5D4-FB03B54F0F96}"/>
+                <a16:creationId xmlns:a16="http://schemas.microsoft.com/office/drawing/2014/main" xmlns="" id="{D3144BBF-69E2-47B3-A5D4-FB03B54F0F96}"/>
               </a:ext>
             </a:extLst>
           </p:cNvPr>
@@ -11644,7 +11265,7 @@
           <p:cNvPr id="3" name="Content Placeholder 2">
             <a:extLst>
               <a:ext uri="{FF2B5EF4-FFF2-40B4-BE49-F238E27FC236}">
-                <a16:creationId xmlns:a16="http://schemas.microsoft.com/office/drawing/2014/main" id="{B981305C-A702-4FE5-A134-6B1E026A73CE}"/>
+                <a16:creationId xmlns:a16="http://schemas.microsoft.com/office/drawing/2014/main" xmlns="" id="{B981305C-A702-4FE5-A134-6B1E026A73CE}"/>
               </a:ext>
             </a:extLst>
           </p:cNvPr>
@@ -11731,68 +11352,10 @@
       </p:sp>
       <p:sp>
         <p:nvSpPr>
-          <p:cNvPr id="4" name="Date Placeholder 3">
-            <a:extLst>
-              <a:ext uri="{FF2B5EF4-FFF2-40B4-BE49-F238E27FC236}">
-                <a16:creationId xmlns:a16="http://schemas.microsoft.com/office/drawing/2014/main" id="{9FB63BE3-115F-452D-8EC4-E541392031DE}"/>
-              </a:ext>
-            </a:extLst>
-          </p:cNvPr>
-          <p:cNvSpPr>
-            <a:spLocks noGrp="1"/>
-          </p:cNvSpPr>
-          <p:nvPr>
-            <p:ph type="dt" sz="half" idx="2"/>
-          </p:nvPr>
-        </p:nvSpPr>
-        <p:spPr/>
-        <p:txBody>
-          <a:bodyPr/>
-          <a:lstStyle/>
-          <a:p>
-            <a:r>
-              <a:rPr lang="en-US"/>
-              <a:t>Fall 2016</a:t>
-            </a:r>
-            <a:endParaRPr lang="en-CA"/>
-          </a:p>
-        </p:txBody>
-      </p:sp>
-      <p:sp>
-        <p:nvSpPr>
-          <p:cNvPr id="5" name="Footer Placeholder 4">
-            <a:extLst>
-              <a:ext uri="{FF2B5EF4-FFF2-40B4-BE49-F238E27FC236}">
-                <a16:creationId xmlns:a16="http://schemas.microsoft.com/office/drawing/2014/main" id="{0677E3BD-4278-4A36-8A80-80663AB63F0D}"/>
-              </a:ext>
-            </a:extLst>
-          </p:cNvPr>
-          <p:cNvSpPr>
-            <a:spLocks noGrp="1"/>
-          </p:cNvSpPr>
-          <p:nvPr>
-            <p:ph type="ftr" sz="quarter" idx="3"/>
-          </p:nvPr>
-        </p:nvSpPr>
-        <p:spPr/>
-        <p:txBody>
-          <a:bodyPr/>
-          <a:lstStyle/>
-          <a:p>
-            <a:r>
-              <a:rPr lang="en-CA"/>
-              <a:t>CS 499: Honors Dissertation</a:t>
-            </a:r>
-            <a:endParaRPr lang="en-CA" dirty="0"/>
-          </a:p>
-        </p:txBody>
-      </p:sp>
-      <p:sp>
-        <p:nvSpPr>
           <p:cNvPr id="6" name="Slide Number Placeholder 5">
             <a:extLst>
               <a:ext uri="{FF2B5EF4-FFF2-40B4-BE49-F238E27FC236}">
-                <a16:creationId xmlns:a16="http://schemas.microsoft.com/office/drawing/2014/main" id="{E0B06360-FB4C-4A3F-AFC2-967508E6478B}"/>
+                <a16:creationId xmlns:a16="http://schemas.microsoft.com/office/drawing/2014/main" xmlns="" id="{E0B06360-FB4C-4A3F-AFC2-967508E6478B}"/>
               </a:ext>
             </a:extLst>
           </p:cNvPr>
@@ -11814,17 +11377,43 @@
               <a:t>26</a:t>
             </a:fld>
             <a:r>
-              <a:rPr lang="en-CA"/>
-              <a:t> / 32</a:t>
-            </a:r>
-            <a:endParaRPr lang="en-CA" dirty="0"/>
+              <a:rPr lang="en-CA" dirty="0"/>
+              <a:t> </a:t>
+            </a:r>
+          </a:p>
+        </p:txBody>
+      </p:sp>
+      <p:sp>
+        <p:nvSpPr>
+          <p:cNvPr id="7" name="Footer Placeholder 9"/>
+          <p:cNvSpPr>
+            <a:spLocks noGrp="1"/>
+          </p:cNvSpPr>
+          <p:nvPr>
+            <p:ph type="ftr" sz="quarter" idx="3"/>
+          </p:nvPr>
+        </p:nvSpPr>
+        <p:spPr>
+          <a:xfrm>
+            <a:off x="52387" y="6573836"/>
+            <a:ext cx="2986087" cy="365125"/>
+          </a:xfrm>
+        </p:spPr>
+        <p:txBody>
+          <a:bodyPr/>
+          <a:lstStyle/>
+          <a:p>
+            <a:r>
+              <a:rPr lang="en-CA" dirty="0"/>
+              <a:t>CS321: Advanced Programming Techniques</a:t>
+            </a:r>
           </a:p>
         </p:txBody>
       </p:sp>
     </p:spTree>
     <p:extLst>
       <p:ext uri="{BB962C8B-B14F-4D97-AF65-F5344CB8AC3E}">
-        <p14:creationId xmlns:p14="http://schemas.microsoft.com/office/powerpoint/2010/main" val="697461361"/>
+        <p14:creationId xmlns:p14="http://schemas.microsoft.com/office/powerpoint/2010/main" xmlns="" val="697461361"/>
       </p:ext>
     </p:extLst>
   </p:cSld>
@@ -11856,7 +11445,7 @@
           <p:cNvPr id="2" name="Title 1">
             <a:extLst>
               <a:ext uri="{FF2B5EF4-FFF2-40B4-BE49-F238E27FC236}">
-                <a16:creationId xmlns:a16="http://schemas.microsoft.com/office/drawing/2014/main" id="{0A921011-18FC-475B-B283-A4E0D7C676E2}"/>
+                <a16:creationId xmlns:a16="http://schemas.microsoft.com/office/drawing/2014/main" xmlns="" id="{0A921011-18FC-475B-B283-A4E0D7C676E2}"/>
               </a:ext>
             </a:extLst>
           </p:cNvPr>
@@ -11884,7 +11473,7 @@
           <p:cNvPr id="3" name="Content Placeholder 2">
             <a:extLst>
               <a:ext uri="{FF2B5EF4-FFF2-40B4-BE49-F238E27FC236}">
-                <a16:creationId xmlns:a16="http://schemas.microsoft.com/office/drawing/2014/main" id="{E519EC20-1B41-4FDC-B979-74F142F690A2}"/>
+                <a16:creationId xmlns:a16="http://schemas.microsoft.com/office/drawing/2014/main" xmlns="" id="{E519EC20-1B41-4FDC-B979-74F142F690A2}"/>
               </a:ext>
             </a:extLst>
           </p:cNvPr>
@@ -11935,68 +11524,10 @@
       </p:sp>
       <p:sp>
         <p:nvSpPr>
-          <p:cNvPr id="4" name="Date Placeholder 3">
-            <a:extLst>
-              <a:ext uri="{FF2B5EF4-FFF2-40B4-BE49-F238E27FC236}">
-                <a16:creationId xmlns:a16="http://schemas.microsoft.com/office/drawing/2014/main" id="{1B6B3F29-8166-4EC9-A2E3-8D6AA0713308}"/>
-              </a:ext>
-            </a:extLst>
-          </p:cNvPr>
-          <p:cNvSpPr>
-            <a:spLocks noGrp="1"/>
-          </p:cNvSpPr>
-          <p:nvPr>
-            <p:ph type="dt" sz="half" idx="2"/>
-          </p:nvPr>
-        </p:nvSpPr>
-        <p:spPr/>
-        <p:txBody>
-          <a:bodyPr/>
-          <a:lstStyle/>
-          <a:p>
-            <a:r>
-              <a:rPr lang="en-US"/>
-              <a:t>Fall 2016</a:t>
-            </a:r>
-            <a:endParaRPr lang="en-CA"/>
-          </a:p>
-        </p:txBody>
-      </p:sp>
-      <p:sp>
-        <p:nvSpPr>
-          <p:cNvPr id="5" name="Footer Placeholder 4">
-            <a:extLst>
-              <a:ext uri="{FF2B5EF4-FFF2-40B4-BE49-F238E27FC236}">
-                <a16:creationId xmlns:a16="http://schemas.microsoft.com/office/drawing/2014/main" id="{A31B18EA-94B1-423D-9E2A-A0ACB05FB946}"/>
-              </a:ext>
-            </a:extLst>
-          </p:cNvPr>
-          <p:cNvSpPr>
-            <a:spLocks noGrp="1"/>
-          </p:cNvSpPr>
-          <p:nvPr>
-            <p:ph type="ftr" sz="quarter" idx="3"/>
-          </p:nvPr>
-        </p:nvSpPr>
-        <p:spPr/>
-        <p:txBody>
-          <a:bodyPr/>
-          <a:lstStyle/>
-          <a:p>
-            <a:r>
-              <a:rPr lang="en-CA"/>
-              <a:t>CS 499: Honors Dissertation</a:t>
-            </a:r>
-            <a:endParaRPr lang="en-CA" dirty="0"/>
-          </a:p>
-        </p:txBody>
-      </p:sp>
-      <p:sp>
-        <p:nvSpPr>
           <p:cNvPr id="6" name="Slide Number Placeholder 5">
             <a:extLst>
               <a:ext uri="{FF2B5EF4-FFF2-40B4-BE49-F238E27FC236}">
-                <a16:creationId xmlns:a16="http://schemas.microsoft.com/office/drawing/2014/main" id="{2BFBBD55-E3C1-4C22-8665-BC6CC0B5B10F}"/>
+                <a16:creationId xmlns:a16="http://schemas.microsoft.com/office/drawing/2014/main" xmlns="" id="{2BFBBD55-E3C1-4C22-8665-BC6CC0B5B10F}"/>
               </a:ext>
             </a:extLst>
           </p:cNvPr>
@@ -12018,17 +11549,43 @@
               <a:t>27</a:t>
             </a:fld>
             <a:r>
-              <a:rPr lang="en-CA"/>
-              <a:t> / 32</a:t>
-            </a:r>
-            <a:endParaRPr lang="en-CA" dirty="0"/>
+              <a:rPr lang="en-CA" dirty="0"/>
+              <a:t> </a:t>
+            </a:r>
+          </a:p>
+        </p:txBody>
+      </p:sp>
+      <p:sp>
+        <p:nvSpPr>
+          <p:cNvPr id="7" name="Footer Placeholder 9"/>
+          <p:cNvSpPr>
+            <a:spLocks noGrp="1"/>
+          </p:cNvSpPr>
+          <p:nvPr>
+            <p:ph type="ftr" sz="quarter" idx="3"/>
+          </p:nvPr>
+        </p:nvSpPr>
+        <p:spPr>
+          <a:xfrm>
+            <a:off x="52387" y="6573836"/>
+            <a:ext cx="2986087" cy="365125"/>
+          </a:xfrm>
+        </p:spPr>
+        <p:txBody>
+          <a:bodyPr/>
+          <a:lstStyle/>
+          <a:p>
+            <a:r>
+              <a:rPr lang="en-CA" dirty="0"/>
+              <a:t>CS321: Advanced Programming Techniques</a:t>
+            </a:r>
           </a:p>
         </p:txBody>
       </p:sp>
     </p:spTree>
     <p:extLst>
       <p:ext uri="{BB962C8B-B14F-4D97-AF65-F5344CB8AC3E}">
-        <p14:creationId xmlns:p14="http://schemas.microsoft.com/office/powerpoint/2010/main" val="2701822725"/>
+        <p14:creationId xmlns:p14="http://schemas.microsoft.com/office/powerpoint/2010/main" xmlns="" val="2701822725"/>
       </p:ext>
     </p:extLst>
   </p:cSld>
@@ -12203,28 +11760,6 @@
       </p:sp>
       <p:sp>
         <p:nvSpPr>
-          <p:cNvPr id="6" name="Date Placeholder 5"/>
-          <p:cNvSpPr>
-            <a:spLocks noGrp="1"/>
-          </p:cNvSpPr>
-          <p:nvPr>
-            <p:ph type="dt" sz="half" idx="2"/>
-          </p:nvPr>
-        </p:nvSpPr>
-        <p:spPr/>
-        <p:txBody>
-          <a:bodyPr/>
-          <a:lstStyle/>
-          <a:p>
-            <a:r>
-              <a:rPr lang="en-CA" dirty="0"/>
-              <a:t>Winter 2022</a:t>
-            </a:r>
-          </a:p>
-        </p:txBody>
-      </p:sp>
-      <p:sp>
-        <p:nvSpPr>
           <p:cNvPr id="10" name="Footer Placeholder 9"/>
           <p:cNvSpPr>
             <a:spLocks noGrp="1"/>
@@ -12277,7 +11812,7 @@
           <p:cNvPr id="7" name="Text Box 2">
             <a:extLst>
               <a:ext uri="{FF2B5EF4-FFF2-40B4-BE49-F238E27FC236}">
-                <a16:creationId xmlns:a16="http://schemas.microsoft.com/office/drawing/2014/main" id="{FCE9DDDC-8F7E-44FA-97F1-BF6F02C1B1A8}"/>
+                <a16:creationId xmlns:a16="http://schemas.microsoft.com/office/drawing/2014/main" xmlns="" id="{FCE9DDDC-8F7E-44FA-97F1-BF6F02C1B1A8}"/>
               </a:ext>
             </a:extLst>
           </p:cNvPr>
@@ -12385,7 +11920,7 @@
     </p:spTree>
     <p:extLst>
       <p:ext uri="{BB962C8B-B14F-4D97-AF65-F5344CB8AC3E}">
-        <p14:creationId xmlns:p14="http://schemas.microsoft.com/office/powerpoint/2010/main" val="3854217108"/>
+        <p14:creationId xmlns:p14="http://schemas.microsoft.com/office/powerpoint/2010/main" xmlns="" val="3854217108"/>
       </p:ext>
     </p:extLst>
   </p:cSld>
@@ -12471,28 +12006,6 @@
       </p:sp>
       <p:sp>
         <p:nvSpPr>
-          <p:cNvPr id="6" name="Date Placeholder 5"/>
-          <p:cNvSpPr>
-            <a:spLocks noGrp="1"/>
-          </p:cNvSpPr>
-          <p:nvPr>
-            <p:ph type="dt" sz="half" idx="2"/>
-          </p:nvPr>
-        </p:nvSpPr>
-        <p:spPr/>
-        <p:txBody>
-          <a:bodyPr/>
-          <a:lstStyle/>
-          <a:p>
-            <a:r>
-              <a:rPr lang="en-CA" dirty="0"/>
-              <a:t>Winter 2022</a:t>
-            </a:r>
-          </a:p>
-        </p:txBody>
-      </p:sp>
-      <p:sp>
-        <p:nvSpPr>
           <p:cNvPr id="10" name="Footer Placeholder 9"/>
           <p:cNvSpPr>
             <a:spLocks noGrp="1"/>
@@ -12545,7 +12058,7 @@
           <p:cNvPr id="7" name="Text Box 2">
             <a:extLst>
               <a:ext uri="{FF2B5EF4-FFF2-40B4-BE49-F238E27FC236}">
-                <a16:creationId xmlns:a16="http://schemas.microsoft.com/office/drawing/2014/main" id="{F5F1EF1B-FDCC-44CE-90EB-0CB7313C951B}"/>
+                <a16:creationId xmlns:a16="http://schemas.microsoft.com/office/drawing/2014/main" xmlns="" id="{F5F1EF1B-FDCC-44CE-90EB-0CB7313C951B}"/>
               </a:ext>
             </a:extLst>
           </p:cNvPr>
@@ -12571,7 +12084,7 @@
           <a:effectLst/>
           <a:extLst>
             <a:ext uri="{91240B29-F687-4F45-9708-019B960494DF}">
-              <a14:hiddenLine xmlns:a14="http://schemas.microsoft.com/office/drawing/2010/main" w="9525">
+              <a14:hiddenLine xmlns:a14="http://schemas.microsoft.com/office/drawing/2010/main" xmlns="" w="9525">
                 <a:solidFill>
                   <a:schemeClr val="tx1"/>
                 </a:solidFill>
@@ -12581,7 +12094,7 @@
               </a14:hiddenLine>
             </a:ext>
             <a:ext uri="{AF507438-7753-43E0-B8FC-AC1667EBCBE1}">
-              <a14:hiddenEffects xmlns:a14="http://schemas.microsoft.com/office/drawing/2010/main">
+              <a14:hiddenEffects xmlns:a14="http://schemas.microsoft.com/office/drawing/2010/main" xmlns="">
                 <a:effectLst>
                   <a:outerShdw blurRad="63500" dist="38099" dir="2700000" algn="ctr" rotWithShape="0">
                     <a:schemeClr val="bg2">
@@ -13329,7 +12842,7 @@
     </p:spTree>
     <p:extLst>
       <p:ext uri="{BB962C8B-B14F-4D97-AF65-F5344CB8AC3E}">
-        <p14:creationId xmlns:p14="http://schemas.microsoft.com/office/powerpoint/2010/main" val="2052681984"/>
+        <p14:creationId xmlns:p14="http://schemas.microsoft.com/office/powerpoint/2010/main" xmlns="" val="2052681984"/>
       </p:ext>
     </p:extLst>
   </p:cSld>
@@ -13471,28 +12984,6 @@
       </p:sp>
       <p:sp>
         <p:nvSpPr>
-          <p:cNvPr id="6" name="Date Placeholder 5"/>
-          <p:cNvSpPr>
-            <a:spLocks noGrp="1"/>
-          </p:cNvSpPr>
-          <p:nvPr>
-            <p:ph type="dt" sz="half" idx="2"/>
-          </p:nvPr>
-        </p:nvSpPr>
-        <p:spPr/>
-        <p:txBody>
-          <a:bodyPr/>
-          <a:lstStyle/>
-          <a:p>
-            <a:r>
-              <a:rPr lang="en-CA" dirty="0"/>
-              <a:t>Winter 2022</a:t>
-            </a:r>
-          </a:p>
-        </p:txBody>
-      </p:sp>
-      <p:sp>
-        <p:nvSpPr>
           <p:cNvPr id="10" name="Footer Placeholder 9"/>
           <p:cNvSpPr>
             <a:spLocks noGrp="1"/>
@@ -13543,7 +13034,7 @@
     </p:spTree>
     <p:extLst>
       <p:ext uri="{BB962C8B-B14F-4D97-AF65-F5344CB8AC3E}">
-        <p14:creationId xmlns:p14="http://schemas.microsoft.com/office/powerpoint/2010/main" val="51204498"/>
+        <p14:creationId xmlns:p14="http://schemas.microsoft.com/office/powerpoint/2010/main" xmlns="" val="51204498"/>
       </p:ext>
     </p:extLst>
   </p:cSld>
@@ -13628,28 +13119,6 @@
       </p:sp>
       <p:sp>
         <p:nvSpPr>
-          <p:cNvPr id="6" name="Date Placeholder 5"/>
-          <p:cNvSpPr>
-            <a:spLocks noGrp="1"/>
-          </p:cNvSpPr>
-          <p:nvPr>
-            <p:ph type="dt" sz="half" idx="2"/>
-          </p:nvPr>
-        </p:nvSpPr>
-        <p:spPr/>
-        <p:txBody>
-          <a:bodyPr/>
-          <a:lstStyle/>
-          <a:p>
-            <a:r>
-              <a:rPr lang="en-CA" dirty="0"/>
-              <a:t>Winter 2022</a:t>
-            </a:r>
-          </a:p>
-        </p:txBody>
-      </p:sp>
-      <p:sp>
-        <p:nvSpPr>
           <p:cNvPr id="10" name="Footer Placeholder 9"/>
           <p:cNvSpPr>
             <a:spLocks noGrp="1"/>
@@ -13702,7 +13171,7 @@
           <p:cNvPr id="8" name="Text Box 2">
             <a:extLst>
               <a:ext uri="{FF2B5EF4-FFF2-40B4-BE49-F238E27FC236}">
-                <a16:creationId xmlns:a16="http://schemas.microsoft.com/office/drawing/2014/main" id="{5B1405A6-0C74-4EF0-8929-81614C79A953}"/>
+                <a16:creationId xmlns:a16="http://schemas.microsoft.com/office/drawing/2014/main" xmlns="" id="{5B1405A6-0C74-4EF0-8929-81614C79A953}"/>
               </a:ext>
             </a:extLst>
           </p:cNvPr>
@@ -13728,7 +13197,7 @@
           <a:effectLst/>
           <a:extLst>
             <a:ext uri="{91240B29-F687-4F45-9708-019B960494DF}">
-              <a14:hiddenLine xmlns:a14="http://schemas.microsoft.com/office/drawing/2010/main" w="9525">
+              <a14:hiddenLine xmlns:a14="http://schemas.microsoft.com/office/drawing/2010/main" xmlns="" w="9525">
                 <a:solidFill>
                   <a:schemeClr val="tx1"/>
                 </a:solidFill>
@@ -13738,7 +13207,7 @@
               </a14:hiddenLine>
             </a:ext>
             <a:ext uri="{AF507438-7753-43E0-B8FC-AC1667EBCBE1}">
-              <a14:hiddenEffects xmlns:a14="http://schemas.microsoft.com/office/drawing/2010/main">
+              <a14:hiddenEffects xmlns:a14="http://schemas.microsoft.com/office/drawing/2010/main" xmlns="">
                 <a:effectLst>
                   <a:outerShdw blurRad="63500" dist="38099" dir="2700000" algn="ctr" rotWithShape="0">
                     <a:schemeClr val="bg2">
@@ -13861,7 +13330,7 @@
           <p:cNvPr id="9" name="Text Box 4">
             <a:extLst>
               <a:ext uri="{FF2B5EF4-FFF2-40B4-BE49-F238E27FC236}">
-                <a16:creationId xmlns:a16="http://schemas.microsoft.com/office/drawing/2014/main" id="{CCB8AA77-4B0D-4B6B-82D7-3BA5489CF8EC}"/>
+                <a16:creationId xmlns:a16="http://schemas.microsoft.com/office/drawing/2014/main" xmlns="" id="{CCB8AA77-4B0D-4B6B-82D7-3BA5489CF8EC}"/>
               </a:ext>
             </a:extLst>
           </p:cNvPr>
@@ -13885,14 +13354,14 @@
           <a:effectLst/>
           <a:extLst>
             <a:ext uri="{909E8E84-426E-40DD-AFC4-6F175D3DCCD1}">
-              <a14:hiddenFill xmlns:a14="http://schemas.microsoft.com/office/drawing/2010/main">
+              <a14:hiddenFill xmlns:a14="http://schemas.microsoft.com/office/drawing/2010/main" xmlns="">
                 <a:solidFill>
                   <a:schemeClr val="accent1"/>
                 </a:solidFill>
               </a14:hiddenFill>
             </a:ext>
             <a:ext uri="{91240B29-F687-4F45-9708-019B960494DF}">
-              <a14:hiddenLine xmlns:a14="http://schemas.microsoft.com/office/drawing/2010/main" w="9525">
+              <a14:hiddenLine xmlns:a14="http://schemas.microsoft.com/office/drawing/2010/main" xmlns="" w="9525">
                 <a:solidFill>
                   <a:schemeClr val="tx1"/>
                 </a:solidFill>
@@ -13902,7 +13371,7 @@
               </a14:hiddenLine>
             </a:ext>
             <a:ext uri="{AF507438-7753-43E0-B8FC-AC1667EBCBE1}">
-              <a14:hiddenEffects xmlns:a14="http://schemas.microsoft.com/office/drawing/2010/main">
+              <a14:hiddenEffects xmlns:a14="http://schemas.microsoft.com/office/drawing/2010/main" xmlns="">
                 <a:effectLst>
                   <a:outerShdw blurRad="63500" dist="38099" dir="2700000" algn="ctr" rotWithShape="0">
                     <a:schemeClr val="bg2">
@@ -14101,7 +13570,7 @@
     </p:spTree>
     <p:extLst>
       <p:ext uri="{BB962C8B-B14F-4D97-AF65-F5344CB8AC3E}">
-        <p14:creationId xmlns:p14="http://schemas.microsoft.com/office/powerpoint/2010/main" val="1983291541"/>
+        <p14:creationId xmlns:p14="http://schemas.microsoft.com/office/powerpoint/2010/main" xmlns="" val="1983291541"/>
       </p:ext>
     </p:extLst>
   </p:cSld>
@@ -14133,7 +13602,7 @@
           <p:cNvPr id="2" name="Title 1">
             <a:extLst>
               <a:ext uri="{FF2B5EF4-FFF2-40B4-BE49-F238E27FC236}">
-                <a16:creationId xmlns:a16="http://schemas.microsoft.com/office/drawing/2014/main" id="{0A921011-18FC-475B-B283-A4E0D7C676E2}"/>
+                <a16:creationId xmlns:a16="http://schemas.microsoft.com/office/drawing/2014/main" xmlns="" id="{0A921011-18FC-475B-B283-A4E0D7C676E2}"/>
               </a:ext>
             </a:extLst>
           </p:cNvPr>
@@ -14161,7 +13630,7 @@
           <p:cNvPr id="3" name="Content Placeholder 2">
             <a:extLst>
               <a:ext uri="{FF2B5EF4-FFF2-40B4-BE49-F238E27FC236}">
-                <a16:creationId xmlns:a16="http://schemas.microsoft.com/office/drawing/2014/main" id="{E519EC20-1B41-4FDC-B979-74F142F690A2}"/>
+                <a16:creationId xmlns:a16="http://schemas.microsoft.com/office/drawing/2014/main" xmlns="" id="{E519EC20-1B41-4FDC-B979-74F142F690A2}"/>
               </a:ext>
             </a:extLst>
           </p:cNvPr>
@@ -14209,68 +13678,10 @@
       </p:sp>
       <p:sp>
         <p:nvSpPr>
-          <p:cNvPr id="4" name="Date Placeholder 3">
-            <a:extLst>
-              <a:ext uri="{FF2B5EF4-FFF2-40B4-BE49-F238E27FC236}">
-                <a16:creationId xmlns:a16="http://schemas.microsoft.com/office/drawing/2014/main" id="{1B6B3F29-8166-4EC9-A2E3-8D6AA0713308}"/>
-              </a:ext>
-            </a:extLst>
-          </p:cNvPr>
-          <p:cNvSpPr>
-            <a:spLocks noGrp="1"/>
-          </p:cNvSpPr>
-          <p:nvPr>
-            <p:ph type="dt" sz="half" idx="2"/>
-          </p:nvPr>
-        </p:nvSpPr>
-        <p:spPr/>
-        <p:txBody>
-          <a:bodyPr/>
-          <a:lstStyle/>
-          <a:p>
-            <a:r>
-              <a:rPr lang="en-US"/>
-              <a:t>Fall 2016</a:t>
-            </a:r>
-            <a:endParaRPr lang="en-CA"/>
-          </a:p>
-        </p:txBody>
-      </p:sp>
-      <p:sp>
-        <p:nvSpPr>
-          <p:cNvPr id="5" name="Footer Placeholder 4">
-            <a:extLst>
-              <a:ext uri="{FF2B5EF4-FFF2-40B4-BE49-F238E27FC236}">
-                <a16:creationId xmlns:a16="http://schemas.microsoft.com/office/drawing/2014/main" id="{A31B18EA-94B1-423D-9E2A-A0ACB05FB946}"/>
-              </a:ext>
-            </a:extLst>
-          </p:cNvPr>
-          <p:cNvSpPr>
-            <a:spLocks noGrp="1"/>
-          </p:cNvSpPr>
-          <p:nvPr>
-            <p:ph type="ftr" sz="quarter" idx="3"/>
-          </p:nvPr>
-        </p:nvSpPr>
-        <p:spPr/>
-        <p:txBody>
-          <a:bodyPr/>
-          <a:lstStyle/>
-          <a:p>
-            <a:r>
-              <a:rPr lang="en-CA"/>
-              <a:t>CS 499: Honors Dissertation</a:t>
-            </a:r>
-            <a:endParaRPr lang="en-CA" dirty="0"/>
-          </a:p>
-        </p:txBody>
-      </p:sp>
-      <p:sp>
-        <p:nvSpPr>
           <p:cNvPr id="6" name="Slide Number Placeholder 5">
             <a:extLst>
               <a:ext uri="{FF2B5EF4-FFF2-40B4-BE49-F238E27FC236}">
-                <a16:creationId xmlns:a16="http://schemas.microsoft.com/office/drawing/2014/main" id="{2BFBBD55-E3C1-4C22-8665-BC6CC0B5B10F}"/>
+                <a16:creationId xmlns:a16="http://schemas.microsoft.com/office/drawing/2014/main" xmlns="" id="{2BFBBD55-E3C1-4C22-8665-BC6CC0B5B10F}"/>
               </a:ext>
             </a:extLst>
           </p:cNvPr>
@@ -14299,10 +13710,37 @@
           </a:p>
         </p:txBody>
       </p:sp>
+      <p:sp>
+        <p:nvSpPr>
+          <p:cNvPr id="7" name="Footer Placeholder 9"/>
+          <p:cNvSpPr>
+            <a:spLocks noGrp="1"/>
+          </p:cNvSpPr>
+          <p:nvPr>
+            <p:ph type="ftr" sz="quarter" idx="3"/>
+          </p:nvPr>
+        </p:nvSpPr>
+        <p:spPr>
+          <a:xfrm>
+            <a:off x="52387" y="6573836"/>
+            <a:ext cx="2986087" cy="365125"/>
+          </a:xfrm>
+        </p:spPr>
+        <p:txBody>
+          <a:bodyPr/>
+          <a:lstStyle/>
+          <a:p>
+            <a:r>
+              <a:rPr lang="en-CA" dirty="0"/>
+              <a:t>CS321: Advanced Programming Techniques</a:t>
+            </a:r>
+          </a:p>
+        </p:txBody>
+      </p:sp>
     </p:spTree>
     <p:extLst>
       <p:ext uri="{BB962C8B-B14F-4D97-AF65-F5344CB8AC3E}">
-        <p14:creationId xmlns:p14="http://schemas.microsoft.com/office/powerpoint/2010/main" val="2735913249"/>
+        <p14:creationId xmlns:p14="http://schemas.microsoft.com/office/powerpoint/2010/main" xmlns="" val="2735913249"/>
       </p:ext>
     </p:extLst>
   </p:cSld>
@@ -14513,28 +13951,6 @@
       </p:sp>
       <p:sp>
         <p:nvSpPr>
-          <p:cNvPr id="6" name="Date Placeholder 5"/>
-          <p:cNvSpPr>
-            <a:spLocks noGrp="1"/>
-          </p:cNvSpPr>
-          <p:nvPr>
-            <p:ph type="dt" sz="half" idx="2"/>
-          </p:nvPr>
-        </p:nvSpPr>
-        <p:spPr/>
-        <p:txBody>
-          <a:bodyPr/>
-          <a:lstStyle/>
-          <a:p>
-            <a:r>
-              <a:rPr lang="en-CA" dirty="0"/>
-              <a:t>Winter 2022</a:t>
-            </a:r>
-          </a:p>
-        </p:txBody>
-      </p:sp>
-      <p:sp>
-        <p:nvSpPr>
           <p:cNvPr id="10" name="Footer Placeholder 9"/>
           <p:cNvSpPr>
             <a:spLocks noGrp="1"/>
@@ -14585,7 +14001,7 @@
     </p:spTree>
     <p:extLst>
       <p:ext uri="{BB962C8B-B14F-4D97-AF65-F5344CB8AC3E}">
-        <p14:creationId xmlns:p14="http://schemas.microsoft.com/office/powerpoint/2010/main" val="355146014"/>
+        <p14:creationId xmlns:p14="http://schemas.microsoft.com/office/powerpoint/2010/main" xmlns="" val="355146014"/>
       </p:ext>
     </p:extLst>
   </p:cSld>
@@ -14687,28 +14103,6 @@
       </p:sp>
       <p:sp>
         <p:nvSpPr>
-          <p:cNvPr id="6" name="Date Placeholder 5"/>
-          <p:cNvSpPr>
-            <a:spLocks noGrp="1"/>
-          </p:cNvSpPr>
-          <p:nvPr>
-            <p:ph type="dt" sz="half" idx="2"/>
-          </p:nvPr>
-        </p:nvSpPr>
-        <p:spPr/>
-        <p:txBody>
-          <a:bodyPr/>
-          <a:lstStyle/>
-          <a:p>
-            <a:r>
-              <a:rPr lang="en-CA" dirty="0"/>
-              <a:t>Winter 2022</a:t>
-            </a:r>
-          </a:p>
-        </p:txBody>
-      </p:sp>
-      <p:sp>
-        <p:nvSpPr>
           <p:cNvPr id="10" name="Footer Placeholder 9"/>
           <p:cNvSpPr>
             <a:spLocks noGrp="1"/>
@@ -14759,7 +14153,7 @@
     </p:spTree>
     <p:extLst>
       <p:ext uri="{BB962C8B-B14F-4D97-AF65-F5344CB8AC3E}">
-        <p14:creationId xmlns:p14="http://schemas.microsoft.com/office/powerpoint/2010/main" val="3357882366"/>
+        <p14:creationId xmlns:p14="http://schemas.microsoft.com/office/powerpoint/2010/main" xmlns="" val="3357882366"/>
       </p:ext>
     </p:extLst>
   </p:cSld>
@@ -14882,28 +14276,6 @@
       </p:sp>
       <p:sp>
         <p:nvSpPr>
-          <p:cNvPr id="6" name="Date Placeholder 5"/>
-          <p:cNvSpPr>
-            <a:spLocks noGrp="1"/>
-          </p:cNvSpPr>
-          <p:nvPr>
-            <p:ph type="dt" sz="half" idx="2"/>
-          </p:nvPr>
-        </p:nvSpPr>
-        <p:spPr/>
-        <p:txBody>
-          <a:bodyPr/>
-          <a:lstStyle/>
-          <a:p>
-            <a:r>
-              <a:rPr lang="en-CA" dirty="0"/>
-              <a:t>Winter 2022</a:t>
-            </a:r>
-          </a:p>
-        </p:txBody>
-      </p:sp>
-      <p:sp>
-        <p:nvSpPr>
           <p:cNvPr id="10" name="Footer Placeholder 9"/>
           <p:cNvSpPr>
             <a:spLocks noGrp="1"/>
@@ -14954,7 +14326,7 @@
     </p:spTree>
     <p:extLst>
       <p:ext uri="{BB962C8B-B14F-4D97-AF65-F5344CB8AC3E}">
-        <p14:creationId xmlns:p14="http://schemas.microsoft.com/office/powerpoint/2010/main" val="2425407270"/>
+        <p14:creationId xmlns:p14="http://schemas.microsoft.com/office/powerpoint/2010/main" xmlns="" val="2425407270"/>
       </p:ext>
     </p:extLst>
   </p:cSld>
@@ -15101,28 +14473,6 @@
       </p:sp>
       <p:sp>
         <p:nvSpPr>
-          <p:cNvPr id="6" name="Date Placeholder 5"/>
-          <p:cNvSpPr>
-            <a:spLocks noGrp="1"/>
-          </p:cNvSpPr>
-          <p:nvPr>
-            <p:ph type="dt" sz="half" idx="2"/>
-          </p:nvPr>
-        </p:nvSpPr>
-        <p:spPr/>
-        <p:txBody>
-          <a:bodyPr/>
-          <a:lstStyle/>
-          <a:p>
-            <a:r>
-              <a:rPr lang="en-CA" dirty="0"/>
-              <a:t>Winter 2022</a:t>
-            </a:r>
-          </a:p>
-        </p:txBody>
-      </p:sp>
-      <p:sp>
-        <p:nvSpPr>
           <p:cNvPr id="10" name="Footer Placeholder 9"/>
           <p:cNvSpPr>
             <a:spLocks noGrp="1"/>
@@ -15173,7 +14523,7 @@
     </p:spTree>
     <p:extLst>
       <p:ext uri="{BB962C8B-B14F-4D97-AF65-F5344CB8AC3E}">
-        <p14:creationId xmlns:p14="http://schemas.microsoft.com/office/powerpoint/2010/main" val="839201425"/>
+        <p14:creationId xmlns:p14="http://schemas.microsoft.com/office/powerpoint/2010/main" xmlns="" val="839201425"/>
       </p:ext>
     </p:extLst>
   </p:cSld>
@@ -15274,28 +14624,6 @@
       </p:sp>
       <p:sp>
         <p:nvSpPr>
-          <p:cNvPr id="6" name="Date Placeholder 5"/>
-          <p:cNvSpPr>
-            <a:spLocks noGrp="1"/>
-          </p:cNvSpPr>
-          <p:nvPr>
-            <p:ph type="dt" sz="half" idx="2"/>
-          </p:nvPr>
-        </p:nvSpPr>
-        <p:spPr/>
-        <p:txBody>
-          <a:bodyPr/>
-          <a:lstStyle/>
-          <a:p>
-            <a:r>
-              <a:rPr lang="en-CA" dirty="0"/>
-              <a:t>Winter 2022</a:t>
-            </a:r>
-          </a:p>
-        </p:txBody>
-      </p:sp>
-      <p:sp>
-        <p:nvSpPr>
           <p:cNvPr id="10" name="Footer Placeholder 9"/>
           <p:cNvSpPr>
             <a:spLocks noGrp="1"/>
@@ -15346,7 +14674,7 @@
     </p:spTree>
     <p:extLst>
       <p:ext uri="{BB962C8B-B14F-4D97-AF65-F5344CB8AC3E}">
-        <p14:creationId xmlns:p14="http://schemas.microsoft.com/office/powerpoint/2010/main" val="2336250104"/>
+        <p14:creationId xmlns:p14="http://schemas.microsoft.com/office/powerpoint/2010/main" xmlns="" val="2336250104"/>
       </p:ext>
     </p:extLst>
   </p:cSld>
@@ -15452,28 +14780,6 @@
       </p:sp>
       <p:sp>
         <p:nvSpPr>
-          <p:cNvPr id="6" name="Date Placeholder 5"/>
-          <p:cNvSpPr>
-            <a:spLocks noGrp="1"/>
-          </p:cNvSpPr>
-          <p:nvPr>
-            <p:ph type="dt" sz="half" idx="2"/>
-          </p:nvPr>
-        </p:nvSpPr>
-        <p:spPr/>
-        <p:txBody>
-          <a:bodyPr/>
-          <a:lstStyle/>
-          <a:p>
-            <a:r>
-              <a:rPr lang="en-CA" dirty="0"/>
-              <a:t>Winter 2022</a:t>
-            </a:r>
-          </a:p>
-        </p:txBody>
-      </p:sp>
-      <p:sp>
-        <p:nvSpPr>
           <p:cNvPr id="10" name="Footer Placeholder 9"/>
           <p:cNvSpPr>
             <a:spLocks noGrp="1"/>
@@ -15524,7 +14830,7 @@
     </p:spTree>
     <p:extLst>
       <p:ext uri="{BB962C8B-B14F-4D97-AF65-F5344CB8AC3E}">
-        <p14:creationId xmlns:p14="http://schemas.microsoft.com/office/powerpoint/2010/main" val="51877935"/>
+        <p14:creationId xmlns:p14="http://schemas.microsoft.com/office/powerpoint/2010/main" xmlns="" val="51877935"/>
       </p:ext>
     </p:extLst>
   </p:cSld>
@@ -15655,28 +14961,6 @@
       </p:sp>
       <p:sp>
         <p:nvSpPr>
-          <p:cNvPr id="6" name="Date Placeholder 5"/>
-          <p:cNvSpPr>
-            <a:spLocks noGrp="1"/>
-          </p:cNvSpPr>
-          <p:nvPr>
-            <p:ph type="dt" sz="half" idx="2"/>
-          </p:nvPr>
-        </p:nvSpPr>
-        <p:spPr/>
-        <p:txBody>
-          <a:bodyPr/>
-          <a:lstStyle/>
-          <a:p>
-            <a:r>
-              <a:rPr lang="en-CA" dirty="0"/>
-              <a:t>Winter 2022</a:t>
-            </a:r>
-          </a:p>
-        </p:txBody>
-      </p:sp>
-      <p:sp>
-        <p:nvSpPr>
           <p:cNvPr id="10" name="Footer Placeholder 9"/>
           <p:cNvSpPr>
             <a:spLocks noGrp="1"/>
@@ -15727,7 +15011,7 @@
     </p:spTree>
     <p:extLst>
       <p:ext uri="{BB962C8B-B14F-4D97-AF65-F5344CB8AC3E}">
-        <p14:creationId xmlns:p14="http://schemas.microsoft.com/office/powerpoint/2010/main" val="739683668"/>
+        <p14:creationId xmlns:p14="http://schemas.microsoft.com/office/powerpoint/2010/main" xmlns="" val="739683668"/>
       </p:ext>
     </p:extLst>
   </p:cSld>
@@ -15836,28 +15120,6 @@
       </p:sp>
       <p:sp>
         <p:nvSpPr>
-          <p:cNvPr id="6" name="Date Placeholder 5"/>
-          <p:cNvSpPr>
-            <a:spLocks noGrp="1"/>
-          </p:cNvSpPr>
-          <p:nvPr>
-            <p:ph type="dt" sz="half" idx="2"/>
-          </p:nvPr>
-        </p:nvSpPr>
-        <p:spPr/>
-        <p:txBody>
-          <a:bodyPr/>
-          <a:lstStyle/>
-          <a:p>
-            <a:r>
-              <a:rPr lang="en-CA" dirty="0"/>
-              <a:t>Winter 2022</a:t>
-            </a:r>
-          </a:p>
-        </p:txBody>
-      </p:sp>
-      <p:sp>
-        <p:nvSpPr>
           <p:cNvPr id="10" name="Footer Placeholder 9"/>
           <p:cNvSpPr>
             <a:spLocks noGrp="1"/>
@@ -15908,7 +15170,7 @@
     </p:spTree>
     <p:extLst>
       <p:ext uri="{BB962C8B-B14F-4D97-AF65-F5344CB8AC3E}">
-        <p14:creationId xmlns:p14="http://schemas.microsoft.com/office/powerpoint/2010/main" val="1261194124"/>
+        <p14:creationId xmlns:p14="http://schemas.microsoft.com/office/powerpoint/2010/main" xmlns="" val="1261194124"/>
       </p:ext>
     </p:extLst>
   </p:cSld>
@@ -16025,28 +15287,6 @@
       </p:sp>
       <p:sp>
         <p:nvSpPr>
-          <p:cNvPr id="6" name="Date Placeholder 5"/>
-          <p:cNvSpPr>
-            <a:spLocks noGrp="1"/>
-          </p:cNvSpPr>
-          <p:nvPr>
-            <p:ph type="dt" sz="half" idx="2"/>
-          </p:nvPr>
-        </p:nvSpPr>
-        <p:spPr/>
-        <p:txBody>
-          <a:bodyPr/>
-          <a:lstStyle/>
-          <a:p>
-            <a:r>
-              <a:rPr lang="en-CA" dirty="0"/>
-              <a:t>Winter 2022</a:t>
-            </a:r>
-          </a:p>
-        </p:txBody>
-      </p:sp>
-      <p:sp>
-        <p:nvSpPr>
           <p:cNvPr id="10" name="Footer Placeholder 9"/>
           <p:cNvSpPr>
             <a:spLocks noGrp="1"/>
@@ -16097,7 +15337,7 @@
     </p:spTree>
     <p:extLst>
       <p:ext uri="{BB962C8B-B14F-4D97-AF65-F5344CB8AC3E}">
-        <p14:creationId xmlns:p14="http://schemas.microsoft.com/office/powerpoint/2010/main" val="224240828"/>
+        <p14:creationId xmlns:p14="http://schemas.microsoft.com/office/powerpoint/2010/main" xmlns="" val="224240828"/>
       </p:ext>
     </p:extLst>
   </p:cSld>
@@ -16172,7 +15412,7 @@
         </p:spPr>
         <p:txBody>
           <a:bodyPr>
-            <a:normAutofit/>
+            <a:normAutofit lnSpcReduction="10000"/>
           </a:bodyPr>
           <a:lstStyle/>
           <a:p>
@@ -16539,28 +15779,6 @@
       </p:sp>
       <p:sp>
         <p:nvSpPr>
-          <p:cNvPr id="6" name="Date Placeholder 5"/>
-          <p:cNvSpPr>
-            <a:spLocks noGrp="1"/>
-          </p:cNvSpPr>
-          <p:nvPr>
-            <p:ph type="dt" sz="half" idx="2"/>
-          </p:nvPr>
-        </p:nvSpPr>
-        <p:spPr/>
-        <p:txBody>
-          <a:bodyPr/>
-          <a:lstStyle/>
-          <a:p>
-            <a:r>
-              <a:rPr lang="en-CA" dirty="0"/>
-              <a:t>Winter 2022</a:t>
-            </a:r>
-          </a:p>
-        </p:txBody>
-      </p:sp>
-      <p:sp>
-        <p:nvSpPr>
           <p:cNvPr id="10" name="Footer Placeholder 9"/>
           <p:cNvSpPr>
             <a:spLocks noGrp="1"/>
@@ -16611,7 +15829,7 @@
     </p:spTree>
     <p:extLst>
       <p:ext uri="{BB962C8B-B14F-4D97-AF65-F5344CB8AC3E}">
-        <p14:creationId xmlns:p14="http://schemas.microsoft.com/office/powerpoint/2010/main" val="2928778702"/>
+        <p14:creationId xmlns:p14="http://schemas.microsoft.com/office/powerpoint/2010/main" xmlns="" val="2928778702"/>
       </p:ext>
     </p:extLst>
   </p:cSld>
@@ -16666,28 +15884,6 @@
       </p:sp>
       <p:sp>
         <p:nvSpPr>
-          <p:cNvPr id="6" name="Date Placeholder 5"/>
-          <p:cNvSpPr>
-            <a:spLocks noGrp="1"/>
-          </p:cNvSpPr>
-          <p:nvPr>
-            <p:ph type="dt" sz="half" idx="2"/>
-          </p:nvPr>
-        </p:nvSpPr>
-        <p:spPr/>
-        <p:txBody>
-          <a:bodyPr/>
-          <a:lstStyle/>
-          <a:p>
-            <a:r>
-              <a:rPr lang="en-CA" dirty="0"/>
-              <a:t>Winter 2022</a:t>
-            </a:r>
-          </a:p>
-        </p:txBody>
-      </p:sp>
-      <p:sp>
-        <p:nvSpPr>
           <p:cNvPr id="10" name="Footer Placeholder 9"/>
           <p:cNvSpPr>
             <a:spLocks noGrp="1"/>
@@ -16740,7 +15936,7 @@
           <p:cNvPr id="3" name="Content Placeholder 2">
             <a:extLst>
               <a:ext uri="{FF2B5EF4-FFF2-40B4-BE49-F238E27FC236}">
-                <a16:creationId xmlns:a16="http://schemas.microsoft.com/office/drawing/2014/main" id="{02D9390E-2D69-457A-8A63-8012338D7B7D}"/>
+                <a16:creationId xmlns:a16="http://schemas.microsoft.com/office/drawing/2014/main" xmlns="" id="{02D9390E-2D69-457A-8A63-8012338D7B7D}"/>
               </a:ext>
             </a:extLst>
           </p:cNvPr>
@@ -16771,7 +15967,7 @@
           <p:cNvPr id="7" name="Rectangle 3">
             <a:extLst>
               <a:ext uri="{FF2B5EF4-FFF2-40B4-BE49-F238E27FC236}">
-                <a16:creationId xmlns:a16="http://schemas.microsoft.com/office/drawing/2014/main" id="{FA306D2D-5583-40F8-B92D-FC2433F89369}"/>
+                <a16:creationId xmlns:a16="http://schemas.microsoft.com/office/drawing/2014/main" xmlns="" id="{FA306D2D-5583-40F8-B92D-FC2433F89369}"/>
               </a:ext>
             </a:extLst>
           </p:cNvPr>
@@ -16794,14 +15990,14 @@
           </a:ln>
           <a:extLst>
             <a:ext uri="{909E8E84-426E-40DD-AFC4-6F175D3DCCD1}">
-              <a14:hiddenFill xmlns:a14="http://schemas.microsoft.com/office/drawing/2010/main">
+              <a14:hiddenFill xmlns:a14="http://schemas.microsoft.com/office/drawing/2010/main" xmlns="">
                 <a:solidFill>
                   <a:srgbClr val="FFFFFF"/>
                 </a:solidFill>
               </a14:hiddenFill>
             </a:ext>
             <a:ext uri="{91240B29-F687-4F45-9708-019B960494DF}">
-              <a14:hiddenLine xmlns:a14="http://schemas.microsoft.com/office/drawing/2010/main" w="9525">
+              <a14:hiddenLine xmlns:a14="http://schemas.microsoft.com/office/drawing/2010/main" xmlns="" w="9525">
                 <a:solidFill>
                   <a:srgbClr val="000000"/>
                 </a:solidFill>
@@ -17631,7 +16827,7 @@
           <p:cNvPr id="8" name="Rectangle 4">
             <a:extLst>
               <a:ext uri="{FF2B5EF4-FFF2-40B4-BE49-F238E27FC236}">
-                <a16:creationId xmlns:a16="http://schemas.microsoft.com/office/drawing/2014/main" id="{5AC9BB54-4D92-4420-9C28-A540F9048C51}"/>
+                <a16:creationId xmlns:a16="http://schemas.microsoft.com/office/drawing/2014/main" xmlns="" id="{5AC9BB54-4D92-4420-9C28-A540F9048C51}"/>
               </a:ext>
             </a:extLst>
           </p:cNvPr>
@@ -17659,7 +16855,7 @@
           </a:ln>
           <a:extLst>
             <a:ext uri="{909E8E84-426E-40DD-AFC4-6F175D3DCCD1}">
-              <a14:hiddenFill xmlns:a14="http://schemas.microsoft.com/office/drawing/2010/main">
+              <a14:hiddenFill xmlns:a14="http://schemas.microsoft.com/office/drawing/2010/main" xmlns="">
                 <a:solidFill>
                   <a:srgbClr val="FFFFFF"/>
                 </a:solidFill>
@@ -17864,7 +17060,7 @@
     </p:spTree>
     <p:extLst>
       <p:ext uri="{BB962C8B-B14F-4D97-AF65-F5344CB8AC3E}">
-        <p14:creationId xmlns:p14="http://schemas.microsoft.com/office/powerpoint/2010/main" val="3326900570"/>
+        <p14:creationId xmlns:p14="http://schemas.microsoft.com/office/powerpoint/2010/main" xmlns="" val="3326900570"/>
       </p:ext>
     </p:extLst>
   </p:cSld>
@@ -17919,28 +17115,6 @@
       </p:sp>
       <p:sp>
         <p:nvSpPr>
-          <p:cNvPr id="6" name="Date Placeholder 5"/>
-          <p:cNvSpPr>
-            <a:spLocks noGrp="1"/>
-          </p:cNvSpPr>
-          <p:nvPr>
-            <p:ph type="dt" sz="half" idx="2"/>
-          </p:nvPr>
-        </p:nvSpPr>
-        <p:spPr/>
-        <p:txBody>
-          <a:bodyPr/>
-          <a:lstStyle/>
-          <a:p>
-            <a:r>
-              <a:rPr lang="en-CA" dirty="0"/>
-              <a:t>Winter 2022</a:t>
-            </a:r>
-          </a:p>
-        </p:txBody>
-      </p:sp>
-      <p:sp>
-        <p:nvSpPr>
           <p:cNvPr id="10" name="Footer Placeholder 9"/>
           <p:cNvSpPr>
             <a:spLocks noGrp="1"/>
@@ -17993,7 +17167,7 @@
           <p:cNvPr id="3" name="Content Placeholder 2">
             <a:extLst>
               <a:ext uri="{FF2B5EF4-FFF2-40B4-BE49-F238E27FC236}">
-                <a16:creationId xmlns:a16="http://schemas.microsoft.com/office/drawing/2014/main" id="{02D9390E-2D69-457A-8A63-8012338D7B7D}"/>
+                <a16:creationId xmlns:a16="http://schemas.microsoft.com/office/drawing/2014/main" xmlns="" id="{02D9390E-2D69-457A-8A63-8012338D7B7D}"/>
               </a:ext>
             </a:extLst>
           </p:cNvPr>
@@ -18024,7 +17198,7 @@
           <p:cNvPr id="7" name="Rectangle 3">
             <a:extLst>
               <a:ext uri="{FF2B5EF4-FFF2-40B4-BE49-F238E27FC236}">
-                <a16:creationId xmlns:a16="http://schemas.microsoft.com/office/drawing/2014/main" id="{03CC276D-5B37-4716-AE20-1AA4B3D1DC58}"/>
+                <a16:creationId xmlns:a16="http://schemas.microsoft.com/office/drawing/2014/main" xmlns="" id="{03CC276D-5B37-4716-AE20-1AA4B3D1DC58}"/>
               </a:ext>
             </a:extLst>
           </p:cNvPr>
@@ -18047,14 +17221,14 @@
           </a:ln>
           <a:extLst>
             <a:ext uri="{909E8E84-426E-40DD-AFC4-6F175D3DCCD1}">
-              <a14:hiddenFill xmlns:a14="http://schemas.microsoft.com/office/drawing/2010/main">
+              <a14:hiddenFill xmlns:a14="http://schemas.microsoft.com/office/drawing/2010/main" xmlns="">
                 <a:solidFill>
                   <a:srgbClr val="FFFFFF"/>
                 </a:solidFill>
               </a14:hiddenFill>
             </a:ext>
             <a:ext uri="{91240B29-F687-4F45-9708-019B960494DF}">
-              <a14:hiddenLine xmlns:a14="http://schemas.microsoft.com/office/drawing/2010/main" w="9525">
+              <a14:hiddenLine xmlns:a14="http://schemas.microsoft.com/office/drawing/2010/main" xmlns="" w="9525">
                 <a:solidFill>
                   <a:srgbClr val="000000"/>
                 </a:solidFill>
@@ -18964,7 +18138,7 @@
           <p:cNvPr id="8" name="Rectangle 4">
             <a:extLst>
               <a:ext uri="{FF2B5EF4-FFF2-40B4-BE49-F238E27FC236}">
-                <a16:creationId xmlns:a16="http://schemas.microsoft.com/office/drawing/2014/main" id="{22C667BB-BE1A-4E42-9202-F22A6A773D4C}"/>
+                <a16:creationId xmlns:a16="http://schemas.microsoft.com/office/drawing/2014/main" xmlns="" id="{22C667BB-BE1A-4E42-9202-F22A6A773D4C}"/>
               </a:ext>
             </a:extLst>
           </p:cNvPr>
@@ -18992,7 +18166,7 @@
           </a:ln>
           <a:extLst>
             <a:ext uri="{909E8E84-426E-40DD-AFC4-6F175D3DCCD1}">
-              <a14:hiddenFill xmlns:a14="http://schemas.microsoft.com/office/drawing/2010/main">
+              <a14:hiddenFill xmlns:a14="http://schemas.microsoft.com/office/drawing/2010/main" xmlns="">
                 <a:solidFill>
                   <a:srgbClr val="FFFFFF"/>
                 </a:solidFill>
@@ -19199,7 +18373,7 @@
           <p:cNvPr id="9" name="Rectangle 5">
             <a:extLst>
               <a:ext uri="{FF2B5EF4-FFF2-40B4-BE49-F238E27FC236}">
-                <a16:creationId xmlns:a16="http://schemas.microsoft.com/office/drawing/2014/main" id="{26416BC4-D089-4138-8185-34999288BB74}"/>
+                <a16:creationId xmlns:a16="http://schemas.microsoft.com/office/drawing/2014/main" xmlns="" id="{26416BC4-D089-4138-8185-34999288BB74}"/>
               </a:ext>
             </a:extLst>
           </p:cNvPr>
@@ -19428,7 +18602,7 @@
           <p:cNvPr id="11" name="AutoShape 6">
             <a:extLst>
               <a:ext uri="{FF2B5EF4-FFF2-40B4-BE49-F238E27FC236}">
-                <a16:creationId xmlns:a16="http://schemas.microsoft.com/office/drawing/2014/main" id="{ADBF95C5-E277-4203-9C8D-C04057A6329D}"/>
+                <a16:creationId xmlns:a16="http://schemas.microsoft.com/office/drawing/2014/main" xmlns="" id="{ADBF95C5-E277-4203-9C8D-C04057A6329D}"/>
               </a:ext>
             </a:extLst>
           </p:cNvPr>
@@ -19657,7 +18831,7 @@
     </p:spTree>
     <p:extLst>
       <p:ext uri="{BB962C8B-B14F-4D97-AF65-F5344CB8AC3E}">
-        <p14:creationId xmlns:p14="http://schemas.microsoft.com/office/powerpoint/2010/main" val="151665903"/>
+        <p14:creationId xmlns:p14="http://schemas.microsoft.com/office/powerpoint/2010/main" xmlns="" val="151665903"/>
       </p:ext>
     </p:extLst>
   </p:cSld>
@@ -19809,28 +18983,6 @@
       </p:sp>
       <p:sp>
         <p:nvSpPr>
-          <p:cNvPr id="6" name="Date Placeholder 5"/>
-          <p:cNvSpPr>
-            <a:spLocks noGrp="1"/>
-          </p:cNvSpPr>
-          <p:nvPr>
-            <p:ph type="dt" sz="half" idx="2"/>
-          </p:nvPr>
-        </p:nvSpPr>
-        <p:spPr/>
-        <p:txBody>
-          <a:bodyPr/>
-          <a:lstStyle/>
-          <a:p>
-            <a:r>
-              <a:rPr lang="en-CA" dirty="0"/>
-              <a:t>Winter 2022</a:t>
-            </a:r>
-          </a:p>
-        </p:txBody>
-      </p:sp>
-      <p:sp>
-        <p:nvSpPr>
           <p:cNvPr id="10" name="Footer Placeholder 9"/>
           <p:cNvSpPr>
             <a:spLocks noGrp="1"/>
@@ -19881,7 +19033,7 @@
     </p:spTree>
     <p:extLst>
       <p:ext uri="{BB962C8B-B14F-4D97-AF65-F5344CB8AC3E}">
-        <p14:creationId xmlns:p14="http://schemas.microsoft.com/office/powerpoint/2010/main" val="599512483"/>
+        <p14:creationId xmlns:p14="http://schemas.microsoft.com/office/powerpoint/2010/main" xmlns="" val="599512483"/>
       </p:ext>
     </p:extLst>
   </p:cSld>
@@ -20033,28 +19185,6 @@
       </p:sp>
       <p:sp>
         <p:nvSpPr>
-          <p:cNvPr id="6" name="Date Placeholder 5"/>
-          <p:cNvSpPr>
-            <a:spLocks noGrp="1"/>
-          </p:cNvSpPr>
-          <p:nvPr>
-            <p:ph type="dt" sz="half" idx="2"/>
-          </p:nvPr>
-        </p:nvSpPr>
-        <p:spPr/>
-        <p:txBody>
-          <a:bodyPr/>
-          <a:lstStyle/>
-          <a:p>
-            <a:r>
-              <a:rPr lang="en-CA" dirty="0"/>
-              <a:t>Winter 2022</a:t>
-            </a:r>
-          </a:p>
-        </p:txBody>
-      </p:sp>
-      <p:sp>
-        <p:nvSpPr>
           <p:cNvPr id="10" name="Footer Placeholder 9"/>
           <p:cNvSpPr>
             <a:spLocks noGrp="1"/>
@@ -20105,7 +19235,7 @@
     </p:spTree>
     <p:extLst>
       <p:ext uri="{BB962C8B-B14F-4D97-AF65-F5344CB8AC3E}">
-        <p14:creationId xmlns:p14="http://schemas.microsoft.com/office/powerpoint/2010/main" val="186258679"/>
+        <p14:creationId xmlns:p14="http://schemas.microsoft.com/office/powerpoint/2010/main" xmlns="" val="186258679"/>
       </p:ext>
     </p:extLst>
   </p:cSld>
@@ -20219,28 +19349,6 @@
       </p:sp>
       <p:sp>
         <p:nvSpPr>
-          <p:cNvPr id="6" name="Date Placeholder 5"/>
-          <p:cNvSpPr>
-            <a:spLocks noGrp="1"/>
-          </p:cNvSpPr>
-          <p:nvPr>
-            <p:ph type="dt" sz="half" idx="2"/>
-          </p:nvPr>
-        </p:nvSpPr>
-        <p:spPr/>
-        <p:txBody>
-          <a:bodyPr/>
-          <a:lstStyle/>
-          <a:p>
-            <a:r>
-              <a:rPr lang="en-CA" dirty="0"/>
-              <a:t>Winter 2022</a:t>
-            </a:r>
-          </a:p>
-        </p:txBody>
-      </p:sp>
-      <p:sp>
-        <p:nvSpPr>
           <p:cNvPr id="10" name="Footer Placeholder 9"/>
           <p:cNvSpPr>
             <a:spLocks noGrp="1"/>
@@ -20291,7 +19399,7 @@
     </p:spTree>
     <p:extLst>
       <p:ext uri="{BB962C8B-B14F-4D97-AF65-F5344CB8AC3E}">
-        <p14:creationId xmlns:p14="http://schemas.microsoft.com/office/powerpoint/2010/main" val="1244983263"/>
+        <p14:creationId xmlns:p14="http://schemas.microsoft.com/office/powerpoint/2010/main" xmlns="" val="1244983263"/>
       </p:ext>
     </p:extLst>
   </p:cSld>
@@ -20405,28 +19513,6 @@
       </p:sp>
       <p:sp>
         <p:nvSpPr>
-          <p:cNvPr id="6" name="Date Placeholder 5"/>
-          <p:cNvSpPr>
-            <a:spLocks noGrp="1"/>
-          </p:cNvSpPr>
-          <p:nvPr>
-            <p:ph type="dt" sz="half" idx="2"/>
-          </p:nvPr>
-        </p:nvSpPr>
-        <p:spPr/>
-        <p:txBody>
-          <a:bodyPr/>
-          <a:lstStyle/>
-          <a:p>
-            <a:r>
-              <a:rPr lang="en-CA" dirty="0"/>
-              <a:t>Winter 2022</a:t>
-            </a:r>
-          </a:p>
-        </p:txBody>
-      </p:sp>
-      <p:sp>
-        <p:nvSpPr>
           <p:cNvPr id="10" name="Footer Placeholder 9"/>
           <p:cNvSpPr>
             <a:spLocks noGrp="1"/>
@@ -20477,7 +19563,7 @@
     </p:spTree>
     <p:extLst>
       <p:ext uri="{BB962C8B-B14F-4D97-AF65-F5344CB8AC3E}">
-        <p14:creationId xmlns:p14="http://schemas.microsoft.com/office/powerpoint/2010/main" val="1819476712"/>
+        <p14:creationId xmlns:p14="http://schemas.microsoft.com/office/powerpoint/2010/main" xmlns="" val="1819476712"/>
       </p:ext>
     </p:extLst>
   </p:cSld>
@@ -20560,28 +19646,6 @@
       </p:sp>
       <p:sp>
         <p:nvSpPr>
-          <p:cNvPr id="6" name="Date Placeholder 5"/>
-          <p:cNvSpPr>
-            <a:spLocks noGrp="1"/>
-          </p:cNvSpPr>
-          <p:nvPr>
-            <p:ph type="dt" sz="half" idx="2"/>
-          </p:nvPr>
-        </p:nvSpPr>
-        <p:spPr/>
-        <p:txBody>
-          <a:bodyPr/>
-          <a:lstStyle/>
-          <a:p>
-            <a:r>
-              <a:rPr lang="en-CA" dirty="0"/>
-              <a:t>Winter 2022</a:t>
-            </a:r>
-          </a:p>
-        </p:txBody>
-      </p:sp>
-      <p:sp>
-        <p:nvSpPr>
           <p:cNvPr id="10" name="Footer Placeholder 9"/>
           <p:cNvSpPr>
             <a:spLocks noGrp="1"/>
@@ -20634,7 +19698,7 @@
           <p:cNvPr id="5" name="Picture 4">
             <a:extLst>
               <a:ext uri="{FF2B5EF4-FFF2-40B4-BE49-F238E27FC236}">
-                <a16:creationId xmlns:a16="http://schemas.microsoft.com/office/drawing/2014/main" id="{803B4936-45A2-413F-AB8F-8C23C7A392C9}"/>
+                <a16:creationId xmlns:a16="http://schemas.microsoft.com/office/drawing/2014/main" xmlns="" id="{803B4936-45A2-413F-AB8F-8C23C7A392C9}"/>
               </a:ext>
             </a:extLst>
           </p:cNvPr>
@@ -20644,13 +19708,13 @@
           <p:nvPr/>
         </p:nvPicPr>
         <p:blipFill>
-          <a:blip r:embed="rId2">
+          <a:blip r:embed="rId2" cstate="print">
             <a:extLst>
               <a:ext uri="{28A0092B-C50C-407E-A947-70E740481C1C}">
-                <a14:useLocalDpi xmlns:a14="http://schemas.microsoft.com/office/drawing/2010/main" val="0"/>
+                <a14:useLocalDpi xmlns:a14="http://schemas.microsoft.com/office/drawing/2010/main" xmlns="" val="0"/>
               </a:ext>
               <a:ext uri="{837473B0-CC2E-450A-ABE3-18F120FF3D39}">
-                <a1611:picAttrSrcUrl xmlns:a1611="http://schemas.microsoft.com/office/drawing/2016/11/main" r:id="rId3"/>
+                <a1611:picAttrSrcUrl xmlns:a1611="http://schemas.microsoft.com/office/drawing/2016/11/main" xmlns="" r:id="rId3"/>
               </a:ext>
             </a:extLst>
           </a:blip>
@@ -20673,7 +19737,7 @@
           <p:cNvPr id="13" name="Picture 12">
             <a:extLst>
               <a:ext uri="{FF2B5EF4-FFF2-40B4-BE49-F238E27FC236}">
-                <a16:creationId xmlns:a16="http://schemas.microsoft.com/office/drawing/2014/main" id="{27FEF2F8-9EEA-48B5-B21F-E3999BCF99AB}"/>
+                <a16:creationId xmlns:a16="http://schemas.microsoft.com/office/drawing/2014/main" xmlns="" id="{27FEF2F8-9EEA-48B5-B21F-E3999BCF99AB}"/>
               </a:ext>
             </a:extLst>
           </p:cNvPr>
@@ -20683,13 +19747,13 @@
           <p:nvPr/>
         </p:nvPicPr>
         <p:blipFill>
-          <a:blip r:embed="rId4">
+          <a:blip r:embed="rId4" cstate="print">
             <a:extLst>
               <a:ext uri="{28A0092B-C50C-407E-A947-70E740481C1C}">
-                <a14:useLocalDpi xmlns:a14="http://schemas.microsoft.com/office/drawing/2010/main" val="0"/>
+                <a14:useLocalDpi xmlns:a14="http://schemas.microsoft.com/office/drawing/2010/main" xmlns="" val="0"/>
               </a:ext>
               <a:ext uri="{837473B0-CC2E-450A-ABE3-18F120FF3D39}">
-                <a1611:picAttrSrcUrl xmlns:a1611="http://schemas.microsoft.com/office/drawing/2016/11/main" r:id="rId5"/>
+                <a1611:picAttrSrcUrl xmlns:a1611="http://schemas.microsoft.com/office/drawing/2016/11/main" xmlns="" r:id="rId5"/>
               </a:ext>
             </a:extLst>
           </a:blip>
@@ -20712,7 +19776,7 @@
           <p:cNvPr id="15" name="Picture 14">
             <a:extLst>
               <a:ext uri="{FF2B5EF4-FFF2-40B4-BE49-F238E27FC236}">
-                <a16:creationId xmlns:a16="http://schemas.microsoft.com/office/drawing/2014/main" id="{61C04142-3366-49EB-9FEC-88FF5368D17D}"/>
+                <a16:creationId xmlns:a16="http://schemas.microsoft.com/office/drawing/2014/main" xmlns="" id="{61C04142-3366-49EB-9FEC-88FF5368D17D}"/>
               </a:ext>
             </a:extLst>
           </p:cNvPr>
@@ -20722,13 +19786,13 @@
           <p:nvPr/>
         </p:nvPicPr>
         <p:blipFill>
-          <a:blip r:embed="rId6">
+          <a:blip r:embed="rId6" cstate="print">
             <a:extLst>
               <a:ext uri="{28A0092B-C50C-407E-A947-70E740481C1C}">
-                <a14:useLocalDpi xmlns:a14="http://schemas.microsoft.com/office/drawing/2010/main" val="0"/>
+                <a14:useLocalDpi xmlns:a14="http://schemas.microsoft.com/office/drawing/2010/main" xmlns="" val="0"/>
               </a:ext>
               <a:ext uri="{837473B0-CC2E-450A-ABE3-18F120FF3D39}">
-                <a1611:picAttrSrcUrl xmlns:a1611="http://schemas.microsoft.com/office/drawing/2016/11/main" r:id="rId7"/>
+                <a1611:picAttrSrcUrl xmlns:a1611="http://schemas.microsoft.com/office/drawing/2016/11/main" xmlns="" r:id="rId7"/>
               </a:ext>
             </a:extLst>
           </a:blip>
@@ -20749,7 +19813,7 @@
     </p:spTree>
     <p:extLst>
       <p:ext uri="{BB962C8B-B14F-4D97-AF65-F5344CB8AC3E}">
-        <p14:creationId xmlns:p14="http://schemas.microsoft.com/office/powerpoint/2010/main" val="793235412"/>
+        <p14:creationId xmlns:p14="http://schemas.microsoft.com/office/powerpoint/2010/main" xmlns="" val="793235412"/>
       </p:ext>
     </p:extLst>
   </p:cSld>
@@ -20802,7 +19866,7 @@
     </a:clrScheme>
     <a:fontScheme name="Office">
       <a:majorFont>
-        <a:latin typeface="Calibri Light" panose="020F0302020204030204"/>
+        <a:latin typeface="Calibri Light"/>
         <a:ea typeface=""/>
         <a:cs typeface=""/>
         <a:font script="Jpan" typeface="游ゴシック Light"/>
@@ -20854,7 +19918,7 @@
         <a:font script="Tfng" typeface="Ebrima"/>
       </a:majorFont>
       <a:minorFont>
-        <a:latin typeface="Calibri" panose="020F0502020204030204"/>
+        <a:latin typeface="Calibri"/>
         <a:ea typeface=""/>
         <a:cs typeface=""/>
         <a:font script="Jpan" typeface="游ゴシック"/>
@@ -21048,7 +20112,7 @@
   <a:extraClrSchemeLst/>
   <a:extLst>
     <a:ext uri="{05A4C25C-085E-4340-85A3-A5531E510DB2}">
-      <thm15:themeFamily xmlns:thm15="http://schemas.microsoft.com/office/thememl/2012/main" name="eye_tracker_presentation" id="{00ED1D97-A04B-46A0-BB71-88655A6B057F}" vid="{F36189FA-3966-4852-951E-5734674D1C7B}"/>
+      <thm15:themeFamily xmlns:thm15="http://schemas.microsoft.com/office/thememl/2012/main" xmlns="" name="eye_tracker_presentation" id="{00ED1D97-A04B-46A0-BB71-88655A6B057F}" vid="{F36189FA-3966-4852-951E-5734674D1C7B}"/>
     </a:ext>
   </a:extLst>
 </a:theme>
@@ -21097,7 +20161,7 @@
     </a:clrScheme>
     <a:fontScheme name="Office">
       <a:majorFont>
-        <a:latin typeface="Calibri Light" panose="020F0302020204030204"/>
+        <a:latin typeface="Calibri Light"/>
         <a:ea typeface=""/>
         <a:cs typeface=""/>
         <a:font script="Jpan" typeface="游ゴシック Light"/>
@@ -21149,7 +20213,7 @@
         <a:font script="Tfng" typeface="Ebrima"/>
       </a:majorFont>
       <a:minorFont>
-        <a:latin typeface="Calibri" panose="020F0502020204030204"/>
+        <a:latin typeface="Calibri"/>
         <a:ea typeface=""/>
         <a:cs typeface=""/>
         <a:font script="Jpan" typeface="游ゴシック"/>
@@ -21343,7 +20407,7 @@
   <a:extraClrSchemeLst/>
   <a:extLst>
     <a:ext uri="{05A4C25C-085E-4340-85A3-A5531E510DB2}">
-      <thm15:themeFamily xmlns:thm15="http://schemas.microsoft.com/office/thememl/2012/main" name="Office Theme" id="{62F939B6-93AF-4DB8-9C6B-D6C7DFDC589F}" vid="{4A3C46E8-61CC-4603-A589-7422A47A8E4A}"/>
+      <thm15:themeFamily xmlns:thm15="http://schemas.microsoft.com/office/thememl/2012/main" xmlns="" name="Office Theme" id="{62F939B6-93AF-4DB8-9C6B-D6C7DFDC589F}" vid="{4A3C46E8-61CC-4603-A589-7422A47A8E4A}"/>
     </a:ext>
   </a:extLst>
 </a:theme>

</xml_diff>